<commit_message>
Updates in the RQ Demo PPT
</commit_message>
<xml_diff>
--- a/research_question_presentation_template.pptx
+++ b/research_question_presentation_template.pptx
@@ -256,7 +256,7 @@
             <a:fld id="{93FAAC3A-BD1F-4A00-9099-74B95789FE00}" type="datetimeFigureOut">
               <a:rPr lang="en-GB" smtClean="0"/>
               <a:pPr/>
-              <a:t>24/11/2025</a:t>
+              <a:t>11/12/2025</a:t>
             </a:fld>
             <a:endParaRPr lang="en-GB"/>
           </a:p>
@@ -435,7 +435,7 @@
             <a:fld id="{8E359C8A-39F6-4045-9163-4042C4C26B15}" type="datetimeFigureOut">
               <a:rPr lang="en-GB" smtClean="0"/>
               <a:pPr/>
-              <a:t>24/11/2025</a:t>
+              <a:t>11/12/2025</a:t>
             </a:fld>
             <a:endParaRPr lang="en-GB"/>
           </a:p>
@@ -6187,7 +6187,7 @@
               <a:t>and </a:t>
             </a:r>
             <a:r>
-              <a:rPr lang="en-IE" sz="2400" b="0" dirty="0">
+              <a:rPr lang="en-IE" sz="2400" b="0">
                 <a:solidFill>
                   <a:srgbClr val="0070C0"/>
                 </a:solidFill>
@@ -6198,12 +6198,12 @@
               <a:t>MP</a:t>
             </a:r>
             <a:r>
-              <a:rPr lang="en-IE" sz="2400" b="0" dirty="0">
+              <a:rPr lang="en-IE" sz="2400" b="0">
                 <a:latin typeface="Calibri"/>
                 <a:ea typeface="Calibri" panose="020F0502020204030204" pitchFamily="34" charset="0"/>
                 <a:cs typeface="Times New Roman"/>
               </a:rPr>
-              <a:t>?”</a:t>
+              <a:t>? ”</a:t>
             </a:r>
             <a:br>
               <a:rPr lang="en-IE" sz="2400" b="0" dirty="0">
@@ -7905,6 +7905,23 @@
 </file>
 
 <file path=customXml/item1.xml><?xml version="1.0" encoding="utf-8"?>
+<p:properties xmlns:p="http://schemas.microsoft.com/office/2006/metadata/properties" xmlns:xsi="http://www.w3.org/2001/XMLSchema-instance" xmlns:pc="http://schemas.microsoft.com/office/infopath/2007/PartnerControls">
+  <documentManagement>
+    <Information xmlns="4ad138b4-2b68-4b70-945d-07f8f18b1c9a" xsi:nil="true"/>
+  </documentManagement>
+</p:properties>
+</file>
+
+<file path=customXml/item2.xml><?xml version="1.0" encoding="utf-8"?>
+<?mso-contentType ?>
+<FormTemplates xmlns="http://schemas.microsoft.com/sharepoint/v3/contenttype/forms">
+  <Display>DocumentLibraryForm</Display>
+  <Edit>DocumentLibraryForm</Edit>
+  <New>DocumentLibraryForm</New>
+</FormTemplates>
+</file>
+
+<file path=customXml/item3.xml><?xml version="1.0" encoding="utf-8"?>
 <ct:contentTypeSchema xmlns:ct="http://schemas.microsoft.com/office/2006/metadata/contentType" xmlns:ma="http://schemas.microsoft.com/office/2006/metadata/properties/metaAttributes" ct:_="" ma:_="" ma:contentTypeName="Document" ma:contentTypeID="0x01010026DBA85F447B164191BB36C258697B67" ma:contentTypeVersion="14" ma:contentTypeDescription="Create a new document." ma:contentTypeScope="" ma:versionID="ea511d05ca7f895fe9556935b5c9af34">
   <xsd:schema xmlns:xsd="http://www.w3.org/2001/XMLSchema" xmlns:xs="http://www.w3.org/2001/XMLSchema" xmlns:p="http://schemas.microsoft.com/office/2006/metadata/properties" xmlns:ns2="4ad138b4-2b68-4b70-945d-07f8f18b1c9a" xmlns:ns3="3c474641-ec36-472f-b125-6b1b0910eaa4" targetNamespace="http://schemas.microsoft.com/office/2006/metadata/properties" ma:root="true" ma:fieldsID="662270106d7a7e100bcac2c5f8d29899" ns2:_="" ns3:_="">
     <xsd:import namespace="4ad138b4-2b68-4b70-945d-07f8f18b1c9a"/>
@@ -8129,24 +8146,32 @@
 </ct:contentTypeSchema>
 </file>
 
-<file path=customXml/item2.xml><?xml version="1.0" encoding="utf-8"?>
-<?mso-contentType ?>
-<FormTemplates xmlns="http://schemas.microsoft.com/sharepoint/v3/contenttype/forms">
-  <Display>DocumentLibraryForm</Display>
-  <Edit>DocumentLibraryForm</Edit>
-  <New>DocumentLibraryForm</New>
-</FormTemplates>
+<file path=customXml/itemProps1.xml><?xml version="1.0" encoding="utf-8"?>
+<ds:datastoreItem xmlns:ds="http://schemas.openxmlformats.org/officeDocument/2006/customXml" ds:itemID="{EDD1FC41-23C7-41B0-B5F9-BF4CD38AD2ED}">
+  <ds:schemaRefs>
+    <ds:schemaRef ds:uri="3c474641-ec36-472f-b125-6b1b0910eaa4"/>
+    <ds:schemaRef ds:uri="4ad138b4-2b68-4b70-945d-07f8f18b1c9a"/>
+    <ds:schemaRef ds:uri="http://purl.org/dc/dcmitype/"/>
+    <ds:schemaRef ds:uri="http://purl.org/dc/elements/1.1/"/>
+    <ds:schemaRef ds:uri="http://purl.org/dc/terms/"/>
+    <ds:schemaRef ds:uri="http://schemas.microsoft.com/office/2006/documentManagement/types"/>
+    <ds:schemaRef ds:uri="http://schemas.microsoft.com/office/2006/metadata/properties"/>
+    <ds:schemaRef ds:uri="http://schemas.microsoft.com/office/infopath/2007/PartnerControls"/>
+    <ds:schemaRef ds:uri="http://schemas.openxmlformats.org/package/2006/metadata/core-properties"/>
+    <ds:schemaRef ds:uri="http://www.w3.org/XML/1998/namespace"/>
+  </ds:schemaRefs>
+</ds:datastoreItem>
 </file>
 
-<file path=customXml/item3.xml><?xml version="1.0" encoding="utf-8"?>
-<p:properties xmlns:p="http://schemas.microsoft.com/office/2006/metadata/properties" xmlns:xsi="http://www.w3.org/2001/XMLSchema-instance" xmlns:pc="http://schemas.microsoft.com/office/infopath/2007/PartnerControls">
-  <documentManagement>
-    <Information xmlns="4ad138b4-2b68-4b70-945d-07f8f18b1c9a" xsi:nil="true"/>
-  </documentManagement>
-</p:properties>
+<file path=customXml/itemProps2.xml><?xml version="1.0" encoding="utf-8"?>
+<ds:datastoreItem xmlns:ds="http://schemas.openxmlformats.org/officeDocument/2006/customXml" ds:itemID="{91C521DD-2673-4EE6-BB9B-DC5C3320FFBB}">
+  <ds:schemaRefs>
+    <ds:schemaRef ds:uri="http://schemas.microsoft.com/sharepoint/v3/contenttype/forms"/>
+  </ds:schemaRefs>
+</ds:datastoreItem>
 </file>
 
-<file path=customXml/itemProps1.xml><?xml version="1.0" encoding="utf-8"?>
+<file path=customXml/itemProps3.xml><?xml version="1.0" encoding="utf-8"?>
 <ds:datastoreItem xmlns:ds="http://schemas.openxmlformats.org/officeDocument/2006/customXml" ds:itemID="{421B8C57-903D-4D0E-8336-7B512F760CD1}">
   <ds:schemaRefs>
     <ds:schemaRef ds:uri="3c474641-ec36-472f-b125-6b1b0910eaa4"/>
@@ -8163,29 +8188,4 @@
     <ds:schemaRef ds:uri="http://www.w3.org/2001/XMLSchema"/>
   </ds:schemaRefs>
 </ds:datastoreItem>
-</file>
-
-<file path=customXml/itemProps2.xml><?xml version="1.0" encoding="utf-8"?>
-<ds:datastoreItem xmlns:ds="http://schemas.openxmlformats.org/officeDocument/2006/customXml" ds:itemID="{91C521DD-2673-4EE6-BB9B-DC5C3320FFBB}">
-  <ds:schemaRefs>
-    <ds:schemaRef ds:uri="http://schemas.microsoft.com/sharepoint/v3/contenttype/forms"/>
-  </ds:schemaRefs>
-</ds:datastoreItem>
-</file>
-
-<file path=customXml/itemProps3.xml><?xml version="1.0" encoding="utf-8"?>
-<ds:datastoreItem xmlns:ds="http://schemas.openxmlformats.org/officeDocument/2006/customXml" ds:itemID="{EDD1FC41-23C7-41B0-B5F9-BF4CD38AD2ED}">
-  <ds:schemaRefs>
-    <ds:schemaRef ds:uri="3c474641-ec36-472f-b125-6b1b0910eaa4"/>
-    <ds:schemaRef ds:uri="4ad138b4-2b68-4b70-945d-07f8f18b1c9a"/>
-    <ds:schemaRef ds:uri="http://purl.org/dc/dcmitype/"/>
-    <ds:schemaRef ds:uri="http://purl.org/dc/elements/1.1/"/>
-    <ds:schemaRef ds:uri="http://purl.org/dc/terms/"/>
-    <ds:schemaRef ds:uri="http://schemas.microsoft.com/office/2006/documentManagement/types"/>
-    <ds:schemaRef ds:uri="http://schemas.microsoft.com/office/2006/metadata/properties"/>
-    <ds:schemaRef ds:uri="http://schemas.microsoft.com/office/infopath/2007/PartnerControls"/>
-    <ds:schemaRef ds:uri="http://schemas.openxmlformats.org/package/2006/metadata/core-properties"/>
-    <ds:schemaRef ds:uri="http://www.w3.org/XML/1998/namespace"/>
-  </ds:schemaRefs>
-</ds:datastoreItem>
 </file>
</xml_diff>

<commit_message>
Reframed the RQ Statement as required
</commit_message>
<xml_diff>
--- a/research_question_presentation_template.pptx
+++ b/research_question_presentation_template.pptx
@@ -256,7 +256,7 @@
             <a:fld id="{93FAAC3A-BD1F-4A00-9099-74B95789FE00}" type="datetimeFigureOut">
               <a:rPr lang="en-GB" smtClean="0"/>
               <a:pPr/>
-              <a:t>11/12/2025</a:t>
+              <a:t>12/12/2025</a:t>
             </a:fld>
             <a:endParaRPr lang="en-GB"/>
           </a:p>
@@ -435,7 +435,7 @@
             <a:fld id="{8E359C8A-39F6-4045-9163-4042C4C26B15}" type="datetimeFigureOut">
               <a:rPr lang="en-GB" smtClean="0"/>
               <a:pPr/>
-              <a:t>11/12/2025</a:t>
+              <a:t>12/12/2025</a:t>
             </a:fld>
             <a:endParaRPr lang="en-GB"/>
           </a:p>
@@ -6164,7 +6164,7 @@
                 <a:ea typeface="Calibri" panose="020F0502020204030204" pitchFamily="34" charset="0"/>
                 <a:cs typeface="Times New Roman"/>
               </a:rPr>
-              <a:t>Interval/Ordinal vs Interval/Ordinal: “Is there a correlation between </a:t>
+              <a:t>Interval/Ordinal vs Interval/Ordinal: “Is there a statistically significant  correlation between </a:t>
             </a:r>
             <a:r>
               <a:rPr lang="en-IE" sz="2400" b="0" dirty="0">
@@ -6175,7 +6175,7 @@
                 <a:ea typeface="Calibri" panose="020F0502020204030204" pitchFamily="34" charset="0"/>
                 <a:cs typeface="Times New Roman"/>
               </a:rPr>
-              <a:t>PS/G </a:t>
+              <a:t>Point Scored /Game </a:t>
             </a:r>
             <a:r>
               <a:rPr lang="en-IE" sz="2400" b="0" dirty="0">
@@ -6187,7 +6187,7 @@
               <a:t>and </a:t>
             </a:r>
             <a:r>
-              <a:rPr lang="en-IE" sz="2400" b="0">
+              <a:rPr lang="en-IE" sz="2400" b="0" dirty="0">
                 <a:solidFill>
                   <a:srgbClr val="0070C0"/>
                 </a:solidFill>
@@ -6195,7 +6195,7 @@
                 <a:ea typeface="Calibri" panose="020F0502020204030204" pitchFamily="34" charset="0"/>
                 <a:cs typeface="Times New Roman"/>
               </a:rPr>
-              <a:t>MP</a:t>
+              <a:t>Minutes Player for NBA </a:t>
             </a:r>
             <a:r>
               <a:rPr lang="en-IE" sz="2400" b="0">
@@ -6203,7 +6203,15 @@
                 <a:ea typeface="Calibri" panose="020F0502020204030204" pitchFamily="34" charset="0"/>
                 <a:cs typeface="Times New Roman"/>
               </a:rPr>
-              <a:t>? ”</a:t>
+              <a:t>Players during the </a:t>
+            </a:r>
+            <a:r>
+              <a:rPr lang="en-IE" sz="2400" b="0" dirty="0">
+                <a:latin typeface="Calibri"/>
+                <a:ea typeface="Calibri" panose="020F0502020204030204" pitchFamily="34" charset="0"/>
+                <a:cs typeface="Times New Roman"/>
+              </a:rPr>
+              <a:t>2017 season? ”</a:t>
             </a:r>
             <a:br>
               <a:rPr lang="en-IE" sz="2400" b="0" dirty="0">
@@ -7905,20 +7913,20 @@
 </file>
 
 <file path=customXml/item1.xml><?xml version="1.0" encoding="utf-8"?>
-<p:properties xmlns:p="http://schemas.microsoft.com/office/2006/metadata/properties" xmlns:xsi="http://www.w3.org/2001/XMLSchema-instance" xmlns:pc="http://schemas.microsoft.com/office/infopath/2007/PartnerControls">
-  <documentManagement>
-    <Information xmlns="4ad138b4-2b68-4b70-945d-07f8f18b1c9a" xsi:nil="true"/>
-  </documentManagement>
-</p:properties>
-</file>
-
-<file path=customXml/item2.xml><?xml version="1.0" encoding="utf-8"?>
 <?mso-contentType ?>
 <FormTemplates xmlns="http://schemas.microsoft.com/sharepoint/v3/contenttype/forms">
   <Display>DocumentLibraryForm</Display>
   <Edit>DocumentLibraryForm</Edit>
   <New>DocumentLibraryForm</New>
 </FormTemplates>
+</file>
+
+<file path=customXml/item2.xml><?xml version="1.0" encoding="utf-8"?>
+<p:properties xmlns:p="http://schemas.microsoft.com/office/2006/metadata/properties" xmlns:xsi="http://www.w3.org/2001/XMLSchema-instance" xmlns:pc="http://schemas.microsoft.com/office/infopath/2007/PartnerControls">
+  <documentManagement>
+    <Information xmlns="4ad138b4-2b68-4b70-945d-07f8f18b1c9a" xsi:nil="true"/>
+  </documentManagement>
+</p:properties>
 </file>
 
 <file path=customXml/item3.xml><?xml version="1.0" encoding="utf-8"?>
@@ -8147,6 +8155,14 @@
 </file>
 
 <file path=customXml/itemProps1.xml><?xml version="1.0" encoding="utf-8"?>
+<ds:datastoreItem xmlns:ds="http://schemas.openxmlformats.org/officeDocument/2006/customXml" ds:itemID="{91C521DD-2673-4EE6-BB9B-DC5C3320FFBB}">
+  <ds:schemaRefs>
+    <ds:schemaRef ds:uri="http://schemas.microsoft.com/sharepoint/v3/contenttype/forms"/>
+  </ds:schemaRefs>
+</ds:datastoreItem>
+</file>
+
+<file path=customXml/itemProps2.xml><?xml version="1.0" encoding="utf-8"?>
 <ds:datastoreItem xmlns:ds="http://schemas.openxmlformats.org/officeDocument/2006/customXml" ds:itemID="{EDD1FC41-23C7-41B0-B5F9-BF4CD38AD2ED}">
   <ds:schemaRefs>
     <ds:schemaRef ds:uri="3c474641-ec36-472f-b125-6b1b0910eaa4"/>
@@ -8159,14 +8175,6 @@
     <ds:schemaRef ds:uri="http://schemas.microsoft.com/office/infopath/2007/PartnerControls"/>
     <ds:schemaRef ds:uri="http://schemas.openxmlformats.org/package/2006/metadata/core-properties"/>
     <ds:schemaRef ds:uri="http://www.w3.org/XML/1998/namespace"/>
-  </ds:schemaRefs>
-</ds:datastoreItem>
-</file>
-
-<file path=customXml/itemProps2.xml><?xml version="1.0" encoding="utf-8"?>
-<ds:datastoreItem xmlns:ds="http://schemas.openxmlformats.org/officeDocument/2006/customXml" ds:itemID="{91C521DD-2673-4EE6-BB9B-DC5C3320FFBB}">
-  <ds:schemaRefs>
-    <ds:schemaRef ds:uri="http://schemas.microsoft.com/sharepoint/v3/contenttype/forms"/>
   </ds:schemaRefs>
 </ds:datastoreItem>
 </file>

</xml_diff>

<commit_message>
Commit check for Zaman
</commit_message>
<xml_diff>
--- a/research_question_presentation_template.pptx
+++ b/research_question_presentation_template.pptx
@@ -4935,41 +4935,20 @@
           <a:p>
             <a:r>
               <a:rPr lang="en-GB" dirty="0"/>
-              <a:t>You have 5 minutes to present – be ready to share your screen, present slides in "full screen / presentation mode". Practice first. We can only offer you one opportunity to present your Research Question, so please </a:t>
-            </a:r>
-            <a:r>
-              <a:rPr lang="en-GB"/>
-              <a:t>make the most of this opportunity to help you pass coursework 2. </a:t>
-            </a:r>
+              <a:t>You have 5 minutes to present – be ready to share your screen, present slides in "full screen / presentation mode". Practice first. We can only offer you one opportunity to present your Research Question, so please make the most of this opportunity to help you pass coursework 2. </a:t>
+            </a:r>
+          </a:p>
+          <a:p>
             <a:endParaRPr lang="en-GB" dirty="0"/>
           </a:p>
           <a:p>
-            <a:endParaRPr lang="en-GB"/>
-          </a:p>
-          <a:p>
             <a:r>
               <a:rPr lang="en-GB" dirty="0">
                 <a:solidFill>
                   <a:srgbClr val="FF0000"/>
                 </a:solidFill>
               </a:rPr>
-              <a:t>Research Questions are dependent on the variables and datatypes you have in your assigned dataset. Before you define your Research Question, your dataset dsXXXX must match your assigned Dataset, I.e., did you </a:t>
-            </a:r>
-            <a:r>
-              <a:rPr lang="en-GB">
-                <a:solidFill>
-                  <a:srgbClr val="FF0000"/>
-                </a:solidFill>
-              </a:rPr>
-              <a:t>receive confirmation email about your allocation?</a:t>
-            </a:r>
-            <a:r>
-              <a:rPr lang="en-GB" dirty="0">
-                <a:solidFill>
-                  <a:srgbClr val="FF0000"/>
-                </a:solidFill>
-              </a:rPr>
-              <a:t> Your group number must be assigned to the dataset you are referencing here.</a:t>
+              <a:t>Research Questions are dependent on the variables and datatypes you have in your assigned dataset. Before you define your Research Question, your dataset dsXXXX must match your assigned Dataset, I.e., did you receive confirmation email about your allocation? Your group number must be assigned to the dataset you are referencing here.</a:t>
             </a:r>
             <a:endParaRPr lang="en-GB" dirty="0">
               <a:solidFill>
@@ -4979,7 +4958,7 @@
             </a:endParaRPr>
           </a:p>
           <a:p>
-            <a:endParaRPr lang="en-GB">
+            <a:endParaRPr lang="en-GB" dirty="0">
               <a:solidFill>
                 <a:srgbClr val="203232"/>
               </a:solidFill>
@@ -4988,12 +4967,8 @@
           </a:p>
           <a:p>
             <a:r>
-              <a:rPr lang="en-GB"/>
-              <a:t>The next slides give you three alternatives for defining your research question and hypotheses. Select </a:t>
-            </a:r>
-            <a:r>
               <a:rPr lang="en-GB" dirty="0"/>
-              <a:t>only </a:t>
+              <a:t>The next slides give you three alternatives for defining your research question and hypotheses. Select only </a:t>
             </a:r>
             <a:r>
               <a:rPr lang="en-GB" b="1" dirty="0"/>
@@ -5007,27 +4982,27 @@
           <a:p>
             <a:r>
               <a:rPr lang="en-GB" dirty="0"/>
-              <a:t>Before presenting DELETE all text that is either an instruction or an optionyou do not use (including this slide).   You can then enlarge your selection. Instructions for group sign up of presentation slots will be announced on Canvas and Slack. DO NOT SIGN UP unless you can attend. Ideally, all group members should attend; select one person to present, while others take notes. All group be ready to answer questions.  Any group not </a:t>
+              <a:t>Before presenting DELETE </a:t>
             </a:r>
             <a:r>
               <a:rPr lang="en-GB"/>
-              <a:t>presenting will miss the opportunity to check a critical part of coursework 2.   Practice presenting on Teams </a:t>
+              <a:t>all t ext</a:t>
             </a:r>
             <a:r>
               <a:rPr lang="en-GB" dirty="0"/>
-              <a:t>first.</a:t>
-            </a:r>
-            <a:endParaRPr lang="en-GB">
+              <a:t> that is either an instruction or an optionyou do not use (including this slide).   You can then enlarge your selection. Instructions for group sign up of presentation slots will be announced on Canvas and Slack. DO NOT SIGN UP unless you can attend. Ideally, all group members should attend; select one person to present, while others take notes. All group be ready to answer questions.  Any group not presenting will miss the opportunity to check a critical part of coursework 2.   Practice presenting on Teams first.</a:t>
+            </a:r>
+            <a:endParaRPr lang="en-GB" dirty="0">
               <a:cs typeface="Arial"/>
             </a:endParaRPr>
           </a:p>
           <a:p>
             <a:r>
-              <a:rPr lang="en-GB" b="1" i="1"/>
+              <a:rPr lang="en-GB" b="1" i="1" dirty="0"/>
               <a:t>We look forward to giving you feedback.  You will not be graded on this presentation but if you do not attend and you booked a space you are preventing someone else presenting and are going against our module values</a:t>
             </a:r>
             <a:r>
-              <a:rPr lang="en-GB"/>
+              <a:rPr lang="en-GB" dirty="0"/>
               <a:t>.  This will be reflected in your peer evaluation.</a:t>
             </a:r>
           </a:p>
@@ -7913,20 +7888,20 @@
 </file>
 
 <file path=customXml/item1.xml><?xml version="1.0" encoding="utf-8"?>
+<p:properties xmlns:p="http://schemas.microsoft.com/office/2006/metadata/properties" xmlns:xsi="http://www.w3.org/2001/XMLSchema-instance" xmlns:pc="http://schemas.microsoft.com/office/infopath/2007/PartnerControls">
+  <documentManagement>
+    <Information xmlns="4ad138b4-2b68-4b70-945d-07f8f18b1c9a" xsi:nil="true"/>
+  </documentManagement>
+</p:properties>
+</file>
+
+<file path=customXml/item2.xml><?xml version="1.0" encoding="utf-8"?>
 <?mso-contentType ?>
 <FormTemplates xmlns="http://schemas.microsoft.com/sharepoint/v3/contenttype/forms">
   <Display>DocumentLibraryForm</Display>
   <Edit>DocumentLibraryForm</Edit>
   <New>DocumentLibraryForm</New>
 </FormTemplates>
-</file>
-
-<file path=customXml/item2.xml><?xml version="1.0" encoding="utf-8"?>
-<p:properties xmlns:p="http://schemas.microsoft.com/office/2006/metadata/properties" xmlns:xsi="http://www.w3.org/2001/XMLSchema-instance" xmlns:pc="http://schemas.microsoft.com/office/infopath/2007/PartnerControls">
-  <documentManagement>
-    <Information xmlns="4ad138b4-2b68-4b70-945d-07f8f18b1c9a" xsi:nil="true"/>
-  </documentManagement>
-</p:properties>
 </file>
 
 <file path=customXml/item3.xml><?xml version="1.0" encoding="utf-8"?>
@@ -8155,14 +8130,6 @@
 </file>
 
 <file path=customXml/itemProps1.xml><?xml version="1.0" encoding="utf-8"?>
-<ds:datastoreItem xmlns:ds="http://schemas.openxmlformats.org/officeDocument/2006/customXml" ds:itemID="{91C521DD-2673-4EE6-BB9B-DC5C3320FFBB}">
-  <ds:schemaRefs>
-    <ds:schemaRef ds:uri="http://schemas.microsoft.com/sharepoint/v3/contenttype/forms"/>
-  </ds:schemaRefs>
-</ds:datastoreItem>
-</file>
-
-<file path=customXml/itemProps2.xml><?xml version="1.0" encoding="utf-8"?>
 <ds:datastoreItem xmlns:ds="http://schemas.openxmlformats.org/officeDocument/2006/customXml" ds:itemID="{EDD1FC41-23C7-41B0-B5F9-BF4CD38AD2ED}">
   <ds:schemaRefs>
     <ds:schemaRef ds:uri="3c474641-ec36-472f-b125-6b1b0910eaa4"/>
@@ -8175,6 +8142,14 @@
     <ds:schemaRef ds:uri="http://schemas.microsoft.com/office/infopath/2007/PartnerControls"/>
     <ds:schemaRef ds:uri="http://schemas.openxmlformats.org/package/2006/metadata/core-properties"/>
     <ds:schemaRef ds:uri="http://www.w3.org/XML/1998/namespace"/>
+  </ds:schemaRefs>
+</ds:datastoreItem>
+</file>
+
+<file path=customXml/itemProps2.xml><?xml version="1.0" encoding="utf-8"?>
+<ds:datastoreItem xmlns:ds="http://schemas.openxmlformats.org/officeDocument/2006/customXml" ds:itemID="{91C521DD-2673-4EE6-BB9B-DC5C3320FFBB}">
+  <ds:schemaRefs>
+    <ds:schemaRef ds:uri="http://schemas.microsoft.com/sharepoint/v3/contenttype/forms"/>
   </ds:schemaRefs>
 </ds:datastoreItem>
 </file>

</xml_diff>

<commit_message>
Updated Hypothesis statement as required
</commit_message>
<xml_diff>
--- a/research_question_presentation_template.pptx
+++ b/research_question_presentation_template.pptx
@@ -6724,7 +6724,7 @@
                 <a:latin typeface="Arial"/>
                 <a:cs typeface="Arial"/>
               </a:rPr>
-              <a:t>PS/G</a:t>
+              <a:t>Point Scored/Game</a:t>
             </a:r>
             <a:r>
               <a:rPr lang="en-GB" sz="2000" b="0" dirty="0">
@@ -6744,7 +6744,7 @@
                 <a:latin typeface="Arial"/>
                 <a:cs typeface="Arial"/>
               </a:rPr>
-              <a:t>MP</a:t>
+              <a:t>Minutes Played</a:t>
             </a:r>
             <a:r>
               <a:rPr lang="en-GB" sz="2000" b="0" dirty="0">
@@ -6842,7 +6842,7 @@
               <a:t> correlation </a:t>
             </a:r>
             <a:r>
-              <a:rPr lang="en-GB" sz="2000" b="0" dirty="0">
+              <a:rPr lang="en-GB" sz="2000" b="0">
                 <a:solidFill>
                   <a:srgbClr val="FF0000"/>
                 </a:solidFill>
@@ -6851,16 +6851,16 @@
               <a:t>between </a:t>
             </a:r>
             <a:r>
-              <a:rPr lang="en-GB" sz="2000" b="0" dirty="0">
+              <a:rPr lang="en-GB" sz="2000" b="0">
                 <a:solidFill>
                   <a:schemeClr val="accent4"/>
                 </a:solidFill>
                 <a:cs typeface="Arial"/>
               </a:rPr>
-              <a:t>PS/G</a:t>
-            </a:r>
-            <a:r>
-              <a:rPr lang="en-GB" sz="2000" b="0" dirty="0">
+              <a:t>Point Scored/Game</a:t>
+            </a:r>
+            <a:r>
+              <a:rPr lang="en-GB" sz="2000" b="0">
                 <a:solidFill>
                   <a:srgbClr val="FF0000"/>
                 </a:solidFill>
@@ -6869,16 +6869,16 @@
               <a:t> and </a:t>
             </a:r>
             <a:r>
-              <a:rPr lang="en-GB" sz="2000" b="0" dirty="0">
+              <a:rPr lang="en-GB" sz="2000" b="0">
                 <a:solidFill>
                   <a:schemeClr val="accent4"/>
                 </a:solidFill>
                 <a:cs typeface="Arial"/>
               </a:rPr>
-              <a:t>MP</a:t>
-            </a:r>
-            <a:r>
-              <a:rPr lang="en-GB" sz="2000" b="0" dirty="0">
+              <a:t>Minutes Played</a:t>
+            </a:r>
+            <a:r>
+              <a:rPr lang="en-GB" sz="2000" b="0">
                 <a:solidFill>
                   <a:srgbClr val="FF0000"/>
                 </a:solidFill>
@@ -6886,6 +6886,12 @@
               </a:rPr>
               <a:t>.</a:t>
             </a:r>
+            <a:endParaRPr lang="en-GB" sz="2000" b="0" dirty="0">
+              <a:solidFill>
+                <a:srgbClr val="FF0000"/>
+              </a:solidFill>
+              <a:cs typeface="Arial"/>
+            </a:endParaRPr>
           </a:p>
           <a:p>
             <a:pPr>
@@ -7888,23 +7894,6 @@
 </file>
 
 <file path=customXml/item1.xml><?xml version="1.0" encoding="utf-8"?>
-<p:properties xmlns:p="http://schemas.microsoft.com/office/2006/metadata/properties" xmlns:xsi="http://www.w3.org/2001/XMLSchema-instance" xmlns:pc="http://schemas.microsoft.com/office/infopath/2007/PartnerControls">
-  <documentManagement>
-    <Information xmlns="4ad138b4-2b68-4b70-945d-07f8f18b1c9a" xsi:nil="true"/>
-  </documentManagement>
-</p:properties>
-</file>
-
-<file path=customXml/item2.xml><?xml version="1.0" encoding="utf-8"?>
-<?mso-contentType ?>
-<FormTemplates xmlns="http://schemas.microsoft.com/sharepoint/v3/contenttype/forms">
-  <Display>DocumentLibraryForm</Display>
-  <Edit>DocumentLibraryForm</Edit>
-  <New>DocumentLibraryForm</New>
-</FormTemplates>
-</file>
-
-<file path=customXml/item3.xml><?xml version="1.0" encoding="utf-8"?>
 <ct:contentTypeSchema xmlns:ct="http://schemas.microsoft.com/office/2006/metadata/contentType" xmlns:ma="http://schemas.microsoft.com/office/2006/metadata/properties/metaAttributes" ct:_="" ma:_="" ma:contentTypeName="Document" ma:contentTypeID="0x01010026DBA85F447B164191BB36C258697B67" ma:contentTypeVersion="14" ma:contentTypeDescription="Create a new document." ma:contentTypeScope="" ma:versionID="ea511d05ca7f895fe9556935b5c9af34">
   <xsd:schema xmlns:xsd="http://www.w3.org/2001/XMLSchema" xmlns:xs="http://www.w3.org/2001/XMLSchema" xmlns:p="http://schemas.microsoft.com/office/2006/metadata/properties" xmlns:ns2="4ad138b4-2b68-4b70-945d-07f8f18b1c9a" xmlns:ns3="3c474641-ec36-472f-b125-6b1b0910eaa4" targetNamespace="http://schemas.microsoft.com/office/2006/metadata/properties" ma:root="true" ma:fieldsID="662270106d7a7e100bcac2c5f8d29899" ns2:_="" ns3:_="">
     <xsd:import namespace="4ad138b4-2b68-4b70-945d-07f8f18b1c9a"/>
@@ -8129,32 +8118,24 @@
 </ct:contentTypeSchema>
 </file>
 
-<file path=customXml/itemProps1.xml><?xml version="1.0" encoding="utf-8"?>
-<ds:datastoreItem xmlns:ds="http://schemas.openxmlformats.org/officeDocument/2006/customXml" ds:itemID="{EDD1FC41-23C7-41B0-B5F9-BF4CD38AD2ED}">
-  <ds:schemaRefs>
-    <ds:schemaRef ds:uri="3c474641-ec36-472f-b125-6b1b0910eaa4"/>
-    <ds:schemaRef ds:uri="4ad138b4-2b68-4b70-945d-07f8f18b1c9a"/>
-    <ds:schemaRef ds:uri="http://purl.org/dc/dcmitype/"/>
-    <ds:schemaRef ds:uri="http://purl.org/dc/elements/1.1/"/>
-    <ds:schemaRef ds:uri="http://purl.org/dc/terms/"/>
-    <ds:schemaRef ds:uri="http://schemas.microsoft.com/office/2006/documentManagement/types"/>
-    <ds:schemaRef ds:uri="http://schemas.microsoft.com/office/2006/metadata/properties"/>
-    <ds:schemaRef ds:uri="http://schemas.microsoft.com/office/infopath/2007/PartnerControls"/>
-    <ds:schemaRef ds:uri="http://schemas.openxmlformats.org/package/2006/metadata/core-properties"/>
-    <ds:schemaRef ds:uri="http://www.w3.org/XML/1998/namespace"/>
-  </ds:schemaRefs>
-</ds:datastoreItem>
+<file path=customXml/item2.xml><?xml version="1.0" encoding="utf-8"?>
+<?mso-contentType ?>
+<FormTemplates xmlns="http://schemas.microsoft.com/sharepoint/v3/contenttype/forms">
+  <Display>DocumentLibraryForm</Display>
+  <Edit>DocumentLibraryForm</Edit>
+  <New>DocumentLibraryForm</New>
+</FormTemplates>
 </file>
 
-<file path=customXml/itemProps2.xml><?xml version="1.0" encoding="utf-8"?>
-<ds:datastoreItem xmlns:ds="http://schemas.openxmlformats.org/officeDocument/2006/customXml" ds:itemID="{91C521DD-2673-4EE6-BB9B-DC5C3320FFBB}">
-  <ds:schemaRefs>
-    <ds:schemaRef ds:uri="http://schemas.microsoft.com/sharepoint/v3/contenttype/forms"/>
-  </ds:schemaRefs>
-</ds:datastoreItem>
+<file path=customXml/item3.xml><?xml version="1.0" encoding="utf-8"?>
+<p:properties xmlns:p="http://schemas.microsoft.com/office/2006/metadata/properties" xmlns:xsi="http://www.w3.org/2001/XMLSchema-instance" xmlns:pc="http://schemas.microsoft.com/office/infopath/2007/PartnerControls">
+  <documentManagement>
+    <Information xmlns="4ad138b4-2b68-4b70-945d-07f8f18b1c9a" xsi:nil="true"/>
+  </documentManagement>
+</p:properties>
 </file>
 
-<file path=customXml/itemProps3.xml><?xml version="1.0" encoding="utf-8"?>
+<file path=customXml/itemProps1.xml><?xml version="1.0" encoding="utf-8"?>
 <ds:datastoreItem xmlns:ds="http://schemas.openxmlformats.org/officeDocument/2006/customXml" ds:itemID="{421B8C57-903D-4D0E-8336-7B512F760CD1}">
   <ds:schemaRefs>
     <ds:schemaRef ds:uri="3c474641-ec36-472f-b125-6b1b0910eaa4"/>
@@ -8171,4 +8152,29 @@
     <ds:schemaRef ds:uri="http://www.w3.org/2001/XMLSchema"/>
   </ds:schemaRefs>
 </ds:datastoreItem>
+</file>
+
+<file path=customXml/itemProps2.xml><?xml version="1.0" encoding="utf-8"?>
+<ds:datastoreItem xmlns:ds="http://schemas.openxmlformats.org/officeDocument/2006/customXml" ds:itemID="{91C521DD-2673-4EE6-BB9B-DC5C3320FFBB}">
+  <ds:schemaRefs>
+    <ds:schemaRef ds:uri="http://schemas.microsoft.com/sharepoint/v3/contenttype/forms"/>
+  </ds:schemaRefs>
+</ds:datastoreItem>
+</file>
+
+<file path=customXml/itemProps3.xml><?xml version="1.0" encoding="utf-8"?>
+<ds:datastoreItem xmlns:ds="http://schemas.openxmlformats.org/officeDocument/2006/customXml" ds:itemID="{EDD1FC41-23C7-41B0-B5F9-BF4CD38AD2ED}">
+  <ds:schemaRefs>
+    <ds:schemaRef ds:uri="3c474641-ec36-472f-b125-6b1b0910eaa4"/>
+    <ds:schemaRef ds:uri="4ad138b4-2b68-4b70-945d-07f8f18b1c9a"/>
+    <ds:schemaRef ds:uri="http://purl.org/dc/dcmitype/"/>
+    <ds:schemaRef ds:uri="http://purl.org/dc/elements/1.1/"/>
+    <ds:schemaRef ds:uri="http://purl.org/dc/terms/"/>
+    <ds:schemaRef ds:uri="http://schemas.microsoft.com/office/2006/documentManagement/types"/>
+    <ds:schemaRef ds:uri="http://schemas.microsoft.com/office/2006/metadata/properties"/>
+    <ds:schemaRef ds:uri="http://schemas.microsoft.com/office/infopath/2007/PartnerControls"/>
+    <ds:schemaRef ds:uri="http://schemas.openxmlformats.org/package/2006/metadata/core-properties"/>
+    <ds:schemaRef ds:uri="http://www.w3.org/XML/1998/namespace"/>
+  </ds:schemaRefs>
+</ds:datastoreItem>
 </file>
</xml_diff>

<commit_message>
added detail to rq
</commit_message>
<xml_diff>
--- a/research_question_presentation_template.pptx
+++ b/research_question_presentation_template.pptx
@@ -1,22 +1,22 @@
 
 <file path=ppt/presentation.xml><?xml version="1.0" encoding="utf-8"?>
-<p:presentation xmlns:a="http://schemas.openxmlformats.org/drawingml/2006/main" xmlns:r="http://schemas.openxmlformats.org/officeDocument/2006/relationships" xmlns:p="http://schemas.openxmlformats.org/presentationml/2006/main" saveSubsetFonts="1">
+<p:presentation xmlns:a="http://schemas.openxmlformats.org/drawingml/2006/main" xmlns:r="http://schemas.openxmlformats.org/officeDocument/2006/relationships" xmlns:p="http://schemas.openxmlformats.org/presentationml/2006/main">
   <p:sldMasterIdLst>
-    <p:sldMasterId id="2147483648" r:id="rId4"/>
+    <p:sldMasterId id="2147483648" r:id="rId1"/>
   </p:sldMasterIdLst>
   <p:notesMasterIdLst>
-    <p:notesMasterId r:id="rId11"/>
+    <p:notesMasterId r:id="rId6"/>
   </p:notesMasterIdLst>
   <p:handoutMasterIdLst>
-    <p:handoutMasterId r:id="rId12"/>
+    <p:handoutMasterId r:id="rId10"/>
   </p:handoutMasterIdLst>
   <p:sldIdLst>
-    <p:sldId id="337" r:id="rId5"/>
-    <p:sldId id="289" r:id="rId6"/>
-    <p:sldId id="340" r:id="rId7"/>
-    <p:sldId id="329" r:id="rId8"/>
-    <p:sldId id="336" r:id="rId9"/>
-    <p:sldId id="341" r:id="rId10"/>
+    <p:sldId id="337" r:id="rId3"/>
+    <p:sldId id="289" r:id="rId4"/>
+    <p:sldId id="340" r:id="rId5"/>
+    <p:sldId id="329" r:id="rId7"/>
+    <p:sldId id="336" r:id="rId8"/>
+    <p:sldId id="341" r:id="rId9"/>
   </p:sldIdLst>
   <p:sldSz cx="12192000" cy="6858000"/>
   <p:notesSz cx="6858000" cy="9144000"/>
@@ -145,20 +145,8 @@
         </p15:guide>
       </p15:sldGuideLst>
     </p:ext>
-    <p:ext uri="{2D200454-40CA-4A62-9FC3-DE9A4176ACB9}">
-      <p15:notesGuideLst xmlns:p15="http://schemas.microsoft.com/office/powerpoint/2012/main"/>
-    </p:ext>
   </p:extLst>
 </p:presentation>
-</file>
-
-<file path=ppt/revisionInfo.xml><?xml version="1.0" encoding="utf-8"?>
-<p1510:revInfo xmlns:a="http://schemas.openxmlformats.org/drawingml/2006/main" xmlns:r="http://schemas.openxmlformats.org/officeDocument/2006/relationships" xmlns:p1510="http://schemas.microsoft.com/office/powerpoint/2015/10/main">
-  <p1510:revLst>
-    <p1510:client id="{27B1EB13-4B4A-3A65-7705-B39B10420BC6}" v="11" dt="2025-11-07T13:21:13.889"/>
-    <p1510:client id="{94404E7A-4EB2-D0DE-A758-3B2FEF7E6025}" v="1178" dt="2025-11-07T14:31:40.792"/>
-  </p1510:revLst>
-</p1510:revInfo>
 </file>
 
 <file path=ppt/handoutMasters/handoutMaster1.xml><?xml version="1.0" encoding="utf-8"?>
@@ -185,13 +173,7 @@
       </p:grpSpPr>
       <p:sp>
         <p:nvSpPr>
-          <p:cNvPr id="2" name="Header Placeholder 1">
-            <a:extLst>
-              <a:ext uri="{FF2B5EF4-FFF2-40B4-BE49-F238E27FC236}">
-                <a16:creationId xmlns:a16="http://schemas.microsoft.com/office/drawing/2014/main" id="{898966F2-21A1-4B2B-ADA6-AD0BB447B7CB}"/>
-              </a:ext>
-            </a:extLst>
-          </p:cNvPr>
+          <p:cNvPr id="2" name="Header Placeholder 1"/>
           <p:cNvSpPr>
             <a:spLocks noGrp="1"/>
           </p:cNvSpPr>
@@ -222,13 +204,7 @@
       </p:sp>
       <p:sp>
         <p:nvSpPr>
-          <p:cNvPr id="3" name="Date Placeholder 2">
-            <a:extLst>
-              <a:ext uri="{FF2B5EF4-FFF2-40B4-BE49-F238E27FC236}">
-                <a16:creationId xmlns:a16="http://schemas.microsoft.com/office/drawing/2014/main" id="{751468BB-CDF2-4507-B4EF-7B369D307A4D}"/>
-              </a:ext>
-            </a:extLst>
-          </p:cNvPr>
+          <p:cNvPr id="3" name="Date Placeholder 2"/>
           <p:cNvSpPr>
             <a:spLocks noGrp="1"/>
           </p:cNvSpPr>
@@ -255,8 +231,6 @@
           <a:p>
             <a:fld id="{93FAAC3A-BD1F-4A00-9099-74B95789FE00}" type="datetimeFigureOut">
               <a:rPr lang="en-GB" smtClean="0"/>
-              <a:pPr/>
-              <a:t>12/12/2025</a:t>
             </a:fld>
             <a:endParaRPr lang="en-GB"/>
           </a:p>
@@ -264,13 +238,7 @@
       </p:sp>
       <p:sp>
         <p:nvSpPr>
-          <p:cNvPr id="4" name="Footer Placeholder 3">
-            <a:extLst>
-              <a:ext uri="{FF2B5EF4-FFF2-40B4-BE49-F238E27FC236}">
-                <a16:creationId xmlns:a16="http://schemas.microsoft.com/office/drawing/2014/main" id="{904BCF7D-6037-48D3-84E5-56B8B0552143}"/>
-              </a:ext>
-            </a:extLst>
-          </p:cNvPr>
+          <p:cNvPr id="4" name="Footer Placeholder 3"/>
           <p:cNvSpPr>
             <a:spLocks noGrp="1"/>
           </p:cNvSpPr>
@@ -301,13 +269,7 @@
       </p:sp>
       <p:sp>
         <p:nvSpPr>
-          <p:cNvPr id="5" name="Slide Number Placeholder 4">
-            <a:extLst>
-              <a:ext uri="{FF2B5EF4-FFF2-40B4-BE49-F238E27FC236}">
-                <a16:creationId xmlns:a16="http://schemas.microsoft.com/office/drawing/2014/main" id="{D619E732-656C-4BB5-ACCB-1568C5C66DD7}"/>
-              </a:ext>
-            </a:extLst>
-          </p:cNvPr>
+          <p:cNvPr id="5" name="Slide Number Placeholder 4"/>
           <p:cNvSpPr>
             <a:spLocks noGrp="1"/>
           </p:cNvSpPr>
@@ -334,19 +296,12 @@
           <a:p>
             <a:fld id="{C29F51D9-0FEB-436E-9280-D6033F603547}" type="slidenum">
               <a:rPr lang="en-GB" smtClean="0"/>
-              <a:pPr/>
-              <a:t>‹#›</a:t>
             </a:fld>
             <a:endParaRPr lang="en-GB"/>
           </a:p>
         </p:txBody>
       </p:sp>
     </p:spTree>
-    <p:extLst>
-      <p:ext uri="{BB962C8B-B14F-4D97-AF65-F5344CB8AC3E}">
-        <p14:creationId xmlns:p14="http://schemas.microsoft.com/office/powerpoint/2010/main" val="2270584068"/>
-      </p:ext>
-    </p:extLst>
   </p:cSld>
   <p:clrMap bg1="lt1" tx1="dk1" bg2="lt2" tx2="dk2" accent1="accent1" accent2="accent2" accent3="accent3" accent4="accent4" accent5="accent5" accent6="accent6" hlink="hlink" folHlink="folHlink"/>
 </p:handoutMaster>
@@ -434,8 +389,6 @@
           <a:p>
             <a:fld id="{8E359C8A-39F6-4045-9163-4042C4C26B15}" type="datetimeFigureOut">
               <a:rPr lang="en-GB" smtClean="0"/>
-              <a:pPr/>
-              <a:t>12/12/2025</a:t>
             </a:fld>
             <a:endParaRPr lang="en-GB"/>
           </a:p>
@@ -502,6 +455,7 @@
               <a:rPr lang="en-US"/>
               <a:t>Click to edit Master text styles</a:t>
             </a:r>
+            <a:endParaRPr lang="en-US"/>
           </a:p>
           <a:p>
             <a:pPr lvl="1"/>
@@ -509,6 +463,7 @@
               <a:rPr lang="en-US"/>
               <a:t>Second level</a:t>
             </a:r>
+            <a:endParaRPr lang="en-US"/>
           </a:p>
           <a:p>
             <a:pPr lvl="2"/>
@@ -516,6 +471,7 @@
               <a:rPr lang="en-US"/>
               <a:t>Third level</a:t>
             </a:r>
+            <a:endParaRPr lang="en-US"/>
           </a:p>
           <a:p>
             <a:pPr lvl="3"/>
@@ -523,6 +479,7 @@
               <a:rPr lang="en-US"/>
               <a:t>Fourth level</a:t>
             </a:r>
+            <a:endParaRPr lang="en-US"/>
           </a:p>
           <a:p>
             <a:pPr lvl="4"/>
@@ -594,19 +551,12 @@
           <a:p>
             <a:fld id="{30370952-48CC-46D7-9FCD-59FAD40CC025}" type="slidenum">
               <a:rPr lang="en-GB" smtClean="0"/>
-              <a:pPr/>
-              <a:t>‹#›</a:t>
             </a:fld>
             <a:endParaRPr lang="en-GB"/>
           </a:p>
         </p:txBody>
       </p:sp>
     </p:spTree>
-    <p:extLst>
-      <p:ext uri="{BB962C8B-B14F-4D97-AF65-F5344CB8AC3E}">
-        <p14:creationId xmlns:p14="http://schemas.microsoft.com/office/powerpoint/2010/main" val="3010231721"/>
-      </p:ext>
-    </p:extLst>
   </p:cSld>
   <p:clrMap bg1="lt1" tx1="dk1" bg2="lt2" tx2="dk2" accent1="accent1" accent2="accent2" accent3="accent3" accent4="accent4" accent5="accent5" accent6="accent6" hlink="hlink" folHlink="folHlink"/>
   <p:notesStyle>
@@ -769,19 +719,12 @@
           <a:p>
             <a:fld id="{30370952-48CC-46D7-9FCD-59FAD40CC025}" type="slidenum">
               <a:rPr lang="en-GB" smtClean="0"/>
-              <a:pPr/>
-              <a:t>3</a:t>
             </a:fld>
             <a:endParaRPr lang="en-GB"/>
           </a:p>
         </p:txBody>
       </p:sp>
     </p:spTree>
-    <p:extLst>
-      <p:ext uri="{BB962C8B-B14F-4D97-AF65-F5344CB8AC3E}">
-        <p14:creationId xmlns:p14="http://schemas.microsoft.com/office/powerpoint/2010/main" val="3956718548"/>
-      </p:ext>
-    </p:extLst>
   </p:cSld>
   <p:clrMapOvr>
     <a:masterClrMapping/>
@@ -845,6 +788,7 @@
               <a:rPr lang="en-GB" dirty="0"/>
               <a:t> scale); OR are they just categorical/nominal (Items such as film names, cities, etc., that you can count numbers of occurrences?   You also need to understand whether the variable is either dependent or independent and this will vary according to the context. Independent variables may cause an effect, whereas the dependent variable might be effected by the independent variable.  Check the lecture notes on the RQ for more information and examples.  </a:t>
             </a:r>
+            <a:endParaRPr lang="en-GB" dirty="0"/>
           </a:p>
           <a:p>
             <a:endParaRPr lang="en-GB" dirty="0"/>
@@ -854,6 +798,7 @@
               <a:rPr lang="en-GB" dirty="0"/>
               <a:t>You will get only one opportunity to present your Research Question ahead of the submission date.  Have your questions ready, and be ready to take notes on feedback.</a:t>
             </a:r>
+            <a:endParaRPr lang="en-GB" dirty="0"/>
           </a:p>
         </p:txBody>
       </p:sp>
@@ -874,19 +819,12 @@
           <a:p>
             <a:fld id="{30370952-48CC-46D7-9FCD-59FAD40CC025}" type="slidenum">
               <a:rPr lang="en-GB" smtClean="0"/>
-              <a:pPr/>
-              <a:t>4</a:t>
             </a:fld>
             <a:endParaRPr lang="en-GB"/>
           </a:p>
         </p:txBody>
       </p:sp>
     </p:spTree>
-    <p:extLst>
-      <p:ext uri="{BB962C8B-B14F-4D97-AF65-F5344CB8AC3E}">
-        <p14:creationId xmlns:p14="http://schemas.microsoft.com/office/powerpoint/2010/main" val="2905941406"/>
-      </p:ext>
-    </p:extLst>
   </p:cSld>
   <p:clrMapOvr>
     <a:masterClrMapping/>
@@ -959,19 +897,12 @@
           <a:p>
             <a:fld id="{30370952-48CC-46D7-9FCD-59FAD40CC025}" type="slidenum">
               <a:rPr lang="en-GB" smtClean="0"/>
-              <a:pPr/>
-              <a:t>5</a:t>
             </a:fld>
             <a:endParaRPr lang="en-GB"/>
           </a:p>
         </p:txBody>
       </p:sp>
     </p:spTree>
-    <p:extLst>
-      <p:ext uri="{BB962C8B-B14F-4D97-AF65-F5344CB8AC3E}">
-        <p14:creationId xmlns:p14="http://schemas.microsoft.com/office/powerpoint/2010/main" val="2667984944"/>
-      </p:ext>
-    </p:extLst>
   </p:cSld>
   <p:clrMapOvr>
     <a:masterClrMapping/>
@@ -1044,19 +975,12 @@
           <a:p>
             <a:fld id="{30370952-48CC-46D7-9FCD-59FAD40CC025}" type="slidenum">
               <a:rPr lang="en-GB" smtClean="0"/>
-              <a:pPr/>
-              <a:t>6</a:t>
             </a:fld>
             <a:endParaRPr lang="en-GB"/>
           </a:p>
         </p:txBody>
       </p:sp>
     </p:spTree>
-    <p:extLst>
-      <p:ext uri="{BB962C8B-B14F-4D97-AF65-F5344CB8AC3E}">
-        <p14:creationId xmlns:p14="http://schemas.microsoft.com/office/powerpoint/2010/main" val="3939429285"/>
-      </p:ext>
-    </p:extLst>
   </p:cSld>
   <p:clrMapOvr>
     <a:masterClrMapping/>
@@ -1097,26 +1021,14 @@
       </p:grpSpPr>
       <p:pic>
         <p:nvPicPr>
-          <p:cNvPr id="4" name="Picture 3" descr="University of Hertfordshire logo">
-            <a:extLst>
-              <a:ext uri="{FF2B5EF4-FFF2-40B4-BE49-F238E27FC236}">
-                <a16:creationId xmlns:a16="http://schemas.microsoft.com/office/drawing/2014/main" id="{16E4BB13-0D32-AA4A-BF91-2B76A7C18242}"/>
-              </a:ext>
-            </a:extLst>
-          </p:cNvPr>
+          <p:cNvPr id="4" name="Picture 3" descr="University of Hertfordshire logo"/>
           <p:cNvPicPr>
             <a:picLocks noChangeAspect="1"/>
           </p:cNvPicPr>
           <p:nvPr userDrawn="1"/>
         </p:nvPicPr>
         <p:blipFill>
-          <a:blip r:embed="rId3">
-            <a:extLst>
-              <a:ext uri="{28A0092B-C50C-407E-A947-70E740481C1C}">
-                <a14:useLocalDpi xmlns:a14="http://schemas.microsoft.com/office/drawing/2010/main"/>
-              </a:ext>
-            </a:extLst>
-          </a:blip>
+          <a:blip r:embed="rId3"/>
           <a:stretch>
             <a:fillRect/>
           </a:stretch>
@@ -1132,11 +1044,6 @@
         </p:spPr>
       </p:pic>
     </p:spTree>
-    <p:extLst>
-      <p:ext uri="{BB962C8B-B14F-4D97-AF65-F5344CB8AC3E}">
-        <p14:creationId xmlns:p14="http://schemas.microsoft.com/office/powerpoint/2010/main" val="2758167382"/>
-      </p:ext>
-    </p:extLst>
   </p:cSld>
   <p:clrMapOvr>
     <a:masterClrMapping/>
@@ -1171,13 +1078,7 @@
       </p:grpSpPr>
       <p:sp>
         <p:nvSpPr>
-          <p:cNvPr id="3" name="Picture Placeholder 2">
-            <a:extLst>
-              <a:ext uri="{FF2B5EF4-FFF2-40B4-BE49-F238E27FC236}">
-                <a16:creationId xmlns:a16="http://schemas.microsoft.com/office/drawing/2014/main" id="{A307C322-846C-9045-AD91-A93C82FC5AAF}"/>
-              </a:ext>
-            </a:extLst>
-          </p:cNvPr>
+          <p:cNvPr id="3" name="Picture Placeholder 2"/>
           <p:cNvSpPr>
             <a:spLocks noGrp="1"/>
           </p:cNvSpPr>
@@ -1207,15 +1108,11 @@
               <a:rPr lang="en-US"/>
               <a:t>Picture</a:t>
             </a:r>
+            <a:endParaRPr lang="en-US"/>
           </a:p>
         </p:txBody>
       </p:sp>
     </p:spTree>
-    <p:extLst>
-      <p:ext uri="{BB962C8B-B14F-4D97-AF65-F5344CB8AC3E}">
-        <p14:creationId xmlns:p14="http://schemas.microsoft.com/office/powerpoint/2010/main" val="2920352145"/>
-      </p:ext>
-    </p:extLst>
   </p:cSld>
   <p:clrMapOvr>
     <a:masterClrMapping/>
@@ -1250,13 +1147,7 @@
       </p:grpSpPr>
       <p:sp>
         <p:nvSpPr>
-          <p:cNvPr id="9" name="Media Placeholder 8">
-            <a:extLst>
-              <a:ext uri="{FF2B5EF4-FFF2-40B4-BE49-F238E27FC236}">
-                <a16:creationId xmlns:a16="http://schemas.microsoft.com/office/drawing/2014/main" id="{9ABCF9A5-761F-434B-BBB5-D788CB1E79D8}"/>
-              </a:ext>
-            </a:extLst>
-          </p:cNvPr>
+          <p:cNvPr id="9" name="Media Placeholder 8"/>
           <p:cNvSpPr>
             <a:spLocks noGrp="1"/>
           </p:cNvSpPr>
@@ -1282,11 +1173,6 @@
         </p:txBody>
       </p:sp>
     </p:spTree>
-    <p:extLst>
-      <p:ext uri="{BB962C8B-B14F-4D97-AF65-F5344CB8AC3E}">
-        <p14:creationId xmlns:p14="http://schemas.microsoft.com/office/powerpoint/2010/main" val="3202809821"/>
-      </p:ext>
-    </p:extLst>
   </p:cSld>
   <p:clrMapOvr>
     <a:masterClrMapping/>
@@ -1295,7 +1181,7 @@
 </file>
 
 <file path=ppt/slideLayouts/slideLayout12.xml><?xml version="1.0" encoding="utf-8"?>
-<p:sldLayout xmlns:a="http://schemas.openxmlformats.org/drawingml/2006/main" xmlns:r="http://schemas.openxmlformats.org/officeDocument/2006/relationships" xmlns:p="http://schemas.openxmlformats.org/presentationml/2006/main" showMasterSp="0" preserve="1" userDrawn="1">
+<p:sldLayout xmlns:a="http://schemas.openxmlformats.org/drawingml/2006/main" xmlns:r="http://schemas.openxmlformats.org/officeDocument/2006/relationships" xmlns:p="http://schemas.openxmlformats.org/presentationml/2006/main" preserve="1" showMasterSp="0" userDrawn="1">
   <p:cSld name="Icons and text">
     <p:bg>
       <p:bgPr>
@@ -1321,13 +1207,7 @@
       </p:grpSpPr>
       <p:sp>
         <p:nvSpPr>
-          <p:cNvPr id="5" name="Footer Placeholder 4">
-            <a:extLst>
-              <a:ext uri="{FF2B5EF4-FFF2-40B4-BE49-F238E27FC236}">
-                <a16:creationId xmlns:a16="http://schemas.microsoft.com/office/drawing/2014/main" id="{962B6D5D-0892-4B4E-86D9-894852B1242C}"/>
-              </a:ext>
-            </a:extLst>
-          </p:cNvPr>
+          <p:cNvPr id="5" name="Footer Placeholder 4"/>
           <p:cNvSpPr>
             <a:spLocks noGrp="1"/>
           </p:cNvSpPr>
@@ -1344,18 +1224,13 @@
               <a:rPr lang="en-GB"/>
               <a:t>PRESENTATION TITLE (ADD VIA INSERT, HEADER &amp; FOOTER)</a:t>
             </a:r>
-          </a:p>
-        </p:txBody>
-      </p:sp>
-      <p:sp>
-        <p:nvSpPr>
-          <p:cNvPr id="6" name="Slide Number Placeholder 5">
-            <a:extLst>
-              <a:ext uri="{FF2B5EF4-FFF2-40B4-BE49-F238E27FC236}">
-                <a16:creationId xmlns:a16="http://schemas.microsoft.com/office/drawing/2014/main" id="{3B7428FC-C061-4730-9EA5-A52A00413991}"/>
-              </a:ext>
-            </a:extLst>
-          </p:cNvPr>
+            <a:endParaRPr lang="en-GB"/>
+          </a:p>
+        </p:txBody>
+      </p:sp>
+      <p:sp>
+        <p:nvSpPr>
+          <p:cNvPr id="6" name="Slide Number Placeholder 5"/>
           <p:cNvSpPr>
             <a:spLocks noGrp="1"/>
           </p:cNvSpPr>
@@ -1370,8 +1245,6 @@
           <a:p>
             <a:fld id="{E4D355CA-84B7-41B1-B164-8BB439CC7C6B}" type="slidenum">
               <a:rPr lang="en-GB" smtClean="0"/>
-              <a:pPr/>
-              <a:t>‹#›</a:t>
             </a:fld>
             <a:endParaRPr lang="en-GB"/>
           </a:p>
@@ -1379,13 +1252,7 @@
       </p:sp>
       <p:sp>
         <p:nvSpPr>
-          <p:cNvPr id="7" name="Rectangle 6">
-            <a:extLst>
-              <a:ext uri="{FF2B5EF4-FFF2-40B4-BE49-F238E27FC236}">
-                <a16:creationId xmlns:a16="http://schemas.microsoft.com/office/drawing/2014/main" id="{850AA271-B0BA-42CD-A544-17AAB1FA2EEA}"/>
-              </a:ext>
-            </a:extLst>
-          </p:cNvPr>
+          <p:cNvPr id="7" name="Rectangle 6"/>
           <p:cNvSpPr/>
           <p:nvPr userDrawn="1"/>
         </p:nvSpPr>
@@ -1431,13 +1298,7 @@
       </p:sp>
       <p:sp>
         <p:nvSpPr>
-          <p:cNvPr id="16" name="Content Placeholder 2">
-            <a:extLst>
-              <a:ext uri="{FF2B5EF4-FFF2-40B4-BE49-F238E27FC236}">
-                <a16:creationId xmlns:a16="http://schemas.microsoft.com/office/drawing/2014/main" id="{699880E3-4DE3-A642-9738-DF49DDCC9AC5}"/>
-              </a:ext>
-            </a:extLst>
-          </p:cNvPr>
+          <p:cNvPr id="16" name="Content Placeholder 2"/>
           <p:cNvSpPr>
             <a:spLocks noGrp="1"/>
           </p:cNvSpPr>
@@ -1483,18 +1344,13 @@
               <a:rPr lang="en-GB"/>
               <a:t>Add Text</a:t>
             </a:r>
-          </a:p>
-        </p:txBody>
-      </p:sp>
-      <p:sp>
-        <p:nvSpPr>
-          <p:cNvPr id="17" name="Content Placeholder 2">
-            <a:extLst>
-              <a:ext uri="{FF2B5EF4-FFF2-40B4-BE49-F238E27FC236}">
-                <a16:creationId xmlns:a16="http://schemas.microsoft.com/office/drawing/2014/main" id="{CF37D495-D835-8E4B-A177-5E12F893DDCA}"/>
-              </a:ext>
-            </a:extLst>
-          </p:cNvPr>
+            <a:endParaRPr lang="en-GB"/>
+          </a:p>
+        </p:txBody>
+      </p:sp>
+      <p:sp>
+        <p:nvSpPr>
+          <p:cNvPr id="17" name="Content Placeholder 2"/>
           <p:cNvSpPr>
             <a:spLocks noGrp="1"/>
           </p:cNvSpPr>
@@ -1521,13 +1377,12 @@
                 <a:spcPts val="0"/>
               </a:spcBef>
               <a:spcAft>
-                <a:spcPts val="992"/>
+                <a:spcPts val="990"/>
               </a:spcAft>
               <a:buClrTx/>
               <a:buSzTx/>
               <a:buFont typeface="Arial" panose="020B0604020202020204" pitchFamily="34" charset="0"/>
               <a:buNone/>
-              <a:tabLst/>
               <a:defRPr lang="en-US" b="0">
                 <a:solidFill>
                   <a:srgbClr val="203232"/>
@@ -1557,13 +1412,12 @@
                 <a:spcPts val="0"/>
               </a:spcBef>
               <a:spcAft>
-                <a:spcPts val="992"/>
+                <a:spcPts val="990"/>
               </a:spcAft>
               <a:buClrTx/>
               <a:buSzTx/>
               <a:buFont typeface="Arial" panose="020B0604020202020204" pitchFamily="34" charset="0"/>
               <a:buNone/>
-              <a:tabLst/>
               <a:defRPr/>
             </a:pPr>
             <a:r>
@@ -1580,13 +1434,7 @@
       </p:sp>
       <p:sp>
         <p:nvSpPr>
-          <p:cNvPr id="18" name="Content Placeholder 2">
-            <a:extLst>
-              <a:ext uri="{FF2B5EF4-FFF2-40B4-BE49-F238E27FC236}">
-                <a16:creationId xmlns:a16="http://schemas.microsoft.com/office/drawing/2014/main" id="{A6804C7E-983C-9246-90C0-AF8A0CE2CA84}"/>
-              </a:ext>
-            </a:extLst>
-          </p:cNvPr>
+          <p:cNvPr id="18" name="Content Placeholder 2"/>
           <p:cNvSpPr>
             <a:spLocks noGrp="1"/>
           </p:cNvSpPr>
@@ -1613,13 +1461,12 @@
                 <a:spcPts val="0"/>
               </a:spcBef>
               <a:spcAft>
-                <a:spcPts val="992"/>
+                <a:spcPts val="990"/>
               </a:spcAft>
               <a:buClrTx/>
               <a:buSzTx/>
               <a:buFont typeface="Arial" panose="020B0604020202020204" pitchFamily="34" charset="0"/>
               <a:buNone/>
-              <a:tabLst/>
               <a:defRPr lang="en-US" b="0">
                 <a:solidFill>
                   <a:srgbClr val="203232"/>
@@ -1649,13 +1496,12 @@
                 <a:spcPts val="0"/>
               </a:spcBef>
               <a:spcAft>
-                <a:spcPts val="992"/>
+                <a:spcPts val="990"/>
               </a:spcAft>
               <a:buClrTx/>
               <a:buSzTx/>
               <a:buFont typeface="Arial" panose="020B0604020202020204" pitchFamily="34" charset="0"/>
               <a:buNone/>
-              <a:tabLst/>
               <a:defRPr/>
             </a:pPr>
             <a:r>
@@ -1666,18 +1512,13 @@
               <a:rPr lang="en-US"/>
               <a:t>Text</a:t>
             </a:r>
-          </a:p>
-        </p:txBody>
-      </p:sp>
-      <p:sp>
-        <p:nvSpPr>
-          <p:cNvPr id="8" name="Picture Placeholder 7">
-            <a:extLst>
-              <a:ext uri="{FF2B5EF4-FFF2-40B4-BE49-F238E27FC236}">
-                <a16:creationId xmlns:a16="http://schemas.microsoft.com/office/drawing/2014/main" id="{84410427-8F1D-7541-9C05-AFDD3531678D}"/>
-              </a:ext>
-            </a:extLst>
-          </p:cNvPr>
+            <a:endParaRPr lang="en-US"/>
+          </a:p>
+        </p:txBody>
+      </p:sp>
+      <p:sp>
+        <p:nvSpPr>
+          <p:cNvPr id="8" name="Picture Placeholder 7"/>
           <p:cNvSpPr>
             <a:spLocks noGrp="1"/>
           </p:cNvSpPr>
@@ -1701,13 +1542,7 @@
       </p:sp>
       <p:sp>
         <p:nvSpPr>
-          <p:cNvPr id="20" name="Picture Placeholder 7">
-            <a:extLst>
-              <a:ext uri="{FF2B5EF4-FFF2-40B4-BE49-F238E27FC236}">
-                <a16:creationId xmlns:a16="http://schemas.microsoft.com/office/drawing/2014/main" id="{8B7D5964-7A97-5742-8717-CCB747F84A08}"/>
-              </a:ext>
-            </a:extLst>
-          </p:cNvPr>
+          <p:cNvPr id="20" name="Picture Placeholder 7"/>
           <p:cNvSpPr>
             <a:spLocks noGrp="1"/>
           </p:cNvSpPr>
@@ -1731,13 +1566,7 @@
       </p:sp>
       <p:sp>
         <p:nvSpPr>
-          <p:cNvPr id="21" name="Picture Placeholder 7">
-            <a:extLst>
-              <a:ext uri="{FF2B5EF4-FFF2-40B4-BE49-F238E27FC236}">
-                <a16:creationId xmlns:a16="http://schemas.microsoft.com/office/drawing/2014/main" id="{344933FE-A401-A841-9AC3-B75285AA32D2}"/>
-              </a:ext>
-            </a:extLst>
-          </p:cNvPr>
+          <p:cNvPr id="21" name="Picture Placeholder 7"/>
           <p:cNvSpPr>
             <a:spLocks noGrp="1"/>
           </p:cNvSpPr>
@@ -1760,11 +1589,6 @@
         </p:txBody>
       </p:sp>
     </p:spTree>
-    <p:extLst>
-      <p:ext uri="{BB962C8B-B14F-4D97-AF65-F5344CB8AC3E}">
-        <p14:creationId xmlns:p14="http://schemas.microsoft.com/office/powerpoint/2010/main" val="3611631665"/>
-      </p:ext>
-    </p:extLst>
   </p:cSld>
   <p:clrMapOvr>
     <a:masterClrMapping/>
@@ -1799,28 +1623,18 @@
       </p:grpSpPr>
       <p:pic>
         <p:nvPicPr>
-          <p:cNvPr id="7" name="Picture 6">
-            <a:extLst>
-              <a:ext uri="{FF2B5EF4-FFF2-40B4-BE49-F238E27FC236}">
-                <a16:creationId xmlns:a16="http://schemas.microsoft.com/office/drawing/2014/main" id="{EE2CE188-32E7-4242-9E44-E8055FC030CC}"/>
-              </a:ext>
-            </a:extLst>
-          </p:cNvPr>
+          <p:cNvPr id="7" name="Picture 6"/>
           <p:cNvPicPr>
             <a:picLocks noChangeAspect="1"/>
           </p:cNvPicPr>
           <p:nvPr userDrawn="1"/>
         </p:nvPicPr>
         <p:blipFill>
-          <a:blip r:embed="rId2" cstate="print">
-            <a:extLst>
-              <a:ext uri="{28A0092B-C50C-407E-A947-70E740481C1C}">
-                <a14:useLocalDpi xmlns:a14="http://schemas.microsoft.com/office/drawing/2010/main"/>
-              </a:ext>
-            </a:extLst>
-          </a:blip>
+          <a:blip r:embed="rId2" cstate="print"/>
           <a:srcRect/>
-          <a:stretch/>
+          <a:stretch>
+            <a:fillRect/>
+          </a:stretch>
         </p:blipFill>
         <p:spPr>
           <a:xfrm>
@@ -1834,13 +1648,7 @@
       </p:pic>
       <p:sp>
         <p:nvSpPr>
-          <p:cNvPr id="2" name="Title 1">
-            <a:extLst>
-              <a:ext uri="{FF2B5EF4-FFF2-40B4-BE49-F238E27FC236}">
-                <a16:creationId xmlns:a16="http://schemas.microsoft.com/office/drawing/2014/main" id="{7381B53D-9933-445F-9B68-E730EB38A5A9}"/>
-              </a:ext>
-            </a:extLst>
-          </p:cNvPr>
+          <p:cNvPr id="2" name="Title 1"/>
           <p:cNvSpPr>
             <a:spLocks noGrp="1"/>
           </p:cNvSpPr>
@@ -1863,7 +1671,7 @@
               <a:lnSpc>
                 <a:spcPct val="100000"/>
               </a:lnSpc>
-              <a:defRPr lang="en-GB" sz="7386" spc="-300" baseline="0" dirty="0">
+              <a:defRPr lang="en-GB" sz="7385" spc="-300" baseline="0" dirty="0">
                 <a:solidFill>
                   <a:schemeClr val="bg1"/>
                 </a:solidFill>
@@ -1873,7 +1681,7 @@
           <a:p>
             <a:pPr lvl="0">
               <a:lnSpc>
-                <a:spcPts val="8186"/>
+                <a:spcPts val="8185"/>
               </a:lnSpc>
             </a:pPr>
             <a:r>
@@ -1886,13 +1694,7 @@
       </p:sp>
       <p:sp>
         <p:nvSpPr>
-          <p:cNvPr id="5" name="Footer Placeholder 4">
-            <a:extLst>
-              <a:ext uri="{FF2B5EF4-FFF2-40B4-BE49-F238E27FC236}">
-                <a16:creationId xmlns:a16="http://schemas.microsoft.com/office/drawing/2014/main" id="{CA2BE80A-BFEC-E24A-B510-73A571F1F04F}"/>
-              </a:ext>
-            </a:extLst>
-          </p:cNvPr>
+          <p:cNvPr id="5" name="Footer Placeholder 4"/>
           <p:cNvSpPr>
             <a:spLocks noGrp="1"/>
           </p:cNvSpPr>
@@ -1934,13 +1736,7 @@
       </p:sp>
       <p:sp>
         <p:nvSpPr>
-          <p:cNvPr id="6" name="Slide Number Placeholder 5">
-            <a:extLst>
-              <a:ext uri="{FF2B5EF4-FFF2-40B4-BE49-F238E27FC236}">
-                <a16:creationId xmlns:a16="http://schemas.microsoft.com/office/drawing/2014/main" id="{8E5B25B4-144A-5B4A-8EAD-2022412DF2F1}"/>
-              </a:ext>
-            </a:extLst>
-          </p:cNvPr>
+          <p:cNvPr id="6" name="Slide Number Placeholder 5"/>
           <p:cNvSpPr>
             <a:spLocks noGrp="1"/>
           </p:cNvSpPr>
@@ -1970,19 +1766,12 @@
           <a:p>
             <a:fld id="{E4D355CA-84B7-41B1-B164-8BB439CC7C6B}" type="slidenum">
               <a:rPr lang="en-GB" smtClean="0"/>
-              <a:pPr/>
-              <a:t>‹#›</a:t>
             </a:fld>
             <a:endParaRPr lang="en-GB"/>
           </a:p>
         </p:txBody>
       </p:sp>
     </p:spTree>
-    <p:extLst>
-      <p:ext uri="{BB962C8B-B14F-4D97-AF65-F5344CB8AC3E}">
-        <p14:creationId xmlns:p14="http://schemas.microsoft.com/office/powerpoint/2010/main" val="862170164"/>
-      </p:ext>
-    </p:extLst>
   </p:cSld>
   <p:clrMapOvr>
     <a:masterClrMapping/>
@@ -2017,13 +1806,7 @@
       </p:grpSpPr>
       <p:sp>
         <p:nvSpPr>
-          <p:cNvPr id="2" name="Title 1">
-            <a:extLst>
-              <a:ext uri="{FF2B5EF4-FFF2-40B4-BE49-F238E27FC236}">
-                <a16:creationId xmlns:a16="http://schemas.microsoft.com/office/drawing/2014/main" id="{7381B53D-9933-445F-9B68-E730EB38A5A9}"/>
-              </a:ext>
-            </a:extLst>
-          </p:cNvPr>
+          <p:cNvPr id="2" name="Title 1"/>
           <p:cNvSpPr>
             <a:spLocks noGrp="1"/>
           </p:cNvSpPr>
@@ -2064,13 +1847,7 @@
       </p:sp>
       <p:sp>
         <p:nvSpPr>
-          <p:cNvPr id="3" name="Subtitle 2">
-            <a:extLst>
-              <a:ext uri="{FF2B5EF4-FFF2-40B4-BE49-F238E27FC236}">
-                <a16:creationId xmlns:a16="http://schemas.microsoft.com/office/drawing/2014/main" id="{E2C6B9F5-608F-4534-96F0-C3A5E1A638A6}"/>
-              </a:ext>
-            </a:extLst>
-          </p:cNvPr>
+          <p:cNvPr id="3" name="Subtitle 2"/>
           <p:cNvSpPr>
             <a:spLocks noGrp="1"/>
           </p:cNvSpPr>
@@ -2141,13 +1918,7 @@
       </p:sp>
       <p:sp>
         <p:nvSpPr>
-          <p:cNvPr id="5" name="Footer Placeholder 4">
-            <a:extLst>
-              <a:ext uri="{FF2B5EF4-FFF2-40B4-BE49-F238E27FC236}">
-                <a16:creationId xmlns:a16="http://schemas.microsoft.com/office/drawing/2014/main" id="{0540E7B9-9AC6-4E42-A931-6FF91E6494A1}"/>
-              </a:ext>
-            </a:extLst>
-          </p:cNvPr>
+          <p:cNvPr id="5" name="Footer Placeholder 4"/>
           <p:cNvSpPr>
             <a:spLocks noGrp="1"/>
           </p:cNvSpPr>
@@ -2189,13 +1960,7 @@
       </p:sp>
       <p:sp>
         <p:nvSpPr>
-          <p:cNvPr id="6" name="Slide Number Placeholder 5">
-            <a:extLst>
-              <a:ext uri="{FF2B5EF4-FFF2-40B4-BE49-F238E27FC236}">
-                <a16:creationId xmlns:a16="http://schemas.microsoft.com/office/drawing/2014/main" id="{FB16D645-6420-4785-8316-43EF780FA589}"/>
-              </a:ext>
-            </a:extLst>
-          </p:cNvPr>
+          <p:cNvPr id="6" name="Slide Number Placeholder 5"/>
           <p:cNvSpPr>
             <a:spLocks noGrp="1"/>
           </p:cNvSpPr>
@@ -2225,8 +1990,6 @@
           <a:p>
             <a:fld id="{E4D355CA-84B7-41B1-B164-8BB439CC7C6B}" type="slidenum">
               <a:rPr lang="en-GB" smtClean="0"/>
-              <a:pPr/>
-              <a:t>‹#›</a:t>
             </a:fld>
             <a:endParaRPr lang="en-GB"/>
           </a:p>
@@ -2234,26 +1997,14 @@
       </p:sp>
       <p:pic>
         <p:nvPicPr>
-          <p:cNvPr id="8" name="Picture 7" descr="A picture containing drawing&#10;&#10;Description automatically generated">
-            <a:extLst>
-              <a:ext uri="{FF2B5EF4-FFF2-40B4-BE49-F238E27FC236}">
-                <a16:creationId xmlns:a16="http://schemas.microsoft.com/office/drawing/2014/main" id="{BCCF2CA0-CCE3-4304-8F31-4D1CC50BCBDE}"/>
-              </a:ext>
-            </a:extLst>
-          </p:cNvPr>
+          <p:cNvPr id="8" name="Picture 7" descr="A picture containing drawing&#10;&#10;Description automatically generated"/>
           <p:cNvPicPr>
             <a:picLocks noChangeAspect="1"/>
           </p:cNvPicPr>
           <p:nvPr userDrawn="1"/>
         </p:nvPicPr>
         <p:blipFill>
-          <a:blip r:embed="rId2" cstate="print">
-            <a:extLst>
-              <a:ext uri="{28A0092B-C50C-407E-A947-70E740481C1C}">
-                <a14:useLocalDpi xmlns:a14="http://schemas.microsoft.com/office/drawing/2010/main"/>
-              </a:ext>
-            </a:extLst>
-          </a:blip>
+          <a:blip r:embed="rId2" cstate="print"/>
           <a:stretch>
             <a:fillRect/>
           </a:stretch>
@@ -2269,11 +2020,6 @@
         </p:spPr>
       </p:pic>
     </p:spTree>
-    <p:extLst>
-      <p:ext uri="{BB962C8B-B14F-4D97-AF65-F5344CB8AC3E}">
-        <p14:creationId xmlns:p14="http://schemas.microsoft.com/office/powerpoint/2010/main" val="1713616173"/>
-      </p:ext>
-    </p:extLst>
   </p:cSld>
   <p:clrMapOvr>
     <a:masterClrMapping/>
@@ -2308,13 +2054,7 @@
       </p:grpSpPr>
       <p:sp>
         <p:nvSpPr>
-          <p:cNvPr id="3" name="Subtitle 2">
-            <a:extLst>
-              <a:ext uri="{FF2B5EF4-FFF2-40B4-BE49-F238E27FC236}">
-                <a16:creationId xmlns:a16="http://schemas.microsoft.com/office/drawing/2014/main" id="{E2C6B9F5-608F-4534-96F0-C3A5E1A638A6}"/>
-              </a:ext>
-            </a:extLst>
-          </p:cNvPr>
+          <p:cNvPr id="3" name="Subtitle 2"/>
           <p:cNvSpPr>
             <a:spLocks noGrp="1"/>
           </p:cNvSpPr>
@@ -2385,13 +2125,7 @@
       </p:sp>
       <p:sp>
         <p:nvSpPr>
-          <p:cNvPr id="5" name="Footer Placeholder 4">
-            <a:extLst>
-              <a:ext uri="{FF2B5EF4-FFF2-40B4-BE49-F238E27FC236}">
-                <a16:creationId xmlns:a16="http://schemas.microsoft.com/office/drawing/2014/main" id="{0540E7B9-9AC6-4E42-A931-6FF91E6494A1}"/>
-              </a:ext>
-            </a:extLst>
-          </p:cNvPr>
+          <p:cNvPr id="5" name="Footer Placeholder 4"/>
           <p:cNvSpPr>
             <a:spLocks noGrp="1"/>
           </p:cNvSpPr>
@@ -2423,18 +2157,13 @@
               <a:rPr lang="en-GB"/>
               <a:t>PRESENTATION TITLE (ADD VIA INSERT, HEADER &amp; FOOTER)</a:t>
             </a:r>
-          </a:p>
-        </p:txBody>
-      </p:sp>
-      <p:sp>
-        <p:nvSpPr>
-          <p:cNvPr id="6" name="Slide Number Placeholder 5">
-            <a:extLst>
-              <a:ext uri="{FF2B5EF4-FFF2-40B4-BE49-F238E27FC236}">
-                <a16:creationId xmlns:a16="http://schemas.microsoft.com/office/drawing/2014/main" id="{FB16D645-6420-4785-8316-43EF780FA589}"/>
-              </a:ext>
-            </a:extLst>
-          </p:cNvPr>
+            <a:endParaRPr lang="en-GB"/>
+          </a:p>
+        </p:txBody>
+      </p:sp>
+      <p:sp>
+        <p:nvSpPr>
+          <p:cNvPr id="6" name="Slide Number Placeholder 5"/>
           <p:cNvSpPr>
             <a:spLocks noGrp="1"/>
           </p:cNvSpPr>
@@ -2464,8 +2193,6 @@
           <a:p>
             <a:fld id="{E4D355CA-84B7-41B1-B164-8BB439CC7C6B}" type="slidenum">
               <a:rPr lang="en-GB" smtClean="0"/>
-              <a:pPr/>
-              <a:t>‹#›</a:t>
             </a:fld>
             <a:endParaRPr lang="en-GB"/>
           </a:p>
@@ -2473,13 +2200,7 @@
       </p:sp>
       <p:sp>
         <p:nvSpPr>
-          <p:cNvPr id="9" name="Title 1">
-            <a:extLst>
-              <a:ext uri="{FF2B5EF4-FFF2-40B4-BE49-F238E27FC236}">
-                <a16:creationId xmlns:a16="http://schemas.microsoft.com/office/drawing/2014/main" id="{E9449821-0D0D-644D-97A3-D56097A9C6DA}"/>
-              </a:ext>
-            </a:extLst>
-          </p:cNvPr>
+          <p:cNvPr id="9" name="Title 1"/>
           <p:cNvSpPr>
             <a:spLocks noGrp="1"/>
           </p:cNvSpPr>
@@ -2520,13 +2241,7 @@
       </p:sp>
       <p:sp>
         <p:nvSpPr>
-          <p:cNvPr id="10" name="Rectangle 9">
-            <a:extLst>
-              <a:ext uri="{FF2B5EF4-FFF2-40B4-BE49-F238E27FC236}">
-                <a16:creationId xmlns:a16="http://schemas.microsoft.com/office/drawing/2014/main" id="{44F6EB17-8019-7B4E-B53C-76B057A7C31F}"/>
-              </a:ext>
-            </a:extLst>
-          </p:cNvPr>
+          <p:cNvPr id="10" name="Rectangle 9"/>
           <p:cNvSpPr/>
           <p:nvPr userDrawn="1"/>
         </p:nvSpPr>
@@ -2576,13 +2291,7 @@
       </p:sp>
       <p:pic>
         <p:nvPicPr>
-          <p:cNvPr id="11" name="Picture 10">
-            <a:extLst>
-              <a:ext uri="{FF2B5EF4-FFF2-40B4-BE49-F238E27FC236}">
-                <a16:creationId xmlns:a16="http://schemas.microsoft.com/office/drawing/2014/main" id="{0503EF50-F00F-9643-BE53-F0A5272FC4B2}"/>
-              </a:ext>
-            </a:extLst>
-          </p:cNvPr>
+          <p:cNvPr id="11" name="Picture 10"/>
           <p:cNvPicPr>
             <a:picLocks noChangeAspect="1"/>
           </p:cNvPicPr>
@@ -2605,11 +2314,6 @@
         </p:spPr>
       </p:pic>
     </p:spTree>
-    <p:extLst>
-      <p:ext uri="{BB962C8B-B14F-4D97-AF65-F5344CB8AC3E}">
-        <p14:creationId xmlns:p14="http://schemas.microsoft.com/office/powerpoint/2010/main" val="4108207832"/>
-      </p:ext>
-    </p:extLst>
   </p:cSld>
   <p:clrMapOvr>
     <a:masterClrMapping/>
@@ -2644,13 +2348,7 @@
       </p:grpSpPr>
       <p:sp>
         <p:nvSpPr>
-          <p:cNvPr id="2" name="Title 1">
-            <a:extLst>
-              <a:ext uri="{FF2B5EF4-FFF2-40B4-BE49-F238E27FC236}">
-                <a16:creationId xmlns:a16="http://schemas.microsoft.com/office/drawing/2014/main" id="{A1AAFE49-0143-472F-897B-A7DAB87AB4E4}"/>
-              </a:ext>
-            </a:extLst>
-          </p:cNvPr>
+          <p:cNvPr id="2" name="Title 1"/>
           <p:cNvSpPr>
             <a:spLocks noGrp="1"/>
           </p:cNvSpPr>
@@ -2673,13 +2371,7 @@
       </p:sp>
       <p:sp>
         <p:nvSpPr>
-          <p:cNvPr id="3" name="Content Placeholder 2">
-            <a:extLst>
-              <a:ext uri="{FF2B5EF4-FFF2-40B4-BE49-F238E27FC236}">
-                <a16:creationId xmlns:a16="http://schemas.microsoft.com/office/drawing/2014/main" id="{981FBDFA-876B-4255-A301-F62F1EDD8D66}"/>
-              </a:ext>
-            </a:extLst>
-          </p:cNvPr>
+          <p:cNvPr id="3" name="Content Placeholder 2"/>
           <p:cNvSpPr>
             <a:spLocks noGrp="1"/>
           </p:cNvSpPr>
@@ -2728,18 +2420,13 @@
               <a:rPr lang="en-GB"/>
               <a:t>Add Text</a:t>
             </a:r>
-          </a:p>
-        </p:txBody>
-      </p:sp>
-      <p:sp>
-        <p:nvSpPr>
-          <p:cNvPr id="4" name="Content Placeholder 3">
-            <a:extLst>
-              <a:ext uri="{FF2B5EF4-FFF2-40B4-BE49-F238E27FC236}">
-                <a16:creationId xmlns:a16="http://schemas.microsoft.com/office/drawing/2014/main" id="{46F0C709-1F3D-4B13-A290-4041A33FB10E}"/>
-              </a:ext>
-            </a:extLst>
-          </p:cNvPr>
+            <a:endParaRPr lang="en-GB"/>
+          </a:p>
+        </p:txBody>
+      </p:sp>
+      <p:sp>
+        <p:nvSpPr>
+          <p:cNvPr id="4" name="Content Placeholder 3"/>
           <p:cNvSpPr>
             <a:spLocks noGrp="1"/>
           </p:cNvSpPr>
@@ -2766,13 +2453,12 @@
                 <a:spcPts val="0"/>
               </a:spcBef>
               <a:spcAft>
-                <a:spcPts val="992"/>
+                <a:spcPts val="990"/>
               </a:spcAft>
               <a:buClrTx/>
               <a:buSzTx/>
               <a:buFont typeface="Arial" panose="020B0604020202020204" pitchFamily="34" charset="0"/>
               <a:buNone/>
-              <a:tabLst/>
               <a:defRPr lang="en-US" b="0" dirty="0" smtClean="0">
                 <a:solidFill>
                   <a:srgbClr val="203232"/>
@@ -2805,13 +2491,12 @@
                 <a:spcPts val="0"/>
               </a:spcBef>
               <a:spcAft>
-                <a:spcPts val="992"/>
+                <a:spcPts val="990"/>
               </a:spcAft>
               <a:buClrTx/>
               <a:buSzTx/>
               <a:buFont typeface="Arial" panose="020B0604020202020204" pitchFamily="34" charset="0"/>
               <a:buNone/>
-              <a:tabLst/>
               <a:defRPr/>
             </a:pPr>
             <a:r>
@@ -2824,13 +2509,7 @@
       </p:sp>
       <p:sp>
         <p:nvSpPr>
-          <p:cNvPr id="6" name="Footer Placeholder 5">
-            <a:extLst>
-              <a:ext uri="{FF2B5EF4-FFF2-40B4-BE49-F238E27FC236}">
-                <a16:creationId xmlns:a16="http://schemas.microsoft.com/office/drawing/2014/main" id="{60A8C9C5-E913-47B9-82DE-196768E6D657}"/>
-              </a:ext>
-            </a:extLst>
-          </p:cNvPr>
+          <p:cNvPr id="6" name="Footer Placeholder 5"/>
           <p:cNvSpPr>
             <a:spLocks noGrp="1"/>
           </p:cNvSpPr>
@@ -2847,18 +2526,13 @@
               <a:rPr lang="en-GB"/>
               <a:t>PRESENTATION TITLE (ADD VIA INSERT, HEADER &amp; FOOTER)</a:t>
             </a:r>
-          </a:p>
-        </p:txBody>
-      </p:sp>
-      <p:sp>
-        <p:nvSpPr>
-          <p:cNvPr id="7" name="Slide Number Placeholder 6">
-            <a:extLst>
-              <a:ext uri="{FF2B5EF4-FFF2-40B4-BE49-F238E27FC236}">
-                <a16:creationId xmlns:a16="http://schemas.microsoft.com/office/drawing/2014/main" id="{E1558F66-ECA3-4B00-A383-8D2B86217C93}"/>
-              </a:ext>
-            </a:extLst>
-          </p:cNvPr>
+            <a:endParaRPr lang="en-GB"/>
+          </a:p>
+        </p:txBody>
+      </p:sp>
+      <p:sp>
+        <p:nvSpPr>
+          <p:cNvPr id="7" name="Slide Number Placeholder 6"/>
           <p:cNvSpPr>
             <a:spLocks noGrp="1"/>
           </p:cNvSpPr>
@@ -2873,8 +2547,6 @@
           <a:p>
             <a:fld id="{E4D355CA-84B7-41B1-B164-8BB439CC7C6B}" type="slidenum">
               <a:rPr lang="en-GB" smtClean="0"/>
-              <a:pPr/>
-              <a:t>‹#›</a:t>
             </a:fld>
             <a:endParaRPr lang="en-GB"/>
           </a:p>
@@ -2882,13 +2554,7 @@
       </p:sp>
       <p:sp>
         <p:nvSpPr>
-          <p:cNvPr id="8" name="Rectangle 7">
-            <a:extLst>
-              <a:ext uri="{FF2B5EF4-FFF2-40B4-BE49-F238E27FC236}">
-                <a16:creationId xmlns:a16="http://schemas.microsoft.com/office/drawing/2014/main" id="{62A19DAE-53D8-4F04-A4B9-B6EDFC23886D}"/>
-              </a:ext>
-            </a:extLst>
-          </p:cNvPr>
+          <p:cNvPr id="8" name="Rectangle 7"/>
           <p:cNvSpPr/>
           <p:nvPr userDrawn="1"/>
         </p:nvSpPr>
@@ -2937,36 +2603,10 @@
         </p:txBody>
       </p:sp>
     </p:spTree>
-    <p:extLst>
-      <p:ext uri="{BB962C8B-B14F-4D97-AF65-F5344CB8AC3E}">
-        <p14:creationId xmlns:p14="http://schemas.microsoft.com/office/powerpoint/2010/main" val="1288463762"/>
-      </p:ext>
-    </p:extLst>
   </p:cSld>
   <p:clrMapOvr>
     <a:masterClrMapping/>
   </p:clrMapOvr>
-  <p:extLst>
-    <p:ext uri="{DCECCB84-F9BA-43D5-87BE-67443E8EF086}">
-      <p15:sldGuideLst xmlns:p15="http://schemas.microsoft.com/office/powerpoint/2012/main">
-        <p15:guide id="2" pos="6805" userDrawn="1">
-          <p15:clr>
-            <a:srgbClr val="FBAE40"/>
-          </p15:clr>
-        </p15:guide>
-        <p15:guide id="3" pos="3989" userDrawn="1">
-          <p15:clr>
-            <a:srgbClr val="FBAE40"/>
-          </p15:clr>
-        </p15:guide>
-        <p15:guide id="4" pos="3705" userDrawn="1">
-          <p15:clr>
-            <a:srgbClr val="FBAE40"/>
-          </p15:clr>
-        </p15:guide>
-      </p15:sldGuideLst>
-    </p:ext>
-  </p:extLst>
 </p:sldLayout>
 </file>
 
@@ -2997,13 +2637,7 @@
       </p:grpSpPr>
       <p:sp>
         <p:nvSpPr>
-          <p:cNvPr id="2" name="Title 1">
-            <a:extLst>
-              <a:ext uri="{FF2B5EF4-FFF2-40B4-BE49-F238E27FC236}">
-                <a16:creationId xmlns:a16="http://schemas.microsoft.com/office/drawing/2014/main" id="{A4DE70B5-BA04-4DB3-853D-A1C05ADF828C}"/>
-              </a:ext>
-            </a:extLst>
-          </p:cNvPr>
+          <p:cNvPr id="2" name="Title 1"/>
           <p:cNvSpPr>
             <a:spLocks noGrp="1"/>
           </p:cNvSpPr>
@@ -3026,13 +2660,7 @@
       </p:sp>
       <p:sp>
         <p:nvSpPr>
-          <p:cNvPr id="3" name="Content Placeholder 2">
-            <a:extLst>
-              <a:ext uri="{FF2B5EF4-FFF2-40B4-BE49-F238E27FC236}">
-                <a16:creationId xmlns:a16="http://schemas.microsoft.com/office/drawing/2014/main" id="{70440712-862D-4568-80A4-86117B896766}"/>
-              </a:ext>
-            </a:extLst>
-          </p:cNvPr>
+          <p:cNvPr id="3" name="Content Placeholder 2"/>
           <p:cNvSpPr>
             <a:spLocks noGrp="1"/>
           </p:cNvSpPr>
@@ -3078,18 +2706,13 @@
               <a:rPr lang="en-GB"/>
               <a:t>Add Text</a:t>
             </a:r>
-          </a:p>
-        </p:txBody>
-      </p:sp>
-      <p:sp>
-        <p:nvSpPr>
-          <p:cNvPr id="5" name="Footer Placeholder 4">
-            <a:extLst>
-              <a:ext uri="{FF2B5EF4-FFF2-40B4-BE49-F238E27FC236}">
-                <a16:creationId xmlns:a16="http://schemas.microsoft.com/office/drawing/2014/main" id="{962B6D5D-0892-4B4E-86D9-894852B1242C}"/>
-              </a:ext>
-            </a:extLst>
-          </p:cNvPr>
+            <a:endParaRPr lang="en-GB"/>
+          </a:p>
+        </p:txBody>
+      </p:sp>
+      <p:sp>
+        <p:nvSpPr>
+          <p:cNvPr id="5" name="Footer Placeholder 4"/>
           <p:cNvSpPr>
             <a:spLocks noGrp="1"/>
           </p:cNvSpPr>
@@ -3106,18 +2729,13 @@
               <a:rPr lang="en-GB"/>
               <a:t>PRESENTATION TITLE (ADD VIA INSERT, HEADER &amp; FOOTER)</a:t>
             </a:r>
-          </a:p>
-        </p:txBody>
-      </p:sp>
-      <p:sp>
-        <p:nvSpPr>
-          <p:cNvPr id="6" name="Slide Number Placeholder 5">
-            <a:extLst>
-              <a:ext uri="{FF2B5EF4-FFF2-40B4-BE49-F238E27FC236}">
-                <a16:creationId xmlns:a16="http://schemas.microsoft.com/office/drawing/2014/main" id="{3B7428FC-C061-4730-9EA5-A52A00413991}"/>
-              </a:ext>
-            </a:extLst>
-          </p:cNvPr>
+            <a:endParaRPr lang="en-GB"/>
+          </a:p>
+        </p:txBody>
+      </p:sp>
+      <p:sp>
+        <p:nvSpPr>
+          <p:cNvPr id="6" name="Slide Number Placeholder 5"/>
           <p:cNvSpPr>
             <a:spLocks noGrp="1"/>
           </p:cNvSpPr>
@@ -3132,8 +2750,6 @@
           <a:p>
             <a:fld id="{E4D355CA-84B7-41B1-B164-8BB439CC7C6B}" type="slidenum">
               <a:rPr lang="en-GB" smtClean="0"/>
-              <a:pPr/>
-              <a:t>‹#›</a:t>
             </a:fld>
             <a:endParaRPr lang="en-GB"/>
           </a:p>
@@ -3141,13 +2757,7 @@
       </p:sp>
       <p:sp>
         <p:nvSpPr>
-          <p:cNvPr id="7" name="Rectangle 6">
-            <a:extLst>
-              <a:ext uri="{FF2B5EF4-FFF2-40B4-BE49-F238E27FC236}">
-                <a16:creationId xmlns:a16="http://schemas.microsoft.com/office/drawing/2014/main" id="{850AA271-B0BA-42CD-A544-17AAB1FA2EEA}"/>
-              </a:ext>
-            </a:extLst>
-          </p:cNvPr>
+          <p:cNvPr id="7" name="Rectangle 6"/>
           <p:cNvSpPr/>
           <p:nvPr userDrawn="1"/>
         </p:nvSpPr>
@@ -3192,11 +2802,6 @@
         </p:txBody>
       </p:sp>
     </p:spTree>
-    <p:extLst>
-      <p:ext uri="{BB962C8B-B14F-4D97-AF65-F5344CB8AC3E}">
-        <p14:creationId xmlns:p14="http://schemas.microsoft.com/office/powerpoint/2010/main" val="1221322189"/>
-      </p:ext>
-    </p:extLst>
   </p:cSld>
   <p:clrMapOvr>
     <a:masterClrMapping/>
@@ -3231,13 +2836,7 @@
       </p:grpSpPr>
       <p:sp>
         <p:nvSpPr>
-          <p:cNvPr id="2" name="Title 1">
-            <a:extLst>
-              <a:ext uri="{FF2B5EF4-FFF2-40B4-BE49-F238E27FC236}">
-                <a16:creationId xmlns:a16="http://schemas.microsoft.com/office/drawing/2014/main" id="{A4DE70B5-BA04-4DB3-853D-A1C05ADF828C}"/>
-              </a:ext>
-            </a:extLst>
-          </p:cNvPr>
+          <p:cNvPr id="2" name="Title 1"/>
           <p:cNvSpPr>
             <a:spLocks noGrp="1"/>
           </p:cNvSpPr>
@@ -3265,13 +2864,7 @@
       </p:sp>
       <p:sp>
         <p:nvSpPr>
-          <p:cNvPr id="3" name="Content Placeholder 2">
-            <a:extLst>
-              <a:ext uri="{FF2B5EF4-FFF2-40B4-BE49-F238E27FC236}">
-                <a16:creationId xmlns:a16="http://schemas.microsoft.com/office/drawing/2014/main" id="{70440712-862D-4568-80A4-86117B896766}"/>
-              </a:ext>
-            </a:extLst>
-          </p:cNvPr>
+          <p:cNvPr id="3" name="Content Placeholder 2"/>
           <p:cNvSpPr>
             <a:spLocks noGrp="1"/>
           </p:cNvSpPr>
@@ -3317,18 +2910,13 @@
               <a:rPr lang="en-GB"/>
               <a:t>Add Text</a:t>
             </a:r>
-          </a:p>
-        </p:txBody>
-      </p:sp>
-      <p:sp>
-        <p:nvSpPr>
-          <p:cNvPr id="6" name="Slide Number Placeholder 5">
-            <a:extLst>
-              <a:ext uri="{FF2B5EF4-FFF2-40B4-BE49-F238E27FC236}">
-                <a16:creationId xmlns:a16="http://schemas.microsoft.com/office/drawing/2014/main" id="{3B7428FC-C061-4730-9EA5-A52A00413991}"/>
-              </a:ext>
-            </a:extLst>
-          </p:cNvPr>
+            <a:endParaRPr lang="en-GB"/>
+          </a:p>
+        </p:txBody>
+      </p:sp>
+      <p:sp>
+        <p:nvSpPr>
+          <p:cNvPr id="6" name="Slide Number Placeholder 5"/>
           <p:cNvSpPr>
             <a:spLocks noGrp="1"/>
           </p:cNvSpPr>
@@ -3343,8 +2931,6 @@
           <a:p>
             <a:fld id="{E4D355CA-84B7-41B1-B164-8BB439CC7C6B}" type="slidenum">
               <a:rPr lang="en-GB" smtClean="0"/>
-              <a:pPr/>
-              <a:t>‹#›</a:t>
             </a:fld>
             <a:endParaRPr lang="en-GB"/>
           </a:p>
@@ -3352,13 +2938,7 @@
       </p:sp>
       <p:sp>
         <p:nvSpPr>
-          <p:cNvPr id="7" name="Rectangle 6">
-            <a:extLst>
-              <a:ext uri="{FF2B5EF4-FFF2-40B4-BE49-F238E27FC236}">
-                <a16:creationId xmlns:a16="http://schemas.microsoft.com/office/drawing/2014/main" id="{850AA271-B0BA-42CD-A544-17AAB1FA2EEA}"/>
-              </a:ext>
-            </a:extLst>
-          </p:cNvPr>
+          <p:cNvPr id="7" name="Rectangle 6"/>
           <p:cNvSpPr/>
           <p:nvPr userDrawn="1"/>
         </p:nvSpPr>
@@ -3403,11 +2983,6 @@
         </p:txBody>
       </p:sp>
     </p:spTree>
-    <p:extLst>
-      <p:ext uri="{BB962C8B-B14F-4D97-AF65-F5344CB8AC3E}">
-        <p14:creationId xmlns:p14="http://schemas.microsoft.com/office/powerpoint/2010/main" val="1055730519"/>
-      </p:ext>
-    </p:extLst>
   </p:cSld>
   <p:clrMapOvr>
     <a:masterClrMapping/>
@@ -3442,13 +3017,7 @@
       </p:grpSpPr>
       <p:sp>
         <p:nvSpPr>
-          <p:cNvPr id="6" name="Slide Number Placeholder 5">
-            <a:extLst>
-              <a:ext uri="{FF2B5EF4-FFF2-40B4-BE49-F238E27FC236}">
-                <a16:creationId xmlns:a16="http://schemas.microsoft.com/office/drawing/2014/main" id="{3B7428FC-C061-4730-9EA5-A52A00413991}"/>
-              </a:ext>
-            </a:extLst>
-          </p:cNvPr>
+          <p:cNvPr id="6" name="Slide Number Placeholder 5"/>
           <p:cNvSpPr>
             <a:spLocks noGrp="1"/>
           </p:cNvSpPr>
@@ -3471,8 +3040,6 @@
           <a:p>
             <a:fld id="{E4D355CA-84B7-41B1-B164-8BB439CC7C6B}" type="slidenum">
               <a:rPr lang="en-GB" smtClean="0"/>
-              <a:pPr/>
-              <a:t>‹#›</a:t>
             </a:fld>
             <a:endParaRPr lang="en-GB"/>
           </a:p>
@@ -3480,13 +3047,7 @@
       </p:sp>
       <p:sp>
         <p:nvSpPr>
-          <p:cNvPr id="8" name="Content Placeholder 2">
-            <a:extLst>
-              <a:ext uri="{FF2B5EF4-FFF2-40B4-BE49-F238E27FC236}">
-                <a16:creationId xmlns:a16="http://schemas.microsoft.com/office/drawing/2014/main" id="{B09D4C03-E8B1-644E-949B-F7AF91181833}"/>
-              </a:ext>
-            </a:extLst>
-          </p:cNvPr>
+          <p:cNvPr id="8" name="Content Placeholder 2"/>
           <p:cNvSpPr>
             <a:spLocks noGrp="1"/>
           </p:cNvSpPr>
@@ -3553,13 +3114,7 @@
       </p:sp>
       <p:sp>
         <p:nvSpPr>
-          <p:cNvPr id="5" name="Title 1">
-            <a:extLst>
-              <a:ext uri="{FF2B5EF4-FFF2-40B4-BE49-F238E27FC236}">
-                <a16:creationId xmlns:a16="http://schemas.microsoft.com/office/drawing/2014/main" id="{02EDA17D-AAE6-954F-93C6-90B8D7B80BD1}"/>
-              </a:ext>
-            </a:extLst>
-          </p:cNvPr>
+          <p:cNvPr id="5" name="Title 1"/>
           <p:cNvSpPr>
             <a:spLocks noGrp="1"/>
           </p:cNvSpPr>
@@ -3594,11 +3149,6 @@
         </p:txBody>
       </p:sp>
     </p:spTree>
-    <p:extLst>
-      <p:ext uri="{BB962C8B-B14F-4D97-AF65-F5344CB8AC3E}">
-        <p14:creationId xmlns:p14="http://schemas.microsoft.com/office/powerpoint/2010/main" val="1840620986"/>
-      </p:ext>
-    </p:extLst>
   </p:cSld>
   <p:clrMapOvr>
     <a:masterClrMapping/>
@@ -3633,13 +3183,7 @@
       </p:grpSpPr>
       <p:sp>
         <p:nvSpPr>
-          <p:cNvPr id="2" name="Title 1">
-            <a:extLst>
-              <a:ext uri="{FF2B5EF4-FFF2-40B4-BE49-F238E27FC236}">
-                <a16:creationId xmlns:a16="http://schemas.microsoft.com/office/drawing/2014/main" id="{A1AAFE49-0143-472F-897B-A7DAB87AB4E4}"/>
-              </a:ext>
-            </a:extLst>
-          </p:cNvPr>
+          <p:cNvPr id="2" name="Title 1"/>
           <p:cNvSpPr>
             <a:spLocks noGrp="1"/>
           </p:cNvSpPr>
@@ -3662,13 +3206,7 @@
       </p:sp>
       <p:sp>
         <p:nvSpPr>
-          <p:cNvPr id="4" name="Content Placeholder 3">
-            <a:extLst>
-              <a:ext uri="{FF2B5EF4-FFF2-40B4-BE49-F238E27FC236}">
-                <a16:creationId xmlns:a16="http://schemas.microsoft.com/office/drawing/2014/main" id="{46F0C709-1F3D-4B13-A290-4041A33FB10E}"/>
-              </a:ext>
-            </a:extLst>
-          </p:cNvPr>
+          <p:cNvPr id="4" name="Content Placeholder 3"/>
           <p:cNvSpPr>
             <a:spLocks noGrp="1"/>
           </p:cNvSpPr>
@@ -3723,13 +3261,7 @@
       </p:sp>
       <p:sp>
         <p:nvSpPr>
-          <p:cNvPr id="6" name="Footer Placeholder 5">
-            <a:extLst>
-              <a:ext uri="{FF2B5EF4-FFF2-40B4-BE49-F238E27FC236}">
-                <a16:creationId xmlns:a16="http://schemas.microsoft.com/office/drawing/2014/main" id="{60A8C9C5-E913-47B9-82DE-196768E6D657}"/>
-              </a:ext>
-            </a:extLst>
-          </p:cNvPr>
+          <p:cNvPr id="6" name="Footer Placeholder 5"/>
           <p:cNvSpPr>
             <a:spLocks noGrp="1"/>
           </p:cNvSpPr>
@@ -3746,18 +3278,13 @@
               <a:rPr lang="en-GB"/>
               <a:t>PRESENTATION TITLE (ADD VIA INSERT, HEADER &amp; FOOTER)</a:t>
             </a:r>
-          </a:p>
-        </p:txBody>
-      </p:sp>
-      <p:sp>
-        <p:nvSpPr>
-          <p:cNvPr id="7" name="Slide Number Placeholder 6">
-            <a:extLst>
-              <a:ext uri="{FF2B5EF4-FFF2-40B4-BE49-F238E27FC236}">
-                <a16:creationId xmlns:a16="http://schemas.microsoft.com/office/drawing/2014/main" id="{E1558F66-ECA3-4B00-A383-8D2B86217C93}"/>
-              </a:ext>
-            </a:extLst>
-          </p:cNvPr>
+            <a:endParaRPr lang="en-GB"/>
+          </a:p>
+        </p:txBody>
+      </p:sp>
+      <p:sp>
+        <p:nvSpPr>
+          <p:cNvPr id="7" name="Slide Number Placeholder 6"/>
           <p:cNvSpPr>
             <a:spLocks noGrp="1"/>
           </p:cNvSpPr>
@@ -3772,8 +3299,6 @@
           <a:p>
             <a:fld id="{E4D355CA-84B7-41B1-B164-8BB439CC7C6B}" type="slidenum">
               <a:rPr lang="en-GB" smtClean="0"/>
-              <a:pPr/>
-              <a:t>‹#›</a:t>
             </a:fld>
             <a:endParaRPr lang="en-GB"/>
           </a:p>
@@ -3781,13 +3306,7 @@
       </p:sp>
       <p:sp>
         <p:nvSpPr>
-          <p:cNvPr id="10" name="Picture Placeholder 9">
-            <a:extLst>
-              <a:ext uri="{FF2B5EF4-FFF2-40B4-BE49-F238E27FC236}">
-                <a16:creationId xmlns:a16="http://schemas.microsoft.com/office/drawing/2014/main" id="{874043F1-6F14-49BD-83CA-12B559ABC101}"/>
-              </a:ext>
-            </a:extLst>
-          </p:cNvPr>
+          <p:cNvPr id="10" name="Picture Placeholder 9"/>
           <p:cNvSpPr>
             <a:spLocks noGrp="1"/>
           </p:cNvSpPr>
@@ -3811,13 +3330,7 @@
       </p:sp>
       <p:sp>
         <p:nvSpPr>
-          <p:cNvPr id="11" name="Rectangle 10">
-            <a:extLst>
-              <a:ext uri="{FF2B5EF4-FFF2-40B4-BE49-F238E27FC236}">
-                <a16:creationId xmlns:a16="http://schemas.microsoft.com/office/drawing/2014/main" id="{4B51C537-0174-43E5-8B81-C80AF1D06831}"/>
-              </a:ext>
-            </a:extLst>
-          </p:cNvPr>
+          <p:cNvPr id="11" name="Rectangle 10"/>
           <p:cNvSpPr/>
           <p:nvPr userDrawn="1"/>
         </p:nvSpPr>
@@ -3862,11 +3375,6 @@
         </p:txBody>
       </p:sp>
     </p:spTree>
-    <p:extLst>
-      <p:ext uri="{BB962C8B-B14F-4D97-AF65-F5344CB8AC3E}">
-        <p14:creationId xmlns:p14="http://schemas.microsoft.com/office/powerpoint/2010/main" val="2534113713"/>
-      </p:ext>
-    </p:extLst>
   </p:cSld>
   <p:clrMapOvr>
     <a:masterClrMapping/>
@@ -3901,13 +3409,7 @@
       </p:grpSpPr>
       <p:sp>
         <p:nvSpPr>
-          <p:cNvPr id="2" name="Title 1">
-            <a:extLst>
-              <a:ext uri="{FF2B5EF4-FFF2-40B4-BE49-F238E27FC236}">
-                <a16:creationId xmlns:a16="http://schemas.microsoft.com/office/drawing/2014/main" id="{A1AAFE49-0143-472F-897B-A7DAB87AB4E4}"/>
-              </a:ext>
-            </a:extLst>
-          </p:cNvPr>
+          <p:cNvPr id="2" name="Title 1"/>
           <p:cNvSpPr>
             <a:spLocks noGrp="1"/>
           </p:cNvSpPr>
@@ -3930,13 +3432,7 @@
       </p:sp>
       <p:sp>
         <p:nvSpPr>
-          <p:cNvPr id="6" name="Footer Placeholder 5">
-            <a:extLst>
-              <a:ext uri="{FF2B5EF4-FFF2-40B4-BE49-F238E27FC236}">
-                <a16:creationId xmlns:a16="http://schemas.microsoft.com/office/drawing/2014/main" id="{60A8C9C5-E913-47B9-82DE-196768E6D657}"/>
-              </a:ext>
-            </a:extLst>
-          </p:cNvPr>
+          <p:cNvPr id="6" name="Footer Placeholder 5"/>
           <p:cNvSpPr>
             <a:spLocks noGrp="1"/>
           </p:cNvSpPr>
@@ -3953,18 +3449,13 @@
               <a:rPr lang="en-GB"/>
               <a:t>PRESENTATION TITLE (ADD VIA INSERT, HEADER &amp; FOOTER)</a:t>
             </a:r>
-          </a:p>
-        </p:txBody>
-      </p:sp>
-      <p:sp>
-        <p:nvSpPr>
-          <p:cNvPr id="7" name="Slide Number Placeholder 6">
-            <a:extLst>
-              <a:ext uri="{FF2B5EF4-FFF2-40B4-BE49-F238E27FC236}">
-                <a16:creationId xmlns:a16="http://schemas.microsoft.com/office/drawing/2014/main" id="{E1558F66-ECA3-4B00-A383-8D2B86217C93}"/>
-              </a:ext>
-            </a:extLst>
-          </p:cNvPr>
+            <a:endParaRPr lang="en-GB"/>
+          </a:p>
+        </p:txBody>
+      </p:sp>
+      <p:sp>
+        <p:nvSpPr>
+          <p:cNvPr id="7" name="Slide Number Placeholder 6"/>
           <p:cNvSpPr>
             <a:spLocks noGrp="1"/>
           </p:cNvSpPr>
@@ -3979,8 +3470,6 @@
           <a:p>
             <a:fld id="{E4D355CA-84B7-41B1-B164-8BB439CC7C6B}" type="slidenum">
               <a:rPr lang="en-GB" smtClean="0"/>
-              <a:pPr/>
-              <a:t>‹#›</a:t>
             </a:fld>
             <a:endParaRPr lang="en-GB"/>
           </a:p>
@@ -3988,13 +3477,7 @@
       </p:sp>
       <p:sp>
         <p:nvSpPr>
-          <p:cNvPr id="8" name="Rectangle 7">
-            <a:extLst>
-              <a:ext uri="{FF2B5EF4-FFF2-40B4-BE49-F238E27FC236}">
-                <a16:creationId xmlns:a16="http://schemas.microsoft.com/office/drawing/2014/main" id="{039FCF96-B7D6-4CCD-A4AE-46A67249D3BD}"/>
-              </a:ext>
-            </a:extLst>
-          </p:cNvPr>
+          <p:cNvPr id="8" name="Rectangle 7"/>
           <p:cNvSpPr/>
           <p:nvPr userDrawn="1"/>
         </p:nvSpPr>
@@ -4040,13 +3523,7 @@
       </p:sp>
       <p:sp>
         <p:nvSpPr>
-          <p:cNvPr id="10" name="Content Placeholder 9">
-            <a:extLst>
-              <a:ext uri="{FF2B5EF4-FFF2-40B4-BE49-F238E27FC236}">
-                <a16:creationId xmlns:a16="http://schemas.microsoft.com/office/drawing/2014/main" id="{741F3B7A-B2BF-40FC-8EB2-F1C37D316488}"/>
-              </a:ext>
-            </a:extLst>
-          </p:cNvPr>
+          <p:cNvPr id="10" name="Content Placeholder 9"/>
           <p:cNvSpPr>
             <a:spLocks noGrp="1"/>
           </p:cNvSpPr>
@@ -4101,13 +3578,7 @@
       </p:sp>
       <p:sp>
         <p:nvSpPr>
-          <p:cNvPr id="9" name="Content Placeholder 9">
-            <a:extLst>
-              <a:ext uri="{FF2B5EF4-FFF2-40B4-BE49-F238E27FC236}">
-                <a16:creationId xmlns:a16="http://schemas.microsoft.com/office/drawing/2014/main" id="{75B7A667-B99F-7A41-AAC3-ED24B9B1D92E}"/>
-              </a:ext>
-            </a:extLst>
-          </p:cNvPr>
+          <p:cNvPr id="9" name="Content Placeholder 9"/>
           <p:cNvSpPr>
             <a:spLocks noGrp="1"/>
           </p:cNvSpPr>
@@ -4162,13 +3633,7 @@
       </p:sp>
       <p:sp>
         <p:nvSpPr>
-          <p:cNvPr id="11" name="Content Placeholder 9">
-            <a:extLst>
-              <a:ext uri="{FF2B5EF4-FFF2-40B4-BE49-F238E27FC236}">
-                <a16:creationId xmlns:a16="http://schemas.microsoft.com/office/drawing/2014/main" id="{93C1FF47-695D-B348-AF37-1ADF5736FA9E}"/>
-              </a:ext>
-            </a:extLst>
-          </p:cNvPr>
+          <p:cNvPr id="11" name="Content Placeholder 9"/>
           <p:cNvSpPr>
             <a:spLocks noGrp="1"/>
           </p:cNvSpPr>
@@ -4222,11 +3687,6 @@
         </p:txBody>
       </p:sp>
     </p:spTree>
-    <p:extLst>
-      <p:ext uri="{BB962C8B-B14F-4D97-AF65-F5344CB8AC3E}">
-        <p14:creationId xmlns:p14="http://schemas.microsoft.com/office/powerpoint/2010/main" val="896047110"/>
-      </p:ext>
-    </p:extLst>
   </p:cSld>
   <p:clrMapOvr>
     <a:masterClrMapping/>
@@ -4258,13 +3718,7 @@
       </p:grpSpPr>
       <p:sp>
         <p:nvSpPr>
-          <p:cNvPr id="2" name="Title Placeholder 1">
-            <a:extLst>
-              <a:ext uri="{FF2B5EF4-FFF2-40B4-BE49-F238E27FC236}">
-                <a16:creationId xmlns:a16="http://schemas.microsoft.com/office/drawing/2014/main" id="{DB1A62CF-E2B4-496D-829D-DCE37260977D}"/>
-              </a:ext>
-            </a:extLst>
-          </p:cNvPr>
+          <p:cNvPr id="2" name="Title Placeholder 1"/>
           <p:cNvSpPr>
             <a:spLocks noGrp="1"/>
           </p:cNvSpPr>
@@ -4297,13 +3751,7 @@
       </p:sp>
       <p:sp>
         <p:nvSpPr>
-          <p:cNvPr id="3" name="Text Placeholder 2">
-            <a:extLst>
-              <a:ext uri="{FF2B5EF4-FFF2-40B4-BE49-F238E27FC236}">
-                <a16:creationId xmlns:a16="http://schemas.microsoft.com/office/drawing/2014/main" id="{DFD84EF4-0E07-4BF3-A4AB-3E8632AA79AD}"/>
-              </a:ext>
-            </a:extLst>
-          </p:cNvPr>
+          <p:cNvPr id="3" name="Text Placeholder 2"/>
           <p:cNvSpPr>
             <a:spLocks noGrp="1"/>
           </p:cNvSpPr>
@@ -4331,6 +3779,7 @@
               <a:rPr lang="en-US"/>
               <a:t>Click to edit Master text styles</a:t>
             </a:r>
+            <a:endParaRPr lang="en-US"/>
           </a:p>
           <a:p>
             <a:pPr lvl="1"/>
@@ -4338,6 +3787,7 @@
               <a:rPr lang="en-US"/>
               <a:t>Second level</a:t>
             </a:r>
+            <a:endParaRPr lang="en-US"/>
           </a:p>
           <a:p>
             <a:pPr lvl="2"/>
@@ -4345,6 +3795,7 @@
               <a:rPr lang="en-US"/>
               <a:t>Third level</a:t>
             </a:r>
+            <a:endParaRPr lang="en-US"/>
           </a:p>
           <a:p>
             <a:pPr lvl="3"/>
@@ -4352,6 +3803,7 @@
               <a:rPr lang="en-GB"/>
               <a:t>Fourth level</a:t>
             </a:r>
+            <a:endParaRPr lang="en-GB"/>
           </a:p>
           <a:p>
             <a:pPr lvl="4"/>
@@ -4365,13 +3817,7 @@
       </p:sp>
       <p:sp>
         <p:nvSpPr>
-          <p:cNvPr id="5" name="Footer Placeholder 4">
-            <a:extLst>
-              <a:ext uri="{FF2B5EF4-FFF2-40B4-BE49-F238E27FC236}">
-                <a16:creationId xmlns:a16="http://schemas.microsoft.com/office/drawing/2014/main" id="{3B527A5D-B761-4C2F-97E6-5D8254424B8B}"/>
-              </a:ext>
-            </a:extLst>
-          </p:cNvPr>
+          <p:cNvPr id="5" name="Footer Placeholder 4"/>
           <p:cNvSpPr>
             <a:spLocks noGrp="1"/>
           </p:cNvSpPr>
@@ -4408,18 +3854,13 @@
               <a:rPr lang="en-GB"/>
               <a:t>PRESENTATION TITLE (ADD VIA INSERT, HEADER &amp; FOOTER)</a:t>
             </a:r>
-          </a:p>
-        </p:txBody>
-      </p:sp>
-      <p:sp>
-        <p:nvSpPr>
-          <p:cNvPr id="6" name="Slide Number Placeholder 5">
-            <a:extLst>
-              <a:ext uri="{FF2B5EF4-FFF2-40B4-BE49-F238E27FC236}">
-                <a16:creationId xmlns:a16="http://schemas.microsoft.com/office/drawing/2014/main" id="{9CD661B1-4E4B-4F85-ACA3-C34023D70282}"/>
-              </a:ext>
-            </a:extLst>
-          </p:cNvPr>
+            <a:endParaRPr lang="en-GB"/>
+          </a:p>
+        </p:txBody>
+      </p:sp>
+      <p:sp>
+        <p:nvSpPr>
+          <p:cNvPr id="6" name="Slide Number Placeholder 5"/>
           <p:cNvSpPr>
             <a:spLocks noGrp="1"/>
           </p:cNvSpPr>
@@ -4454,35 +3895,28 @@
           <a:p>
             <a:fld id="{E4D355CA-84B7-41B1-B164-8BB439CC7C6B}" type="slidenum">
               <a:rPr lang="en-GB" smtClean="0"/>
-              <a:pPr/>
-              <a:t>‹#›</a:t>
             </a:fld>
             <a:endParaRPr lang="en-GB"/>
           </a:p>
         </p:txBody>
       </p:sp>
     </p:spTree>
-    <p:extLst>
-      <p:ext uri="{BB962C8B-B14F-4D97-AF65-F5344CB8AC3E}">
-        <p14:creationId xmlns:p14="http://schemas.microsoft.com/office/powerpoint/2010/main" val="1619008365"/>
-      </p:ext>
-    </p:extLst>
   </p:cSld>
   <p:clrMap bg1="lt1" tx1="dk1" bg2="lt2" tx2="dk2" accent1="accent1" accent2="accent2" accent3="accent3" accent4="accent4" accent5="accent5" accent6="accent6" hlink="hlink" folHlink="folHlink"/>
   <p:sldLayoutIdLst>
-    <p:sldLayoutId id="2147483675" r:id="rId1"/>
-    <p:sldLayoutId id="2147483663" r:id="rId2"/>
-    <p:sldLayoutId id="2147483677" r:id="rId3"/>
+    <p:sldLayoutId id="2147483649" r:id="rId1"/>
+    <p:sldLayoutId id="2147483650" r:id="rId2"/>
+    <p:sldLayoutId id="2147483651" r:id="rId3"/>
     <p:sldLayoutId id="2147483652" r:id="rId4"/>
-    <p:sldLayoutId id="2147483682" r:id="rId5"/>
-    <p:sldLayoutId id="2147483721" r:id="rId6"/>
-    <p:sldLayoutId id="2147483722" r:id="rId7"/>
-    <p:sldLayoutId id="2147483684" r:id="rId8"/>
-    <p:sldLayoutId id="2147483685" r:id="rId9"/>
-    <p:sldLayoutId id="2147483686" r:id="rId10"/>
-    <p:sldLayoutId id="2147483723" r:id="rId11"/>
-    <p:sldLayoutId id="2147483706" r:id="rId12"/>
-    <p:sldLayoutId id="2147483697" r:id="rId13"/>
+    <p:sldLayoutId id="2147483653" r:id="rId5"/>
+    <p:sldLayoutId id="2147483654" r:id="rId6"/>
+    <p:sldLayoutId id="2147483655" r:id="rId7"/>
+    <p:sldLayoutId id="2147483656" r:id="rId8"/>
+    <p:sldLayoutId id="2147483657" r:id="rId9"/>
+    <p:sldLayoutId id="2147483658" r:id="rId10"/>
+    <p:sldLayoutId id="2147483659" r:id="rId11"/>
+    <p:sldLayoutId id="2147483660" r:id="rId12"/>
+    <p:sldLayoutId id="2147483661" r:id="rId13"/>
   </p:sldLayoutIdLst>
   <p:hf hdr="0" dt="0"/>
   <p:txStyles>
@@ -4514,7 +3948,7 @@
           <a:spcPts val="0"/>
         </a:spcBef>
         <a:spcAft>
-          <a:spcPts val="992"/>
+          <a:spcPts val="990"/>
         </a:spcAft>
         <a:buFont typeface="Arial" panose="020B0604020202020204" pitchFamily="34" charset="0"/>
         <a:buNone/>
@@ -4535,7 +3969,7 @@
           <a:spcPts val="0"/>
         </a:spcBef>
         <a:spcAft>
-          <a:spcPts val="992"/>
+          <a:spcPts val="990"/>
         </a:spcAft>
         <a:buFont typeface="Arial" panose="020B0604020202020204" pitchFamily="34" charset="0"/>
         <a:buNone/>
@@ -4548,7 +3982,7 @@
           <a:cs typeface="+mn-cs"/>
         </a:defRPr>
       </a:lvl2pPr>
-      <a:lvl3pPr marL="216000" indent="-216000" algn="l" defTabSz="914400" rtl="0" eaLnBrk="1" latinLnBrk="0" hangingPunct="1">
+      <a:lvl3pPr marL="215900" indent="-215900" algn="l" defTabSz="914400" rtl="0" eaLnBrk="1" latinLnBrk="0" hangingPunct="1">
         <a:lnSpc>
           <a:spcPts val="2880"/>
         </a:lnSpc>
@@ -4556,7 +3990,7 @@
           <a:spcPts val="0"/>
         </a:spcBef>
         <a:spcAft>
-          <a:spcPts val="992"/>
+          <a:spcPts val="990"/>
         </a:spcAft>
         <a:buFont typeface="Arial" panose="020B0604020202020204" pitchFamily="34" charset="0"/>
         <a:buChar char="■"/>
@@ -4774,52 +4208,6 @@
       </a:lvl9pPr>
     </p:otherStyle>
   </p:txStyles>
-  <p:extLst>
-    <p:ext uri="{27BBF7A9-308A-43DC-89C8-2F10F3537804}">
-      <p15:sldGuideLst xmlns:p15="http://schemas.microsoft.com/office/powerpoint/2012/main">
-        <p15:guide id="1" pos="3840" userDrawn="1">
-          <p15:clr>
-            <a:srgbClr val="F26B43"/>
-          </p15:clr>
-        </p15:guide>
-        <p15:guide id="4" pos="604" userDrawn="1">
-          <p15:clr>
-            <a:srgbClr val="F26B43"/>
-          </p15:clr>
-        </p15:guide>
-        <p15:guide id="5" pos="7076" userDrawn="1">
-          <p15:clr>
-            <a:srgbClr val="F26B43"/>
-          </p15:clr>
-        </p15:guide>
-        <p15:guide id="6" orient="horz" pos="2160" userDrawn="1">
-          <p15:clr>
-            <a:srgbClr val="F26B43"/>
-          </p15:clr>
-        </p15:guide>
-        <p15:guide id="7" orient="horz" userDrawn="1">
-          <p15:clr>
-            <a:srgbClr val="F26B43"/>
-          </p15:clr>
-        </p15:guide>
-        <p15:guide id="8" orient="horz" pos="604" userDrawn="1">
-          <p15:clr>
-            <a:srgbClr val="F26B43"/>
-          </p15:clr>
-        </p15:guide>
-        <p15:guide id="10" orient="horz" pos="3712" userDrawn="1">
-          <p15:clr>
-            <a:srgbClr val="F26B43"/>
-          </p15:clr>
-        </p15:guide>
-        <p15:guide id="11" orient="horz" pos="1180" userDrawn="1">
-          <p15:clr>
-            <a:srgbClr val="F26B43"/>
-          </p15:clr>
-        </p15:guide>
-      </p15:sldGuideLst>
-    </p:ext>
-  </p:extLst>
 </p:sldMaster>
 </file>
 
@@ -4842,13 +4230,7 @@
       </p:grpSpPr>
       <p:sp>
         <p:nvSpPr>
-          <p:cNvPr id="2" name="Subtitle 1">
-            <a:extLst>
-              <a:ext uri="{FF2B5EF4-FFF2-40B4-BE49-F238E27FC236}">
-                <a16:creationId xmlns:a16="http://schemas.microsoft.com/office/drawing/2014/main" id="{6A29D8FC-E32A-5566-0930-02B99F5763A6}"/>
-              </a:ext>
-            </a:extLst>
-          </p:cNvPr>
+          <p:cNvPr id="2" name="Subtitle 1"/>
           <p:cNvSpPr>
             <a:spLocks noGrp="1"/>
           </p:cNvSpPr>
@@ -4870,18 +4252,13 @@
               <a:rPr lang="en-GB"/>
               <a:t>Instructions for the Research Question Demos</a:t>
             </a:r>
-          </a:p>
-        </p:txBody>
-      </p:sp>
-      <p:sp>
-        <p:nvSpPr>
-          <p:cNvPr id="4" name="Slide Number Placeholder 3">
-            <a:extLst>
-              <a:ext uri="{FF2B5EF4-FFF2-40B4-BE49-F238E27FC236}">
-                <a16:creationId xmlns:a16="http://schemas.microsoft.com/office/drawing/2014/main" id="{E143B824-C7FA-8427-0A8B-E8B5D7787B83}"/>
-              </a:ext>
-            </a:extLst>
-          </p:cNvPr>
+            <a:endParaRPr lang="en-GB"/>
+          </a:p>
+        </p:txBody>
+      </p:sp>
+      <p:sp>
+        <p:nvSpPr>
+          <p:cNvPr id="4" name="Slide Number Placeholder 3"/>
           <p:cNvSpPr>
             <a:spLocks noGrp="1"/>
           </p:cNvSpPr>
@@ -4896,8 +4273,6 @@
           <a:p>
             <a:fld id="{E4D355CA-84B7-41B1-B164-8BB439CC7C6B}" type="slidenum">
               <a:rPr lang="en-GB" smtClean="0"/>
-              <a:pPr/>
-              <a:t>1</a:t>
             </a:fld>
             <a:endParaRPr lang="en-GB"/>
           </a:p>
@@ -4905,13 +4280,7 @@
       </p:sp>
       <p:sp>
         <p:nvSpPr>
-          <p:cNvPr id="6" name="TextBox 5">
-            <a:extLst>
-              <a:ext uri="{FF2B5EF4-FFF2-40B4-BE49-F238E27FC236}">
-                <a16:creationId xmlns:a16="http://schemas.microsoft.com/office/drawing/2014/main" id="{6DD9461E-8553-F8C3-E23F-FB71330E931F}"/>
-              </a:ext>
-            </a:extLst>
-          </p:cNvPr>
+          <p:cNvPr id="6" name="TextBox 5"/>
           <p:cNvSpPr txBox="1"/>
           <p:nvPr/>
         </p:nvSpPr>
@@ -4937,6 +4306,7 @@
               <a:rPr lang="en-GB" dirty="0"/>
               <a:t>You have 5 minutes to present – be ready to share your screen, present slides in "full screen / presentation mode". Practice first. We can only offer you one opportunity to present your Research Question, so please make the most of this opportunity to help you pass coursework 2. </a:t>
             </a:r>
+            <a:endParaRPr lang="en-GB" dirty="0"/>
           </a:p>
           <a:p>
             <a:endParaRPr lang="en-GB" dirty="0"/>
@@ -4954,7 +4324,7 @@
               <a:solidFill>
                 <a:srgbClr val="FF0000"/>
               </a:solidFill>
-              <a:cs typeface="Arial"/>
+              <a:cs typeface="Arial" panose="020B0604020202020204"/>
             </a:endParaRPr>
           </a:p>
           <a:p>
@@ -4978,6 +4348,7 @@
               <a:rPr lang="en-GB" dirty="0"/>
               <a:t>of research question. </a:t>
             </a:r>
+            <a:endParaRPr lang="en-GB" dirty="0"/>
           </a:p>
           <a:p>
             <a:r>
@@ -4993,7 +4364,7 @@
               <a:t> that is either an instruction or an optionyou do not use (including this slide).   You can then enlarge your selection. Instructions for group sign up of presentation slots will be announced on Canvas and Slack. DO NOT SIGN UP unless you can attend. Ideally, all group members should attend; select one person to present, while others take notes. All group be ready to answer questions.  Any group not presenting will miss the opportunity to check a critical part of coursework 2.   Practice presenting on Teams first.</a:t>
             </a:r>
             <a:endParaRPr lang="en-GB" dirty="0">
-              <a:cs typeface="Arial"/>
+              <a:cs typeface="Arial" panose="020B0604020202020204"/>
             </a:endParaRPr>
           </a:p>
           <a:p>
@@ -5005,15 +4376,11 @@
               <a:rPr lang="en-GB" dirty="0"/>
               <a:t>.  This will be reflected in your peer evaluation.</a:t>
             </a:r>
+            <a:endParaRPr lang="en-GB" dirty="0"/>
           </a:p>
         </p:txBody>
       </p:sp>
     </p:spTree>
-    <p:extLst>
-      <p:ext uri="{BB962C8B-B14F-4D97-AF65-F5344CB8AC3E}">
-        <p14:creationId xmlns:p14="http://schemas.microsoft.com/office/powerpoint/2010/main" val="384748354"/>
-      </p:ext>
-    </p:extLst>
   </p:cSld>
   <p:clrMapOvr>
     <a:masterClrMapping/>
@@ -5027,7 +4394,7 @@
     <p:bg>
       <p:bgPr>
         <a:blipFill dpi="0" rotWithShape="1">
-          <a:blip r:embed="rId2">
+          <a:blip r:embed="rId1">
             <a:lum/>
           </a:blip>
           <a:srcRect/>
@@ -5054,13 +4421,7 @@
       </p:grpSpPr>
       <p:sp>
         <p:nvSpPr>
-          <p:cNvPr id="2" name="Title 1">
-            <a:extLst>
-              <a:ext uri="{FF2B5EF4-FFF2-40B4-BE49-F238E27FC236}">
-                <a16:creationId xmlns:a16="http://schemas.microsoft.com/office/drawing/2014/main" id="{3440AEE4-CC66-FE42-B0C3-2CC7AFD37D1C}"/>
-              </a:ext>
-            </a:extLst>
-          </p:cNvPr>
+          <p:cNvPr id="2" name="Title 1"/>
           <p:cNvSpPr>
             <a:spLocks noGrp="1"/>
           </p:cNvSpPr>
@@ -5102,13 +4463,7 @@
       </p:sp>
       <p:sp>
         <p:nvSpPr>
-          <p:cNvPr id="3" name="Subtitle 2">
-            <a:extLst>
-              <a:ext uri="{FF2B5EF4-FFF2-40B4-BE49-F238E27FC236}">
-                <a16:creationId xmlns:a16="http://schemas.microsoft.com/office/drawing/2014/main" id="{8275DA97-5166-7F4B-BC83-F50AC8BEDCD7}"/>
-              </a:ext>
-            </a:extLst>
-          </p:cNvPr>
+          <p:cNvPr id="3" name="Subtitle 2"/>
           <p:cNvSpPr>
             <a:spLocks noGrp="1"/>
           </p:cNvSpPr>
@@ -5125,18 +4480,13 @@
               <a:rPr lang="en-US" sz="2000" dirty="0"/>
               <a:t>Group Name:   B 137                                                  Name of Student Presenting: Ahmed Asjal</a:t>
             </a:r>
-          </a:p>
-        </p:txBody>
-      </p:sp>
-      <p:sp>
-        <p:nvSpPr>
-          <p:cNvPr id="4" name="Footer Placeholder 3">
-            <a:extLst>
-              <a:ext uri="{FF2B5EF4-FFF2-40B4-BE49-F238E27FC236}">
-                <a16:creationId xmlns:a16="http://schemas.microsoft.com/office/drawing/2014/main" id="{6E7F4D14-5620-EC41-A86C-6CC3CFD691B4}"/>
-              </a:ext>
-            </a:extLst>
-          </p:cNvPr>
+            <a:endParaRPr lang="en-US" sz="2000" dirty="0"/>
+          </a:p>
+        </p:txBody>
+      </p:sp>
+      <p:sp>
+        <p:nvSpPr>
+          <p:cNvPr id="4" name="Footer Placeholder 3"/>
           <p:cNvSpPr>
             <a:spLocks noGrp="1"/>
           </p:cNvSpPr>
@@ -5158,15 +4508,11 @@
               <a:rPr lang="en-GB" dirty="0"/>
               <a:t>7COM1079-2025  Student Group No:   B 137         Names of Student Attendees: Mahipal, Poorni, Zaman, Ahmed &amp; Dheeraj</a:t>
             </a:r>
+            <a:endParaRPr lang="en-GB" dirty="0"/>
           </a:p>
         </p:txBody>
       </p:sp>
     </p:spTree>
-    <p:extLst>
-      <p:ext uri="{BB962C8B-B14F-4D97-AF65-F5344CB8AC3E}">
-        <p14:creationId xmlns:p14="http://schemas.microsoft.com/office/powerpoint/2010/main" val="4148532546"/>
-      </p:ext>
-    </p:extLst>
   </p:cSld>
   <p:clrMapOvr>
     <a:masterClrMapping/>
@@ -5193,13 +4539,7 @@
       </p:grpSpPr>
       <p:sp>
         <p:nvSpPr>
-          <p:cNvPr id="2" name="Subtitle 1">
-            <a:extLst>
-              <a:ext uri="{FF2B5EF4-FFF2-40B4-BE49-F238E27FC236}">
-                <a16:creationId xmlns:a16="http://schemas.microsoft.com/office/drawing/2014/main" id="{8E3CD731-5ACF-B002-247D-243F6E2149EC}"/>
-              </a:ext>
-            </a:extLst>
-          </p:cNvPr>
+          <p:cNvPr id="2" name="Subtitle 1"/>
           <p:cNvSpPr>
             <a:spLocks noGrp="1"/>
           </p:cNvSpPr>
@@ -5228,6 +4568,7 @@
               <a:rPr lang="en-GB" sz="3200" dirty="0"/>
               <a:t>Our dataset contains detailed performance statistics for NBA players during the 2017 season</a:t>
             </a:r>
+            <a:endParaRPr lang="en-GB" sz="3200" dirty="0"/>
           </a:p>
           <a:p>
             <a:pPr>
@@ -5239,7 +4580,7 @@
               <a:solidFill>
                 <a:srgbClr val="203232"/>
               </a:solidFill>
-              <a:cs typeface="Arial"/>
+              <a:cs typeface="Arial" panose="020B0604020202020204"/>
             </a:endParaRPr>
           </a:p>
           <a:p>
@@ -5253,7 +4594,7 @@
                 <a:solidFill>
                   <a:srgbClr val="203232"/>
                 </a:solidFill>
-                <a:cs typeface="Arial"/>
+                <a:cs typeface="Arial" panose="020B0604020202020204"/>
               </a:rPr>
               <a:t>Here is a sample of our dataset: </a:t>
             </a:r>
@@ -5261,20 +4602,14 @@
               <a:solidFill>
                 <a:srgbClr val="FF0000"/>
               </a:solidFill>
-              <a:cs typeface="Arial"/>
+              <a:cs typeface="Arial" panose="020B0604020202020204"/>
             </a:endParaRPr>
           </a:p>
         </p:txBody>
       </p:sp>
       <p:sp>
         <p:nvSpPr>
-          <p:cNvPr id="3" name="Footer Placeholder 2">
-            <a:extLst>
-              <a:ext uri="{FF2B5EF4-FFF2-40B4-BE49-F238E27FC236}">
-                <a16:creationId xmlns:a16="http://schemas.microsoft.com/office/drawing/2014/main" id="{3C4D431B-7665-75B0-2D73-5BD588DCB766}"/>
-              </a:ext>
-            </a:extLst>
-          </p:cNvPr>
+          <p:cNvPr id="3" name="Footer Placeholder 2"/>
           <p:cNvSpPr>
             <a:spLocks noGrp="1"/>
           </p:cNvSpPr>
@@ -5291,18 +4626,13 @@
               <a:rPr lang="en-GB" dirty="0"/>
               <a:t>PRE 7COM1079-2025  Student Group No: B 137</a:t>
             </a:r>
-          </a:p>
-        </p:txBody>
-      </p:sp>
-      <p:sp>
-        <p:nvSpPr>
-          <p:cNvPr id="4" name="Slide Number Placeholder 3">
-            <a:extLst>
-              <a:ext uri="{FF2B5EF4-FFF2-40B4-BE49-F238E27FC236}">
-                <a16:creationId xmlns:a16="http://schemas.microsoft.com/office/drawing/2014/main" id="{1625FA15-B17F-387B-E383-5505647ABB89}"/>
-              </a:ext>
-            </a:extLst>
-          </p:cNvPr>
+            <a:endParaRPr lang="en-GB" dirty="0"/>
+          </a:p>
+        </p:txBody>
+      </p:sp>
+      <p:sp>
+        <p:nvSpPr>
+          <p:cNvPr id="4" name="Slide Number Placeholder 3"/>
           <p:cNvSpPr>
             <a:spLocks noGrp="1"/>
           </p:cNvSpPr>
@@ -5330,13 +4660,7 @@
       </p:sp>
       <p:sp>
         <p:nvSpPr>
-          <p:cNvPr id="8" name="Title 7">
-            <a:extLst>
-              <a:ext uri="{FF2B5EF4-FFF2-40B4-BE49-F238E27FC236}">
-                <a16:creationId xmlns:a16="http://schemas.microsoft.com/office/drawing/2014/main" id="{6E140EA5-BB03-811F-4631-603A97631914}"/>
-              </a:ext>
-            </a:extLst>
-          </p:cNvPr>
+          <p:cNvPr id="8" name="Title 7"/>
           <p:cNvSpPr>
             <a:spLocks noGrp="1"/>
           </p:cNvSpPr>
@@ -5364,7 +4688,7 @@
                 <a:spcPts val="0"/>
               </a:spcBef>
               <a:spcAft>
-                <a:spcPts val="992"/>
+                <a:spcPts val="990"/>
               </a:spcAft>
               <a:buAutoNum type="arabicPeriod"/>
             </a:pPr>
@@ -5373,13 +4697,13 @@
                 <a:solidFill>
                   <a:srgbClr val="FF0000"/>
                 </a:solidFill>
-                <a:cs typeface="Arial"/>
+                <a:cs typeface="Arial" panose="020B0604020202020204"/>
               </a:rPr>
               <a:t>The columns/variable names: </a:t>
             </a:r>
             <a:r>
               <a:rPr lang="en-GB" sz="3600" dirty="0">
-                <a:cs typeface="Arial"/>
+                <a:cs typeface="Arial" panose="020B0604020202020204"/>
               </a:rPr>
               <a:t>MP &amp; PS/G.</a:t>
             </a:r>
@@ -5387,7 +4711,7 @@
               <a:solidFill>
                 <a:srgbClr val="FF0000"/>
               </a:solidFill>
-              <a:cs typeface="Arial"/>
+              <a:cs typeface="Arial" panose="020B0604020202020204"/>
             </a:endParaRPr>
           </a:p>
           <a:p>
@@ -5399,7 +4723,7 @@
                 <a:spcPts val="0"/>
               </a:spcBef>
               <a:spcAft>
-                <a:spcPts val="992"/>
+                <a:spcPts val="990"/>
               </a:spcAft>
               <a:buAutoNum type="arabicPeriod"/>
             </a:pPr>
@@ -5408,7 +4732,7 @@
                 <a:solidFill>
                   <a:srgbClr val="FF0000"/>
                 </a:solidFill>
-                <a:cs typeface="Arial"/>
+                <a:cs typeface="Arial" panose="020B0604020202020204"/>
               </a:rPr>
               <a:t>Here are first 5 rows of the data. </a:t>
             </a:r>
@@ -5417,7 +4741,7 @@
                 <a:solidFill>
                   <a:srgbClr val="FF0000"/>
                 </a:solidFill>
-                <a:cs typeface="Arial"/>
+                <a:cs typeface="Arial" panose="020B0604020202020204"/>
               </a:rPr>
             </a:br>
             <a:br>
@@ -5425,7 +4749,7 @@
                 <a:solidFill>
                   <a:srgbClr val="FF0000"/>
                 </a:solidFill>
-                <a:cs typeface="Arial"/>
+                <a:cs typeface="Arial" panose="020B0604020202020204"/>
               </a:rPr>
             </a:br>
             <a:br>
@@ -5433,7 +4757,7 @@
                 <a:solidFill>
                   <a:srgbClr val="FF0000"/>
                 </a:solidFill>
-                <a:cs typeface="Arial"/>
+                <a:cs typeface="Arial" panose="020B0604020202020204"/>
               </a:rPr>
             </a:br>
             <a:br>
@@ -5441,14 +4765,14 @@
                 <a:solidFill>
                   <a:srgbClr val="FF0000"/>
                 </a:solidFill>
-                <a:cs typeface="Arial"/>
+                <a:cs typeface="Arial" panose="020B0604020202020204"/>
               </a:rPr>
             </a:br>
             <a:endParaRPr lang="en-US" sz="3600" b="0" dirty="0">
               <a:solidFill>
                 <a:srgbClr val="FF0000"/>
               </a:solidFill>
-              <a:cs typeface="Arial"/>
+              <a:cs typeface="Arial" panose="020B0604020202020204"/>
             </a:endParaRPr>
           </a:p>
           <a:p>
@@ -5460,13 +4784,13 @@
                 <a:spcPts val="0"/>
               </a:spcBef>
               <a:spcAft>
-                <a:spcPts val="992"/>
+                <a:spcPts val="990"/>
               </a:spcAft>
               <a:buAutoNum type="arabicPeriod"/>
             </a:pPr>
             <a:r>
               <a:rPr lang="en-GB" sz="3600" dirty="0">
-                <a:cs typeface="Arial"/>
+                <a:cs typeface="Arial" panose="020B0604020202020204"/>
               </a:rPr>
               <a:t>Our Dataset has </a:t>
             </a:r>
@@ -5475,13 +4799,13 @@
                 <a:solidFill>
                   <a:srgbClr val="FF0000"/>
                 </a:solidFill>
-                <a:cs typeface="Arial"/>
+                <a:cs typeface="Arial" panose="020B0604020202020204"/>
               </a:rPr>
               <a:t>486</a:t>
             </a:r>
             <a:r>
               <a:rPr lang="en-GB" sz="3600" dirty="0">
-                <a:cs typeface="Arial"/>
+                <a:cs typeface="Arial" panose="020B0604020202020204"/>
               </a:rPr>
               <a:t> rows &amp; </a:t>
             </a:r>
@@ -5490,13 +4814,13 @@
                 <a:solidFill>
                   <a:schemeClr val="accent3"/>
                 </a:solidFill>
-                <a:cs typeface="Arial"/>
+                <a:cs typeface="Arial" panose="020B0604020202020204"/>
               </a:rPr>
               <a:t>30</a:t>
             </a:r>
             <a:r>
               <a:rPr lang="en-GB" sz="3600" dirty="0">
-                <a:cs typeface="Arial"/>
+                <a:cs typeface="Arial" panose="020B0604020202020204"/>
               </a:rPr>
               <a:t> columns.</a:t>
             </a:r>
@@ -5505,14 +4829,14 @@
                 <a:solidFill>
                   <a:srgbClr val="FF0000"/>
                 </a:solidFill>
-                <a:cs typeface="Arial"/>
+                <a:cs typeface="Arial" panose="020B0604020202020204"/>
               </a:rPr>
             </a:br>
             <a:endParaRPr lang="en-GB" sz="3600" dirty="0">
               <a:solidFill>
                 <a:srgbClr val="FF0000"/>
               </a:solidFill>
-              <a:cs typeface="Arial"/>
+              <a:cs typeface="Arial" panose="020B0604020202020204"/>
             </a:endParaRPr>
           </a:p>
           <a:p>
@@ -5520,27 +4844,21 @@
               <a:solidFill>
                 <a:srgbClr val="FF0000"/>
               </a:solidFill>
-              <a:cs typeface="Arial"/>
+              <a:cs typeface="Arial" panose="020B0604020202020204"/>
             </a:endParaRPr>
           </a:p>
         </p:txBody>
       </p:sp>
       <p:pic>
         <p:nvPicPr>
-          <p:cNvPr id="6" name="Picture 5">
-            <a:extLst>
-              <a:ext uri="{FF2B5EF4-FFF2-40B4-BE49-F238E27FC236}">
-                <a16:creationId xmlns:a16="http://schemas.microsoft.com/office/drawing/2014/main" id="{9F19D2F5-4A5C-0940-CB82-64169E09B3B5}"/>
-              </a:ext>
-            </a:extLst>
-          </p:cNvPr>
+          <p:cNvPr id="6" name="Picture 5"/>
           <p:cNvPicPr>
             <a:picLocks noChangeAspect="1"/>
           </p:cNvPicPr>
           <p:nvPr/>
         </p:nvPicPr>
         <p:blipFill>
-          <a:blip r:embed="rId3"/>
+          <a:blip r:embed="rId1"/>
           <a:stretch>
             <a:fillRect/>
           </a:stretch>
@@ -5556,11 +4874,6 @@
         </p:spPr>
       </p:pic>
     </p:spTree>
-    <p:extLst>
-      <p:ext uri="{BB962C8B-B14F-4D97-AF65-F5344CB8AC3E}">
-        <p14:creationId xmlns:p14="http://schemas.microsoft.com/office/powerpoint/2010/main" val="713092616"/>
-      </p:ext>
-    </p:extLst>
   </p:cSld>
   <p:clrMapOvr>
     <a:masterClrMapping/>
@@ -5587,13 +4900,7 @@
       </p:grpSpPr>
       <p:sp>
         <p:nvSpPr>
-          <p:cNvPr id="2" name="Subtitle 1">
-            <a:extLst>
-              <a:ext uri="{FF2B5EF4-FFF2-40B4-BE49-F238E27FC236}">
-                <a16:creationId xmlns:a16="http://schemas.microsoft.com/office/drawing/2014/main" id="{7D9D8228-727F-1E46-B5AD-91D158B8255E}"/>
-              </a:ext>
-            </a:extLst>
-          </p:cNvPr>
+          <p:cNvPr id="2" name="Subtitle 1"/>
           <p:cNvSpPr>
             <a:spLocks noGrp="1"/>
           </p:cNvSpPr>
@@ -5641,18 +4948,17 @@
               </a:rPr>
               <a:t>DS346 		nba_2017_br.csv</a:t>
             </a:r>
-          </a:p>
-        </p:txBody>
-      </p:sp>
-      <p:sp>
-        <p:nvSpPr>
-          <p:cNvPr id="3" name="Footer Placeholder 2">
-            <a:extLst>
-              <a:ext uri="{FF2B5EF4-FFF2-40B4-BE49-F238E27FC236}">
-                <a16:creationId xmlns:a16="http://schemas.microsoft.com/office/drawing/2014/main" id="{00EBC183-8AA5-EC44-9987-D65F5C1892A1}"/>
-              </a:ext>
-            </a:extLst>
-          </p:cNvPr>
+            <a:endParaRPr lang="en-US" sz="2400" dirty="0">
+              <a:solidFill>
+                <a:schemeClr val="tx1"/>
+              </a:solidFill>
+            </a:endParaRPr>
+          </a:p>
+        </p:txBody>
+      </p:sp>
+      <p:sp>
+        <p:nvSpPr>
+          <p:cNvPr id="3" name="Footer Placeholder 2"/>
           <p:cNvSpPr>
             <a:spLocks noGrp="1"/>
           </p:cNvSpPr>
@@ -5674,18 +4980,13 @@
               <a:rPr lang="en-GB" dirty="0"/>
               <a:t>7COM1079-2025  Student Group No: B137     Names of Student Group Attendees: Mahipal, Poorni, Zaman, Ahmed &amp; Dheeraj</a:t>
             </a:r>
-          </a:p>
-        </p:txBody>
-      </p:sp>
-      <p:sp>
-        <p:nvSpPr>
-          <p:cNvPr id="4" name="Slide Number Placeholder 3">
-            <a:extLst>
-              <a:ext uri="{FF2B5EF4-FFF2-40B4-BE49-F238E27FC236}">
-                <a16:creationId xmlns:a16="http://schemas.microsoft.com/office/drawing/2014/main" id="{CC9D9611-42EE-7840-81EE-DD6B1A99CD7B}"/>
-              </a:ext>
-            </a:extLst>
-          </p:cNvPr>
+            <a:endParaRPr lang="en-GB" dirty="0"/>
+          </a:p>
+        </p:txBody>
+      </p:sp>
+      <p:sp>
+        <p:nvSpPr>
+          <p:cNvPr id="4" name="Slide Number Placeholder 3"/>
           <p:cNvSpPr>
             <a:spLocks noGrp="1"/>
           </p:cNvSpPr>
@@ -5713,13 +5014,7 @@
       </p:sp>
       <p:sp>
         <p:nvSpPr>
-          <p:cNvPr id="5" name="Title 4">
-            <a:extLst>
-              <a:ext uri="{FF2B5EF4-FFF2-40B4-BE49-F238E27FC236}">
-                <a16:creationId xmlns:a16="http://schemas.microsoft.com/office/drawing/2014/main" id="{B3FA3829-F12C-214D-8FBA-7E1A740F65CA}"/>
-              </a:ext>
-            </a:extLst>
-          </p:cNvPr>
+          <p:cNvPr id="5" name="Title 4"/>
           <p:cNvSpPr>
             <a:spLocks noGrp="1"/>
           </p:cNvSpPr>
@@ -5746,8 +5041,8 @@
             </a:pPr>
             <a:r>
               <a:rPr lang="en-US" sz="2400" b="0" dirty="0">
-                <a:latin typeface="Calibri"/>
-                <a:cs typeface="Calibri"/>
+                <a:latin typeface="Calibri" panose="020F0502020204030204"/>
+                <a:cs typeface="Calibri" panose="020F0502020204030204"/>
               </a:rPr>
               <a:t>This dataset is interesting to us because:  It provides well quantitative information about NBA players’ performance, with which we can do statistical analysis.</a:t>
             </a:r>
@@ -5765,8 +5060,8 @@
             </a:br>
             <a:r>
               <a:rPr lang="en-US" sz="2400" b="0" dirty="0">
-                <a:latin typeface="Calibri"/>
-                <a:cs typeface="Calibri"/>
+                <a:latin typeface="Calibri" panose="020F0502020204030204"/>
+                <a:cs typeface="Calibri" panose="020F0502020204030204"/>
               </a:rPr>
               <a:t>Our  Independent variable is: </a:t>
             </a:r>
@@ -5775,8 +5070,8 @@
                 <a:solidFill>
                   <a:srgbClr val="FF0000"/>
                 </a:solidFill>
-                <a:latin typeface="Calibri"/>
-                <a:cs typeface="Calibri"/>
+                <a:latin typeface="Calibri" panose="020F0502020204030204"/>
+                <a:cs typeface="Calibri" panose="020F0502020204030204"/>
               </a:rPr>
               <a:t>MP (Minutes Played in Game)</a:t>
             </a:r>
@@ -5791,15 +5086,15 @@
                 <a:solidFill>
                   <a:srgbClr val="FF0000"/>
                 </a:solidFill>
-                <a:latin typeface="Calibri"/>
-                <a:cs typeface="Calibri"/>
+                <a:latin typeface="Calibri" panose="020F0502020204030204"/>
+                <a:cs typeface="Calibri" panose="020F0502020204030204"/>
               </a:rPr>
               <a:t>                   </a:t>
             </a:r>
             <a:r>
               <a:rPr lang="en-US" sz="2400" b="0" dirty="0">
-                <a:latin typeface="Calibri"/>
-                <a:cs typeface="Calibri"/>
+                <a:latin typeface="Calibri" panose="020F0502020204030204"/>
+                <a:cs typeface="Calibri" panose="020F0502020204030204"/>
               </a:rPr>
               <a:t>This  Independent variable datatype is: </a:t>
             </a:r>
@@ -5808,8 +5103,8 @@
                 <a:solidFill>
                   <a:srgbClr val="FF0000"/>
                 </a:solidFill>
-                <a:latin typeface="Calibri"/>
-                <a:cs typeface="Calibri"/>
+                <a:latin typeface="Calibri" panose="020F0502020204030204"/>
+                <a:cs typeface="Calibri" panose="020F0502020204030204"/>
               </a:rPr>
               <a:t>Interval/Measurement Data</a:t>
             </a:r>
@@ -5821,8 +5116,8 @@
             </a:br>
             <a:r>
               <a:rPr lang="en-US" sz="2400" b="0" dirty="0">
-                <a:latin typeface="Calibri"/>
-                <a:cs typeface="Calibri"/>
+                <a:latin typeface="Calibri" panose="020F0502020204030204"/>
+                <a:cs typeface="Calibri" panose="020F0502020204030204"/>
               </a:rPr>
               <a:t>Our Dependent variable is: </a:t>
             </a:r>
@@ -5831,8 +5126,8 @@
                 <a:solidFill>
                   <a:srgbClr val="FF0000"/>
                 </a:solidFill>
-                <a:latin typeface="Calibri"/>
-                <a:cs typeface="Calibri"/>
+                <a:latin typeface="Calibri" panose="020F0502020204030204"/>
+                <a:cs typeface="Calibri" panose="020F0502020204030204"/>
               </a:rPr>
               <a:t>PS/G (Points Scored per Game)</a:t>
             </a:r>
@@ -5847,15 +5142,15 @@
                 <a:solidFill>
                   <a:srgbClr val="FF0000"/>
                 </a:solidFill>
-                <a:latin typeface="Calibri"/>
-                <a:cs typeface="Calibri"/>
+                <a:latin typeface="Calibri" panose="020F0502020204030204"/>
+                <a:cs typeface="Calibri" panose="020F0502020204030204"/>
               </a:rPr>
               <a:t>                   </a:t>
             </a:r>
             <a:r>
               <a:rPr lang="en-US" sz="2400" b="0" dirty="0">
-                <a:latin typeface="Calibri"/>
-                <a:cs typeface="Calibri"/>
+                <a:latin typeface="Calibri" panose="020F0502020204030204"/>
+                <a:cs typeface="Calibri" panose="020F0502020204030204"/>
               </a:rPr>
               <a:t>This Dependent variable datatype is  (select one): </a:t>
             </a:r>
@@ -5864,23 +5159,24 @@
                 <a:solidFill>
                   <a:srgbClr val="FF0000"/>
                 </a:solidFill>
-                <a:latin typeface="Calibri"/>
-                <a:cs typeface="Calibri"/>
+                <a:latin typeface="Calibri" panose="020F0502020204030204"/>
+                <a:cs typeface="Calibri" panose="020F0502020204030204"/>
               </a:rPr>
               <a:t>Interval/Measurement Data.</a:t>
             </a:r>
-          </a:p>
-        </p:txBody>
-      </p:sp>
-      <p:sp>
-        <p:nvSpPr>
-          <p:cNvPr id="6" name="TextBox 5">
-            <a:extLst>
-              <a:ext uri="{FF2B5EF4-FFF2-40B4-BE49-F238E27FC236}">
-                <a16:creationId xmlns:a16="http://schemas.microsoft.com/office/drawing/2014/main" id="{732D6C0D-D649-2AA9-7741-835F3E841A25}"/>
-              </a:ext>
-            </a:extLst>
-          </p:cNvPr>
+            <a:endParaRPr lang="en-US" sz="2400" b="0" dirty="0">
+              <a:solidFill>
+                <a:srgbClr val="FF0000"/>
+              </a:solidFill>
+              <a:latin typeface="Calibri" panose="020F0502020204030204"/>
+              <a:cs typeface="Calibri" panose="020F0502020204030204"/>
+            </a:endParaRPr>
+          </a:p>
+        </p:txBody>
+      </p:sp>
+      <p:sp>
+        <p:nvSpPr>
+          <p:cNvPr id="6" name="TextBox 5"/>
           <p:cNvSpPr txBox="1"/>
           <p:nvPr/>
         </p:nvSpPr>
@@ -5910,15 +5206,17 @@
               </a:rPr>
               <a:t>*For comparison of two nominal variables and for comparison of proportions you use two (or more) independent variables (see next slide)</a:t>
             </a:r>
+            <a:endParaRPr lang="en-GB">
+              <a:solidFill>
+                <a:schemeClr val="accent2">
+                  <a:lumMod val="75000"/>
+                </a:schemeClr>
+              </a:solidFill>
+            </a:endParaRPr>
           </a:p>
         </p:txBody>
       </p:sp>
     </p:spTree>
-    <p:extLst>
-      <p:ext uri="{BB962C8B-B14F-4D97-AF65-F5344CB8AC3E}">
-        <p14:creationId xmlns:p14="http://schemas.microsoft.com/office/powerpoint/2010/main" val="1718004908"/>
-      </p:ext>
-    </p:extLst>
   </p:cSld>
   <p:clrMapOvr>
     <a:masterClrMapping/>
@@ -5945,13 +5243,7 @@
       </p:grpSpPr>
       <p:sp>
         <p:nvSpPr>
-          <p:cNvPr id="2" name="Subtitle 1">
-            <a:extLst>
-              <a:ext uri="{FF2B5EF4-FFF2-40B4-BE49-F238E27FC236}">
-                <a16:creationId xmlns:a16="http://schemas.microsoft.com/office/drawing/2014/main" id="{8E3CD731-5ACF-B002-247D-243F6E2149EC}"/>
-              </a:ext>
-            </a:extLst>
-          </p:cNvPr>
+          <p:cNvPr id="2" name="Subtitle 1"/>
           <p:cNvSpPr>
             <a:spLocks noGrp="1"/>
           </p:cNvSpPr>
@@ -5986,18 +5278,17 @@
               </a:rPr>
               <a:t>Choose ONE of the three templates below replacing the blue text with your variables – then add hypotheses as shown in next slide:</a:t>
             </a:r>
-          </a:p>
-        </p:txBody>
-      </p:sp>
-      <p:sp>
-        <p:nvSpPr>
-          <p:cNvPr id="3" name="Footer Placeholder 2">
-            <a:extLst>
-              <a:ext uri="{FF2B5EF4-FFF2-40B4-BE49-F238E27FC236}">
-                <a16:creationId xmlns:a16="http://schemas.microsoft.com/office/drawing/2014/main" id="{3C4D431B-7665-75B0-2D73-5BD588DCB766}"/>
-              </a:ext>
-            </a:extLst>
-          </p:cNvPr>
+            <a:endParaRPr lang="en-GB" sz="1800" dirty="0">
+              <a:solidFill>
+                <a:srgbClr val="FF0000"/>
+              </a:solidFill>
+            </a:endParaRPr>
+          </a:p>
+        </p:txBody>
+      </p:sp>
+      <p:sp>
+        <p:nvSpPr>
+          <p:cNvPr id="3" name="Footer Placeholder 2"/>
           <p:cNvSpPr>
             <a:spLocks noGrp="1"/>
           </p:cNvSpPr>
@@ -6019,18 +5310,13 @@
               <a:rPr lang="en-GB" dirty="0"/>
               <a:t> Student Group No: B137 	      Names of Student Group Attendees: Mahipal, Poorni, Zaman, Ahmed &amp; Dheeraj</a:t>
             </a:r>
-          </a:p>
-        </p:txBody>
-      </p:sp>
-      <p:sp>
-        <p:nvSpPr>
-          <p:cNvPr id="4" name="Slide Number Placeholder 3">
-            <a:extLst>
-              <a:ext uri="{FF2B5EF4-FFF2-40B4-BE49-F238E27FC236}">
-                <a16:creationId xmlns:a16="http://schemas.microsoft.com/office/drawing/2014/main" id="{1625FA15-B17F-387B-E383-5505647ABB89}"/>
-              </a:ext>
-            </a:extLst>
-          </p:cNvPr>
+            <a:endParaRPr lang="en-GB" dirty="0"/>
+          </a:p>
+        </p:txBody>
+      </p:sp>
+      <p:sp>
+        <p:nvSpPr>
+          <p:cNvPr id="4" name="Slide Number Placeholder 3"/>
           <p:cNvSpPr>
             <a:spLocks noGrp="1"/>
           </p:cNvSpPr>
@@ -6058,13 +5344,7 @@
       </p:sp>
       <p:sp>
         <p:nvSpPr>
-          <p:cNvPr id="5" name="Title 4">
-            <a:extLst>
-              <a:ext uri="{FF2B5EF4-FFF2-40B4-BE49-F238E27FC236}">
-                <a16:creationId xmlns:a16="http://schemas.microsoft.com/office/drawing/2014/main" id="{3440DA25-F620-152B-DE9E-776F7B74DFF0}"/>
-              </a:ext>
-            </a:extLst>
-          </p:cNvPr>
+          <p:cNvPr id="5" name="Title 4"/>
           <p:cNvSpPr>
             <a:spLocks noGrp="1"/>
           </p:cNvSpPr>
@@ -6092,52 +5372,52 @@
             <a:br>
               <a:rPr lang="en-IE" sz="2400" dirty="0">
                 <a:effectLst/>
-                <a:latin typeface="Calibri"/>
+                <a:latin typeface="Calibri" panose="020F0502020204030204"/>
                 <a:ea typeface="Calibri" panose="020F0502020204030204" pitchFamily="34" charset="0"/>
-                <a:cs typeface="Times New Roman"/>
+                <a:cs typeface="Times New Roman" panose="02020603050405020304"/>
               </a:rPr>
             </a:br>
             <a:br>
               <a:rPr lang="en-IE" sz="2400" dirty="0">
                 <a:effectLst/>
-                <a:latin typeface="Calibri"/>
+                <a:latin typeface="Calibri" panose="020F0502020204030204"/>
                 <a:ea typeface="Calibri" panose="020F0502020204030204" pitchFamily="34" charset="0"/>
-                <a:cs typeface="Times New Roman"/>
+                <a:cs typeface="Times New Roman" panose="02020603050405020304"/>
               </a:rPr>
             </a:br>
             <a:r>
               <a:rPr lang="en-IE" sz="2400" dirty="0">
                 <a:effectLst/>
-                <a:latin typeface="Calibri"/>
+                <a:latin typeface="Calibri" panose="020F0502020204030204"/>
                 <a:ea typeface="Calibri" panose="020F0502020204030204" pitchFamily="34" charset="0"/>
-                <a:cs typeface="Times New Roman"/>
+                <a:cs typeface="Times New Roman" panose="02020603050405020304"/>
               </a:rPr>
               <a:t>Template </a:t>
             </a:r>
             <a:r>
               <a:rPr lang="en-IE" sz="2400" baseline="30000" dirty="0">
                 <a:effectLst/>
-                <a:latin typeface="Calibri"/>
+                <a:latin typeface="Calibri" panose="020F0502020204030204"/>
                 <a:ea typeface="Calibri" panose="020F0502020204030204" pitchFamily="34" charset="0"/>
-                <a:cs typeface="Times New Roman"/>
+                <a:cs typeface="Times New Roman" panose="02020603050405020304"/>
               </a:rPr>
               <a:t>1</a:t>
             </a:r>
             <a:r>
               <a:rPr lang="en-IE" sz="2400" dirty="0">
                 <a:effectLst/>
-                <a:latin typeface="Calibri"/>
+                <a:latin typeface="Calibri" panose="020F0502020204030204"/>
                 <a:ea typeface="Calibri" panose="020F0502020204030204" pitchFamily="34" charset="0"/>
-                <a:cs typeface="Times New Roman"/>
+                <a:cs typeface="Times New Roman" panose="02020603050405020304"/>
               </a:rPr>
               <a:t>: </a:t>
             </a:r>
             <a:r>
               <a:rPr lang="en-IE" sz="2400" b="0" dirty="0">
                 <a:effectLst/>
-                <a:latin typeface="Calibri"/>
+                <a:latin typeface="Calibri" panose="020F0502020204030204"/>
                 <a:ea typeface="Calibri" panose="020F0502020204030204" pitchFamily="34" charset="0"/>
-                <a:cs typeface="Times New Roman"/>
+                <a:cs typeface="Times New Roman" panose="02020603050405020304"/>
               </a:rPr>
               <a:t>Interval/Ordinal vs Interval/Ordinal: “Is there a statistically significant  correlation between </a:t>
             </a:r>
@@ -6146,18 +5426,18 @@
                 <a:solidFill>
                   <a:srgbClr val="0070C0"/>
                 </a:solidFill>
-                <a:latin typeface="Calibri"/>
+                <a:latin typeface="Calibri" panose="020F0502020204030204"/>
                 <a:ea typeface="Calibri" panose="020F0502020204030204" pitchFamily="34" charset="0"/>
-                <a:cs typeface="Times New Roman"/>
+                <a:cs typeface="Times New Roman" panose="02020603050405020304"/>
               </a:rPr>
               <a:t>Point Scored /Game </a:t>
             </a:r>
             <a:r>
               <a:rPr lang="en-IE" sz="2400" b="0" dirty="0">
                 <a:effectLst/>
-                <a:latin typeface="Calibri"/>
+                <a:latin typeface="Calibri" panose="020F0502020204030204"/>
                 <a:ea typeface="Calibri" panose="020F0502020204030204" pitchFamily="34" charset="0"/>
-                <a:cs typeface="Times New Roman"/>
+                <a:cs typeface="Times New Roman" panose="02020603050405020304"/>
               </a:rPr>
               <a:t>and </a:t>
             </a:r>
@@ -6166,74 +5446,90 @@
                 <a:solidFill>
                   <a:srgbClr val="0070C0"/>
                 </a:solidFill>
-                <a:latin typeface="Calibri"/>
+                <a:latin typeface="Calibri" panose="020F0502020204030204"/>
                 <a:ea typeface="Calibri" panose="020F0502020204030204" pitchFamily="34" charset="0"/>
-                <a:cs typeface="Times New Roman"/>
+                <a:cs typeface="Times New Roman" panose="02020603050405020304"/>
               </a:rPr>
               <a:t>Minutes Player for NBA </a:t>
             </a:r>
             <a:r>
               <a:rPr lang="en-IE" sz="2400" b="0">
-                <a:latin typeface="Calibri"/>
+                <a:latin typeface="Calibri" panose="020F0502020204030204"/>
                 <a:ea typeface="Calibri" panose="020F0502020204030204" pitchFamily="34" charset="0"/>
-                <a:cs typeface="Times New Roman"/>
+                <a:cs typeface="Times New Roman" panose="02020603050405020304"/>
               </a:rPr>
               <a:t>Players during the </a:t>
             </a:r>
             <a:r>
               <a:rPr lang="en-IE" sz="2400" b="0" dirty="0">
-                <a:latin typeface="Calibri"/>
+                <a:latin typeface="Calibri" panose="020F0502020204030204"/>
                 <a:ea typeface="Calibri" panose="020F0502020204030204" pitchFamily="34" charset="0"/>
-                <a:cs typeface="Times New Roman"/>
+                <a:cs typeface="Times New Roman" panose="02020603050405020304"/>
               </a:rPr>
               <a:t>2017 season? ”</a:t>
             </a:r>
             <a:br>
               <a:rPr lang="en-IE" sz="2400" b="0" dirty="0">
-                <a:latin typeface="Calibri"/>
+                <a:latin typeface="Calibri" panose="020F0502020204030204"/>
                 <a:ea typeface="Calibri" panose="020F0502020204030204" pitchFamily="34" charset="0"/>
-                <a:cs typeface="Times New Roman"/>
+                <a:cs typeface="Times New Roman" panose="02020603050405020304"/>
               </a:rPr>
             </a:br>
             <a:r>
               <a:rPr lang="en-IE" sz="2400" b="0" dirty="0">
-                <a:latin typeface="Calibri"/>
+                <a:latin typeface="Calibri" panose="020F0502020204030204"/>
                 <a:ea typeface="Calibri" panose="020F0502020204030204" pitchFamily="34" charset="0"/>
-                <a:cs typeface="Times New Roman"/>
+                <a:cs typeface="Times New Roman" panose="02020603050405020304"/>
               </a:rPr>
               <a:t> </a:t>
             </a:r>
             <a:br>
               <a:rPr lang="en-IE" sz="2400" b="0" dirty="0">
-                <a:latin typeface="Calibri"/>
+                <a:latin typeface="Calibri" panose="020F0502020204030204"/>
                 <a:ea typeface="Calibri" panose="020F0502020204030204" pitchFamily="34" charset="0"/>
-                <a:cs typeface="Times New Roman"/>
+                <a:cs typeface="Times New Roman" panose="02020603050405020304"/>
               </a:rPr>
             </a:br>
             <a:r>
               <a:rPr lang="en-IE" sz="2400" b="0" dirty="0">
-                <a:latin typeface="Calibri"/>
+                <a:latin typeface="Calibri" panose="020F0502020204030204"/>
                 <a:ea typeface="Calibri" panose="020F0502020204030204" pitchFamily="34" charset="0"/>
-                <a:cs typeface="Times New Roman"/>
-              </a:rPr>
-              <a:t>In simpler terms: Do players scoring more </a:t>
+                <a:cs typeface="Times New Roman" panose="02020603050405020304"/>
+              </a:rPr>
+              <a:t>In simpler terms: Do </a:t>
+            </a:r>
+            <a:r>
+              <a:rPr lang="en-US" altLang="en-IE" sz="2400" b="0" dirty="0">
+                <a:latin typeface="Calibri" panose="020F0502020204030204"/>
+                <a:ea typeface="Calibri" panose="020F0502020204030204" pitchFamily="34" charset="0"/>
+                <a:cs typeface="Times New Roman" panose="02020603050405020304"/>
+              </a:rPr>
+              <a:t>NBA </a:t>
             </a:r>
             <a:r>
               <a:rPr lang="en-IE" sz="2400" b="0" dirty="0">
+                <a:latin typeface="Calibri" panose="020F0502020204030204"/>
+                <a:ea typeface="Calibri" panose="020F0502020204030204" pitchFamily="34" charset="0"/>
+                <a:cs typeface="Times New Roman" panose="02020603050405020304"/>
+              </a:rPr>
+              <a:t>players scoring more </a:t>
+            </a:r>
+            <a:r>
+              <a:rPr lang="en-IE" sz="2400" b="0" dirty="0">
                 <a:solidFill>
                   <a:schemeClr val="accent4"/>
                 </a:solidFill>
-                <a:latin typeface="Calibri"/>
+                <a:latin typeface="Calibri" panose="020F0502020204030204"/>
                 <a:ea typeface="Calibri" panose="020F0502020204030204" pitchFamily="34" charset="0"/>
-                <a:cs typeface="Times New Roman"/>
+                <a:cs typeface="Times New Roman" panose="02020603050405020304"/>
               </a:rPr>
               <a:t>points </a:t>
             </a:r>
             <a:r>
               <a:rPr lang="en-IE" sz="2400" b="0" dirty="0">
-                <a:latin typeface="Calibri"/>
+                <a:latin typeface="Calibri" panose="020F0502020204030204"/>
                 <a:ea typeface="Calibri" panose="020F0502020204030204" pitchFamily="34" charset="0"/>
-                <a:cs typeface="Times New Roman"/>
+                <a:cs typeface="Times New Roman" panose="02020603050405020304"/>
               </a:rPr>
               <a:t>if they play more </a:t>
             </a:r>
@@ -6242,19 +5538,35 @@
                 <a:solidFill>
                   <a:schemeClr val="accent4"/>
                 </a:solidFill>
-                <a:latin typeface="Calibri"/>
+                <a:latin typeface="Calibri" panose="020F0502020204030204"/>
                 <a:ea typeface="Calibri" panose="020F0502020204030204" pitchFamily="34" charset="0"/>
-                <a:cs typeface="Times New Roman"/>
+                <a:cs typeface="Times New Roman" panose="02020603050405020304"/>
               </a:rPr>
               <a:t>time</a:t>
             </a:r>
             <a:r>
               <a:rPr lang="en-IE" sz="2400" b="0" dirty="0">
-                <a:latin typeface="Calibri"/>
+                <a:latin typeface="Calibri" panose="020F0502020204030204"/>
                 <a:ea typeface="Calibri" panose="020F0502020204030204" pitchFamily="34" charset="0"/>
-                <a:cs typeface="Times New Roman"/>
-              </a:rPr>
-              <a:t> in a game?</a:t>
+                <a:cs typeface="Times New Roman" panose="02020603050405020304"/>
+              </a:rPr>
+              <a:t> in a game</a:t>
+            </a:r>
+            <a:r>
+              <a:rPr lang="en-US" altLang="en-IE" sz="2400" b="0" dirty="0">
+                <a:latin typeface="Calibri" panose="020F0502020204030204"/>
+                <a:ea typeface="Calibri" panose="020F0502020204030204" pitchFamily="34" charset="0"/>
+                <a:cs typeface="Times New Roman" panose="02020603050405020304"/>
+              </a:rPr>
+              <a:t> throught the 2017 season</a:t>
+            </a:r>
+            <a:r>
+              <a:rPr lang="en-IE" sz="2400" b="0" dirty="0">
+                <a:latin typeface="Calibri" panose="020F0502020204030204"/>
+                <a:ea typeface="Calibri" panose="020F0502020204030204" pitchFamily="34" charset="0"/>
+                <a:cs typeface="Times New Roman" panose="02020603050405020304"/>
+              </a:rPr>
+              <a:t>?</a:t>
             </a:r>
             <a:br>
               <a:rPr lang="en-IE" sz="2400" dirty="0">
@@ -6290,13 +5602,7 @@
       </p:sp>
       <p:sp>
         <p:nvSpPr>
-          <p:cNvPr id="7" name="TextBox 6">
-            <a:extLst>
-              <a:ext uri="{FF2B5EF4-FFF2-40B4-BE49-F238E27FC236}">
-                <a16:creationId xmlns:a16="http://schemas.microsoft.com/office/drawing/2014/main" id="{F7FEA660-7B39-BC91-3B96-7298CCF66DE1}"/>
-              </a:ext>
-            </a:extLst>
-          </p:cNvPr>
+          <p:cNvPr id="7" name="TextBox 6"/>
           <p:cNvSpPr txBox="1"/>
           <p:nvPr/>
         </p:nvSpPr>
@@ -6326,8 +5632,8 @@
             </a:r>
             <a:r>
               <a:rPr lang="en-GB" b="1" dirty="0">
-                <a:latin typeface="Calibri"/>
-                <a:cs typeface="Calibri"/>
+                <a:latin typeface="Calibri" panose="020F0502020204030204"/>
+                <a:cs typeface="Calibri" panose="020F0502020204030204"/>
               </a:rPr>
               <a:t>Correlation</a:t>
             </a:r>
@@ -6338,9 +5644,9 @@
             <a:r>
               <a:rPr lang="en-IE" sz="1800" dirty="0">
                 <a:effectLst/>
-                <a:latin typeface="Calibri"/>
+                <a:latin typeface="Calibri" panose="020F0502020204030204"/>
                 <a:ea typeface="Calibri" panose="020F0502020204030204" pitchFamily="34" charset="0"/>
-                <a:cs typeface="Times New Roman"/>
+                <a:cs typeface="Times New Roman" panose="02020603050405020304"/>
               </a:rPr>
               <a:t>Analysis of how </a:t>
             </a:r>
@@ -6350,9 +5656,9 @@
                   <a:srgbClr val="FF0000"/>
                 </a:solidFill>
                 <a:effectLst/>
-                <a:latin typeface="Calibri"/>
+                <a:latin typeface="Calibri" panose="020F0502020204030204"/>
                 <a:ea typeface="Calibri" panose="020F0502020204030204" pitchFamily="34" charset="0"/>
-                <a:cs typeface="Times New Roman"/>
+                <a:cs typeface="Times New Roman" panose="02020603050405020304"/>
               </a:rPr>
               <a:t>ordinal</a:t>
             </a:r>
@@ -6361,9 +5667,9 @@
                 <a:solidFill>
                   <a:srgbClr val="FF0000"/>
                 </a:solidFill>
-                <a:latin typeface="Calibri"/>
+                <a:latin typeface="Calibri" panose="020F0502020204030204"/>
                 <a:ea typeface="Calibri" panose="020F0502020204030204" pitchFamily="34" charset="0"/>
-                <a:cs typeface="Times New Roman"/>
+                <a:cs typeface="Times New Roman" panose="02020603050405020304"/>
               </a:rPr>
               <a:t>/</a:t>
             </a:r>
@@ -6373,9 +5679,9 @@
                   <a:srgbClr val="FF0000"/>
                 </a:solidFill>
                 <a:effectLst/>
-                <a:latin typeface="Calibri"/>
+                <a:latin typeface="Calibri" panose="020F0502020204030204"/>
                 <a:ea typeface="Calibri" panose="020F0502020204030204" pitchFamily="34" charset="0"/>
-                <a:cs typeface="Times New Roman"/>
+                <a:cs typeface="Times New Roman" panose="02020603050405020304"/>
               </a:rPr>
               <a:t>interval </a:t>
             </a:r>
@@ -6385,35 +5691,35 @@
                   <a:srgbClr val="00B050"/>
                 </a:solidFill>
                 <a:effectLst/>
-                <a:latin typeface="Calibri"/>
+                <a:latin typeface="Calibri" panose="020F0502020204030204"/>
                 <a:ea typeface="Calibri" panose="020F0502020204030204" pitchFamily="34" charset="0"/>
-                <a:cs typeface="Times New Roman"/>
+                <a:cs typeface="Times New Roman" panose="02020603050405020304"/>
               </a:rPr>
               <a:t>dependent var</a:t>
             </a:r>
             <a:r>
               <a:rPr lang="en-IE" sz="1800" dirty="0">
                 <a:effectLst/>
-                <a:latin typeface="Calibri"/>
+                <a:latin typeface="Calibri" panose="020F0502020204030204"/>
                 <a:ea typeface="Calibri" panose="020F0502020204030204" pitchFamily="34" charset="0"/>
-                <a:cs typeface="Times New Roman"/>
+                <a:cs typeface="Times New Roman" panose="02020603050405020304"/>
               </a:rPr>
               <a:t> </a:t>
             </a:r>
             <a:r>
               <a:rPr lang="en-IE" dirty="0">
-                <a:latin typeface="Calibri"/>
+                <a:latin typeface="Calibri" panose="020F0502020204030204"/>
                 <a:ea typeface="Calibri" panose="020F0502020204030204" pitchFamily="34" charset="0"/>
-                <a:cs typeface="Times New Roman"/>
+                <a:cs typeface="Times New Roman" panose="02020603050405020304"/>
               </a:rPr>
               <a:t>correlates </a:t>
             </a:r>
             <a:r>
               <a:rPr lang="en-IE" sz="1800" dirty="0">
                 <a:effectLst/>
-                <a:latin typeface="Calibri"/>
+                <a:latin typeface="Calibri" panose="020F0502020204030204"/>
                 <a:ea typeface="Calibri" panose="020F0502020204030204" pitchFamily="34" charset="0"/>
-                <a:cs typeface="Times New Roman"/>
+                <a:cs typeface="Times New Roman" panose="02020603050405020304"/>
               </a:rPr>
               <a:t>to an </a:t>
             </a:r>
@@ -6423,9 +5729,9 @@
                   <a:srgbClr val="FF0000"/>
                 </a:solidFill>
                 <a:effectLst/>
-                <a:latin typeface="Calibri"/>
+                <a:latin typeface="Calibri" panose="020F0502020204030204"/>
                 <a:ea typeface="Calibri" panose="020F0502020204030204" pitchFamily="34" charset="0"/>
-                <a:cs typeface="Times New Roman"/>
+                <a:cs typeface="Times New Roman" panose="02020603050405020304"/>
               </a:rPr>
               <a:t>ordinal/interval </a:t>
             </a:r>
@@ -6435,15 +5741,15 @@
                   <a:srgbClr val="00B050"/>
                 </a:solidFill>
                 <a:effectLst/>
-                <a:latin typeface="Calibri"/>
+                <a:latin typeface="Calibri" panose="020F0502020204030204"/>
                 <a:ea typeface="Calibri" panose="020F0502020204030204" pitchFamily="34" charset="0"/>
-                <a:cs typeface="Times New Roman"/>
+                <a:cs typeface="Times New Roman" panose="02020603050405020304"/>
               </a:rPr>
               <a:t>independent variable)</a:t>
             </a:r>
             <a:endParaRPr lang="en-GB" dirty="0">
-              <a:latin typeface="Calibri"/>
-              <a:cs typeface="Times New Roman"/>
+              <a:latin typeface="Calibri" panose="020F0502020204030204"/>
+              <a:cs typeface="Times New Roman" panose="02020603050405020304"/>
             </a:endParaRPr>
           </a:p>
           <a:p>
@@ -6474,6 +5780,12 @@
               </a:rPr>
               <a:t> (or medians): Analysis of the difference between the mean (or median) value of a characteristic shared by members of two different populations.</a:t>
             </a:r>
+            <a:endParaRPr lang="en-IE" sz="1800" dirty="0">
+              <a:effectLst/>
+              <a:latin typeface="Calibri" panose="020F0502020204030204" pitchFamily="34" charset="0"/>
+              <a:ea typeface="Calibri" panose="020F0502020204030204" pitchFamily="34" charset="0"/>
+              <a:cs typeface="Times New Roman" panose="02020603050405020304" pitchFamily="18" charset="0"/>
+            </a:endParaRPr>
           </a:p>
           <a:p>
             <a:r>
@@ -6508,11 +5820,6 @@
         </p:txBody>
       </p:sp>
     </p:spTree>
-    <p:extLst>
-      <p:ext uri="{BB962C8B-B14F-4D97-AF65-F5344CB8AC3E}">
-        <p14:creationId xmlns:p14="http://schemas.microsoft.com/office/powerpoint/2010/main" val="32494612"/>
-      </p:ext>
-    </p:extLst>
   </p:cSld>
   <p:clrMapOvr>
     <a:masterClrMapping/>
@@ -6539,13 +5846,7 @@
       </p:grpSpPr>
       <p:sp>
         <p:nvSpPr>
-          <p:cNvPr id="2" name="Subtitle 1">
-            <a:extLst>
-              <a:ext uri="{FF2B5EF4-FFF2-40B4-BE49-F238E27FC236}">
-                <a16:creationId xmlns:a16="http://schemas.microsoft.com/office/drawing/2014/main" id="{6B64221B-D6D4-E382-A91A-99FF908D5475}"/>
-              </a:ext>
-            </a:extLst>
-          </p:cNvPr>
+          <p:cNvPr id="2" name="Subtitle 1"/>
           <p:cNvSpPr>
             <a:spLocks noGrp="1"/>
           </p:cNvSpPr>
@@ -6572,53 +5873,57 @@
             </a:pPr>
             <a:r>
               <a:rPr lang="en-GB" sz="2400" b="0" dirty="0">
-                <a:latin typeface="Calibri"/>
-                <a:cs typeface="Calibri"/>
+                <a:latin typeface="Calibri" panose="020F0502020204030204"/>
+                <a:cs typeface="Calibri" panose="020F0502020204030204"/>
               </a:rPr>
               <a:t>Add your </a:t>
             </a:r>
             <a:r>
               <a:rPr lang="en-GB" sz="2400" dirty="0">
-                <a:latin typeface="Calibri"/>
-                <a:cs typeface="Calibri"/>
+                <a:latin typeface="Calibri" panose="020F0502020204030204"/>
+                <a:cs typeface="Calibri" panose="020F0502020204030204"/>
               </a:rPr>
               <a:t>Hypotheses</a:t>
             </a:r>
             <a:r>
               <a:rPr lang="en-GB" sz="2400" b="0" dirty="0">
-                <a:latin typeface="Calibri"/>
-                <a:cs typeface="Calibri"/>
+                <a:latin typeface="Calibri" panose="020F0502020204030204"/>
+                <a:cs typeface="Calibri" panose="020F0502020204030204"/>
               </a:rPr>
               <a:t> to the previous RQ Slide  (both the Null and Alternative Hypotheses).  Here are definitions and examples. </a:t>
             </a:r>
             <a:r>
               <a:rPr lang="en-GB" sz="2400" dirty="0">
-                <a:latin typeface="Calibri"/>
-                <a:cs typeface="Calibri"/>
+                <a:latin typeface="Calibri" panose="020F0502020204030204"/>
+                <a:cs typeface="Calibri" panose="020F0502020204030204"/>
               </a:rPr>
               <a:t>Your hypothesis wording comes directly from your RQ</a:t>
             </a:r>
             <a:r>
               <a:rPr lang="en-GB" sz="2400" b="0" dirty="0">
-                <a:latin typeface="Calibri"/>
-                <a:cs typeface="Calibri"/>
+                <a:latin typeface="Calibri" panose="020F0502020204030204"/>
+                <a:cs typeface="Calibri" panose="020F0502020204030204"/>
               </a:rPr>
               <a:t>. This is the formal way of reporting the results of your inferential test statistics,  in which we report the </a:t>
             </a:r>
             <a:r>
               <a:rPr lang="en-GB" sz="2400" b="0" i="1" dirty="0">
-                <a:latin typeface="Calibri"/>
-                <a:cs typeface="Calibri"/>
+                <a:latin typeface="Calibri" panose="020F0502020204030204"/>
+                <a:cs typeface="Calibri" panose="020F0502020204030204"/>
               </a:rPr>
               <a:t>effect</a:t>
             </a:r>
             <a:r>
               <a:rPr lang="en-GB" sz="2400" b="0" dirty="0">
-                <a:latin typeface="Calibri"/>
-                <a:cs typeface="Calibri"/>
+                <a:latin typeface="Calibri" panose="020F0502020204030204"/>
+                <a:cs typeface="Calibri" panose="020F0502020204030204"/>
               </a:rPr>
               <a:t> the independent variable has on the dependent variable – </a:t>
             </a:r>
+            <a:endParaRPr lang="en-GB" sz="2400" b="0" dirty="0">
+              <a:latin typeface="Calibri" panose="020F0502020204030204"/>
+              <a:cs typeface="Calibri" panose="020F0502020204030204"/>
+            </a:endParaRPr>
           </a:p>
           <a:p>
             <a:pPr>
@@ -6627,8 +5932,8 @@
               </a:lnSpc>
             </a:pPr>
             <a:endParaRPr lang="en-GB" sz="2400" b="0" dirty="0">
-              <a:latin typeface="Calibri"/>
-              <a:cs typeface="Calibri"/>
+              <a:latin typeface="Calibri" panose="020F0502020204030204"/>
+              <a:cs typeface="Calibri" panose="020F0502020204030204"/>
             </a:endParaRPr>
           </a:p>
           <a:p>
@@ -6640,25 +5945,29 @@
             </a:pPr>
             <a:r>
               <a:rPr lang="en-GB" sz="2000" b="0" dirty="0">
-                <a:latin typeface="Arial"/>
-                <a:cs typeface="Arial"/>
+                <a:latin typeface="Arial" panose="020B0604020202020204"/>
+                <a:cs typeface="Arial" panose="020B0604020202020204"/>
               </a:rPr>
               <a:t>Null hypothesis (H</a:t>
             </a:r>
             <a:r>
               <a:rPr lang="en-GB" sz="2000" b="0" baseline="-25000" dirty="0">
-                <a:latin typeface="Arial"/>
-                <a:cs typeface="Arial"/>
+                <a:latin typeface="Arial" panose="020B0604020202020204"/>
+                <a:cs typeface="Arial" panose="020B0604020202020204"/>
               </a:rPr>
               <a:t>0</a:t>
             </a:r>
             <a:r>
               <a:rPr lang="en-GB" sz="2000" b="0" dirty="0">
-                <a:latin typeface="Arial"/>
-                <a:cs typeface="Arial"/>
+                <a:latin typeface="Arial" panose="020B0604020202020204"/>
+                <a:cs typeface="Arial" panose="020B0604020202020204"/>
               </a:rPr>
               <a:t>): </a:t>
             </a:r>
+            <a:endParaRPr lang="en-GB" sz="2000" b="0" dirty="0">
+              <a:latin typeface="Arial" panose="020B0604020202020204"/>
+              <a:cs typeface="Arial" panose="020B0604020202020204"/>
+            </a:endParaRPr>
           </a:p>
           <a:p>
             <a:pPr>
@@ -6671,8 +5980,8 @@
                 <a:solidFill>
                   <a:srgbClr val="FF0000"/>
                 </a:solidFill>
-                <a:latin typeface="Arial"/>
-                <a:cs typeface="Arial"/>
+                <a:latin typeface="Arial" panose="020B0604020202020204"/>
+                <a:cs typeface="Arial" panose="020B0604020202020204"/>
               </a:rPr>
               <a:t>	Null hypothesis (H</a:t>
             </a:r>
@@ -6681,8 +5990,8 @@
                 <a:solidFill>
                   <a:srgbClr val="FF0000"/>
                 </a:solidFill>
-                <a:latin typeface="Arial"/>
-                <a:cs typeface="Arial"/>
+                <a:latin typeface="Arial" panose="020B0604020202020204"/>
+                <a:cs typeface="Arial" panose="020B0604020202020204"/>
               </a:rPr>
               <a:t>0</a:t>
             </a:r>
@@ -6691,8 +6000,8 @@
                 <a:solidFill>
                   <a:srgbClr val="FF0000"/>
                 </a:solidFill>
-                <a:latin typeface="Arial"/>
-                <a:cs typeface="Arial"/>
+                <a:latin typeface="Arial" panose="020B0604020202020204"/>
+                <a:cs typeface="Arial" panose="020B0604020202020204"/>
               </a:rPr>
               <a:t>): There is </a:t>
             </a:r>
@@ -6701,8 +6010,8 @@
                 <a:solidFill>
                   <a:srgbClr val="FF0000"/>
                 </a:solidFill>
-                <a:latin typeface="Arial"/>
-                <a:cs typeface="Arial"/>
+                <a:latin typeface="Arial" panose="020B0604020202020204"/>
+                <a:cs typeface="Arial" panose="020B0604020202020204"/>
               </a:rPr>
               <a:t>no</a:t>
             </a:r>
@@ -6711,8 +6020,8 @@
                 <a:solidFill>
                   <a:srgbClr val="FF0000"/>
                 </a:solidFill>
-                <a:latin typeface="Arial"/>
-                <a:cs typeface="Arial"/>
+                <a:latin typeface="Arial" panose="020B0604020202020204"/>
+                <a:cs typeface="Arial" panose="020B0604020202020204"/>
               </a:rPr>
               <a:t> correlation between </a:t>
             </a:r>
@@ -6721,8 +6030,8 @@
                 <a:solidFill>
                   <a:schemeClr val="accent4"/>
                 </a:solidFill>
-                <a:latin typeface="Arial"/>
-                <a:cs typeface="Arial"/>
+                <a:latin typeface="Arial" panose="020B0604020202020204"/>
+                <a:cs typeface="Arial" panose="020B0604020202020204"/>
               </a:rPr>
               <a:t>Point Scored/Game</a:t>
             </a:r>
@@ -6731,8 +6040,8 @@
                 <a:solidFill>
                   <a:srgbClr val="FF0000"/>
                 </a:solidFill>
-                <a:latin typeface="Arial"/>
-                <a:cs typeface="Arial"/>
+                <a:latin typeface="Arial" panose="020B0604020202020204"/>
+                <a:cs typeface="Arial" panose="020B0604020202020204"/>
               </a:rPr>
               <a:t> and </a:t>
             </a:r>
@@ -6741,8 +6050,8 @@
                 <a:solidFill>
                   <a:schemeClr val="accent4"/>
                 </a:solidFill>
-                <a:latin typeface="Arial"/>
-                <a:cs typeface="Arial"/>
+                <a:latin typeface="Arial" panose="020B0604020202020204"/>
+                <a:cs typeface="Arial" panose="020B0604020202020204"/>
               </a:rPr>
               <a:t>Minutes Played</a:t>
             </a:r>
@@ -6751,11 +6060,18 @@
                 <a:solidFill>
                   <a:srgbClr val="FF0000"/>
                 </a:solidFill>
-                <a:latin typeface="Arial"/>
-                <a:cs typeface="Arial"/>
+                <a:latin typeface="Arial" panose="020B0604020202020204"/>
+                <a:cs typeface="Arial" panose="020B0604020202020204"/>
               </a:rPr>
               <a:t>.</a:t>
             </a:r>
+            <a:endParaRPr lang="en-GB" sz="2000" b="0" dirty="0">
+              <a:solidFill>
+                <a:srgbClr val="FF0000"/>
+              </a:solidFill>
+              <a:latin typeface="Arial" panose="020B0604020202020204"/>
+              <a:cs typeface="Arial" panose="020B0604020202020204"/>
+            </a:endParaRPr>
           </a:p>
           <a:p>
             <a:pPr>
@@ -6765,25 +6081,29 @@
             </a:pPr>
             <a:r>
               <a:rPr lang="en-GB" sz="2000" b="0" dirty="0">
-                <a:latin typeface="Arial"/>
-                <a:cs typeface="Arial"/>
+                <a:latin typeface="Arial" panose="020B0604020202020204"/>
+                <a:cs typeface="Arial" panose="020B0604020202020204"/>
               </a:rPr>
               <a:t>2. Alternative hypothesis (H</a:t>
             </a:r>
             <a:r>
               <a:rPr lang="en-GB" sz="2000" b="0" baseline="-25000" dirty="0">
-                <a:latin typeface="Arial"/>
-                <a:cs typeface="Arial"/>
+                <a:latin typeface="Arial" panose="020B0604020202020204"/>
+                <a:cs typeface="Arial" panose="020B0604020202020204"/>
               </a:rPr>
               <a:t>1</a:t>
             </a:r>
             <a:r>
               <a:rPr lang="en-GB" sz="2000" b="0" dirty="0">
-                <a:latin typeface="Arial"/>
-                <a:cs typeface="Arial"/>
+                <a:latin typeface="Arial" panose="020B0604020202020204"/>
+                <a:cs typeface="Arial" panose="020B0604020202020204"/>
               </a:rPr>
               <a:t>):  </a:t>
             </a:r>
+            <a:endParaRPr lang="en-GB" sz="2000" b="0" dirty="0">
+              <a:latin typeface="Arial" panose="020B0604020202020204"/>
+              <a:cs typeface="Arial" panose="020B0604020202020204"/>
+            </a:endParaRPr>
           </a:p>
           <a:p>
             <a:pPr>
@@ -6796,8 +6116,8 @@
                 <a:solidFill>
                   <a:srgbClr val="FF0000"/>
                 </a:solidFill>
-                <a:latin typeface="Arial"/>
-                <a:cs typeface="Arial"/>
+                <a:latin typeface="Arial" panose="020B0604020202020204"/>
+                <a:cs typeface="Arial" panose="020B0604020202020204"/>
               </a:rPr>
               <a:t>	Alt hypothesis (H</a:t>
             </a:r>
@@ -6806,8 +6126,8 @@
                 <a:solidFill>
                   <a:srgbClr val="FF0000"/>
                 </a:solidFill>
-                <a:latin typeface="Arial"/>
-                <a:cs typeface="Arial"/>
+                <a:latin typeface="Arial" panose="020B0604020202020204"/>
+                <a:cs typeface="Arial" panose="020B0604020202020204"/>
               </a:rPr>
               <a:t>1</a:t>
             </a:r>
@@ -6816,8 +6136,8 @@
                 <a:solidFill>
                   <a:srgbClr val="FF0000"/>
                 </a:solidFill>
-                <a:latin typeface="Arial"/>
-                <a:cs typeface="Arial"/>
+                <a:latin typeface="Arial" panose="020B0604020202020204"/>
+                <a:cs typeface="Arial" panose="020B0604020202020204"/>
               </a:rPr>
               <a:t>): There is </a:t>
             </a:r>
@@ -6826,8 +6146,8 @@
                 <a:solidFill>
                   <a:srgbClr val="FF0000"/>
                 </a:solidFill>
-                <a:latin typeface="Arial"/>
-                <a:cs typeface="Arial"/>
+                <a:latin typeface="Arial" panose="020B0604020202020204"/>
+                <a:cs typeface="Arial" panose="020B0604020202020204"/>
               </a:rPr>
               <a:t>a</a:t>
             </a:r>
@@ -6836,8 +6156,8 @@
                 <a:solidFill>
                   <a:srgbClr val="FF0000"/>
                 </a:solidFill>
-                <a:latin typeface="Arial"/>
-                <a:cs typeface="Arial"/>
+                <a:latin typeface="Arial" panose="020B0604020202020204"/>
+                <a:cs typeface="Arial" panose="020B0604020202020204"/>
               </a:rPr>
               <a:t> correlation </a:t>
             </a:r>
@@ -6846,7 +6166,7 @@
                 <a:solidFill>
                   <a:srgbClr val="FF0000"/>
                 </a:solidFill>
-                <a:cs typeface="Arial"/>
+                <a:cs typeface="Arial" panose="020B0604020202020204"/>
               </a:rPr>
               <a:t>between </a:t>
             </a:r>
@@ -6855,7 +6175,7 @@
                 <a:solidFill>
                   <a:schemeClr val="accent4"/>
                 </a:solidFill>
-                <a:cs typeface="Arial"/>
+                <a:cs typeface="Arial" panose="020B0604020202020204"/>
               </a:rPr>
               <a:t>Point Scored/Game</a:t>
             </a:r>
@@ -6864,7 +6184,7 @@
                 <a:solidFill>
                   <a:srgbClr val="FF0000"/>
                 </a:solidFill>
-                <a:cs typeface="Arial"/>
+                <a:cs typeface="Arial" panose="020B0604020202020204"/>
               </a:rPr>
               <a:t> and </a:t>
             </a:r>
@@ -6873,7 +6193,7 @@
                 <a:solidFill>
                   <a:schemeClr val="accent4"/>
                 </a:solidFill>
-                <a:cs typeface="Arial"/>
+                <a:cs typeface="Arial" panose="020B0604020202020204"/>
               </a:rPr>
               <a:t>Minutes Played</a:t>
             </a:r>
@@ -6882,7 +6202,7 @@
                 <a:solidFill>
                   <a:srgbClr val="FF0000"/>
                 </a:solidFill>
-                <a:cs typeface="Arial"/>
+                <a:cs typeface="Arial" panose="020B0604020202020204"/>
               </a:rPr>
               <a:t>.</a:t>
             </a:r>
@@ -6890,7 +6210,7 @@
               <a:solidFill>
                 <a:srgbClr val="FF0000"/>
               </a:solidFill>
-              <a:cs typeface="Arial"/>
+              <a:cs typeface="Arial" panose="020B0604020202020204"/>
             </a:endParaRPr>
           </a:p>
           <a:p>
@@ -6903,21 +6223,15 @@
               <a:solidFill>
                 <a:srgbClr val="FF0000"/>
               </a:solidFill>
-              <a:latin typeface="Arial"/>
-              <a:cs typeface="Arial"/>
+              <a:latin typeface="Arial" panose="020B0604020202020204"/>
+              <a:cs typeface="Arial" panose="020B0604020202020204"/>
             </a:endParaRPr>
           </a:p>
         </p:txBody>
       </p:sp>
       <p:sp>
         <p:nvSpPr>
-          <p:cNvPr id="4" name="Slide Number Placeholder 3">
-            <a:extLst>
-              <a:ext uri="{FF2B5EF4-FFF2-40B4-BE49-F238E27FC236}">
-                <a16:creationId xmlns:a16="http://schemas.microsoft.com/office/drawing/2014/main" id="{FF7EDF94-2B89-A21D-BBC0-E455C2D9893B}"/>
-              </a:ext>
-            </a:extLst>
-          </p:cNvPr>
+          <p:cNvPr id="4" name="Slide Number Placeholder 3"/>
           <p:cNvSpPr>
             <a:spLocks noGrp="1"/>
           </p:cNvSpPr>
@@ -6945,13 +6259,7 @@
       </p:sp>
       <p:sp>
         <p:nvSpPr>
-          <p:cNvPr id="6" name="TextBox 5">
-            <a:extLst>
-              <a:ext uri="{FF2B5EF4-FFF2-40B4-BE49-F238E27FC236}">
-                <a16:creationId xmlns:a16="http://schemas.microsoft.com/office/drawing/2014/main" id="{1841CE34-1B2E-88D5-0C3F-506E8C37BB7B}"/>
-              </a:ext>
-            </a:extLst>
-          </p:cNvPr>
+          <p:cNvPr id="6" name="TextBox 5"/>
           <p:cNvSpPr txBox="1"/>
           <p:nvPr/>
         </p:nvSpPr>
@@ -7024,17 +6332,12 @@
               <a:t>.)</a:t>
             </a:r>
             <a:endParaRPr lang="en-GB">
-              <a:cs typeface="Arial"/>
+              <a:cs typeface="Arial" panose="020B0604020202020204"/>
             </a:endParaRPr>
           </a:p>
         </p:txBody>
       </p:sp>
     </p:spTree>
-    <p:extLst>
-      <p:ext uri="{BB962C8B-B14F-4D97-AF65-F5344CB8AC3E}">
-        <p14:creationId xmlns:p14="http://schemas.microsoft.com/office/powerpoint/2010/main" val="2952338475"/>
-      </p:ext>
-    </p:extLst>
   </p:cSld>
   <p:clrMapOvr>
     <a:masterClrMapping/>
@@ -7085,7 +6388,7 @@
     </a:clrScheme>
     <a:fontScheme name="Arial">
       <a:majorFont>
-        <a:latin typeface="Arial" panose="020B0604020202020204"/>
+        <a:latin typeface="Arial"/>
         <a:ea typeface=""/>
         <a:cs typeface=""/>
         <a:font script="Jpan" typeface="ＭＳ Ｐゴシック"/>
@@ -7120,7 +6423,7 @@
         <a:font script="Geor" typeface="Sylfaen"/>
       </a:majorFont>
       <a:minorFont>
-        <a:latin typeface="Arial" panose="020B0604020202020204"/>
+        <a:latin typeface="Arial"/>
         <a:ea typeface=""/>
         <a:cs typeface=""/>
         <a:font script="Jpan" typeface="ＭＳ Ｐゴシック"/>
@@ -7293,8 +6596,6 @@
       </a:bgFillStyleLst>
     </a:fmtScheme>
   </a:themeElements>
-  <a:objectDefaults/>
-  <a:extraClrSchemeLst/>
   <a:extLst>
     <a:ext uri="{05A4C25C-085E-4340-85A3-A5531E510DB2}">
       <thm15:themeFamily xmlns:thm15="http://schemas.microsoft.com/office/thememl/2012/main" name="Office Theme" id="{62F939B6-93AF-4DB8-9C6B-D6C7DFDC589F}" vid="{4A3C46E8-61CC-4603-A589-7422A47A8E4A}"/>
@@ -7379,23 +6680,6 @@
         <a:font script="Viet" typeface="Times New Roman"/>
         <a:font script="Uigh" typeface="Microsoft Uighur"/>
         <a:font script="Geor" typeface="Sylfaen"/>
-        <a:font script="Armn" typeface="Arial"/>
-        <a:font script="Bugi" typeface="Leelawadee UI"/>
-        <a:font script="Bopo" typeface="Microsoft JhengHei"/>
-        <a:font script="Java" typeface="Javanese Text"/>
-        <a:font script="Lisu" typeface="Segoe UI"/>
-        <a:font script="Mymr" typeface="Myanmar Text"/>
-        <a:font script="Nkoo" typeface="Ebrima"/>
-        <a:font script="Olck" typeface="Nirmala UI"/>
-        <a:font script="Osma" typeface="Ebrima"/>
-        <a:font script="Phag" typeface="Phagspa"/>
-        <a:font script="Syrn" typeface="Estrangelo Edessa"/>
-        <a:font script="Syrj" typeface="Estrangelo Edessa"/>
-        <a:font script="Syre" typeface="Estrangelo Edessa"/>
-        <a:font script="Sora" typeface="Nirmala UI"/>
-        <a:font script="Tale" typeface="Microsoft Tai Le"/>
-        <a:font script="Talu" typeface="Microsoft New Tai Lue"/>
-        <a:font script="Tfng" typeface="Ebrima"/>
       </a:majorFont>
       <a:minorFont>
         <a:latin typeface="Calibri"/>
@@ -7431,23 +6715,6 @@
         <a:font script="Viet" typeface="Arial"/>
         <a:font script="Uigh" typeface="Microsoft Uighur"/>
         <a:font script="Geor" typeface="Sylfaen"/>
-        <a:font script="Armn" typeface="Arial"/>
-        <a:font script="Bugi" typeface="Leelawadee UI"/>
-        <a:font script="Bopo" typeface="Microsoft JhengHei"/>
-        <a:font script="Java" typeface="Javanese Text"/>
-        <a:font script="Lisu" typeface="Segoe UI"/>
-        <a:font script="Mymr" typeface="Myanmar Text"/>
-        <a:font script="Nkoo" typeface="Ebrima"/>
-        <a:font script="Olck" typeface="Nirmala UI"/>
-        <a:font script="Osma" typeface="Ebrima"/>
-        <a:font script="Phag" typeface="Phagspa"/>
-        <a:font script="Syrn" typeface="Estrangelo Edessa"/>
-        <a:font script="Syrj" typeface="Estrangelo Edessa"/>
-        <a:font script="Syre" typeface="Estrangelo Edessa"/>
-        <a:font script="Sora" typeface="Nirmala UI"/>
-        <a:font script="Tale" typeface="Microsoft Tai Le"/>
-        <a:font script="Talu" typeface="Microsoft New Tai Lue"/>
-        <a:font script="Tfng" typeface="Ebrima"/>
       </a:minorFont>
     </a:fontScheme>
     <a:fmtScheme name="Office">
@@ -7588,8 +6855,6 @@
       </a:bgFillStyleLst>
     </a:fmtScheme>
   </a:themeElements>
-  <a:objectDefaults/>
-  <a:extraClrSchemeLst/>
   <a:extLst>
     <a:ext uri="{05A4C25C-085E-4340-85A3-A5531E510DB2}">
       <thm15:themeFamily xmlns:thm15="http://schemas.microsoft.com/office/thememl/2012/main" name="Office Theme" id="{62F939B6-93AF-4DB8-9C6B-D6C7DFDC589F}" vid="{4A3C46E8-61CC-4603-A589-7422A47A8E4A}"/>
@@ -7674,23 +6939,6 @@
         <a:font script="Viet" typeface="Times New Roman"/>
         <a:font script="Uigh" typeface="Microsoft Uighur"/>
         <a:font script="Geor" typeface="Sylfaen"/>
-        <a:font script="Armn" typeface="Arial"/>
-        <a:font script="Bugi" typeface="Leelawadee UI"/>
-        <a:font script="Bopo" typeface="Microsoft JhengHei"/>
-        <a:font script="Java" typeface="Javanese Text"/>
-        <a:font script="Lisu" typeface="Segoe UI"/>
-        <a:font script="Mymr" typeface="Myanmar Text"/>
-        <a:font script="Nkoo" typeface="Ebrima"/>
-        <a:font script="Olck" typeface="Nirmala UI"/>
-        <a:font script="Osma" typeface="Ebrima"/>
-        <a:font script="Phag" typeface="Phagspa"/>
-        <a:font script="Syrn" typeface="Estrangelo Edessa"/>
-        <a:font script="Syrj" typeface="Estrangelo Edessa"/>
-        <a:font script="Syre" typeface="Estrangelo Edessa"/>
-        <a:font script="Sora" typeface="Nirmala UI"/>
-        <a:font script="Tale" typeface="Microsoft Tai Le"/>
-        <a:font script="Talu" typeface="Microsoft New Tai Lue"/>
-        <a:font script="Tfng" typeface="Ebrima"/>
       </a:majorFont>
       <a:minorFont>
         <a:latin typeface="Calibri"/>
@@ -7726,23 +6974,6 @@
         <a:font script="Viet" typeface="Arial"/>
         <a:font script="Uigh" typeface="Microsoft Uighur"/>
         <a:font script="Geor" typeface="Sylfaen"/>
-        <a:font script="Armn" typeface="Arial"/>
-        <a:font script="Bugi" typeface="Leelawadee UI"/>
-        <a:font script="Bopo" typeface="Microsoft JhengHei"/>
-        <a:font script="Java" typeface="Javanese Text"/>
-        <a:font script="Lisu" typeface="Segoe UI"/>
-        <a:font script="Mymr" typeface="Myanmar Text"/>
-        <a:font script="Nkoo" typeface="Ebrima"/>
-        <a:font script="Olck" typeface="Nirmala UI"/>
-        <a:font script="Osma" typeface="Ebrima"/>
-        <a:font script="Phag" typeface="Phagspa"/>
-        <a:font script="Syrn" typeface="Estrangelo Edessa"/>
-        <a:font script="Syrj" typeface="Estrangelo Edessa"/>
-        <a:font script="Syre" typeface="Estrangelo Edessa"/>
-        <a:font script="Sora" typeface="Nirmala UI"/>
-        <a:font script="Tale" typeface="Microsoft Tai Le"/>
-        <a:font script="Talu" typeface="Microsoft New Tai Lue"/>
-        <a:font script="Tfng" typeface="Ebrima"/>
       </a:minorFont>
     </a:fontScheme>
     <a:fmtScheme name="Office">
@@ -7883,8 +7114,6 @@
       </a:bgFillStyleLst>
     </a:fmtScheme>
   </a:themeElements>
-  <a:objectDefaults/>
-  <a:extraClrSchemeLst/>
   <a:extLst>
     <a:ext uri="{05A4C25C-085E-4340-85A3-A5531E510DB2}">
       <thm15:themeFamily xmlns:thm15="http://schemas.microsoft.com/office/thememl/2012/main" name="Office Theme" id="{62F939B6-93AF-4DB8-9C6B-D6C7DFDC589F}" vid="{4A3C46E8-61CC-4603-A589-7422A47A8E4A}"/>
@@ -8137,44 +7366,18 @@
 
 <file path=customXml/itemProps1.xml><?xml version="1.0" encoding="utf-8"?>
 <ds:datastoreItem xmlns:ds="http://schemas.openxmlformats.org/officeDocument/2006/customXml" ds:itemID="{421B8C57-903D-4D0E-8336-7B512F760CD1}">
-  <ds:schemaRefs>
-    <ds:schemaRef ds:uri="3c474641-ec36-472f-b125-6b1b0910eaa4"/>
-    <ds:schemaRef ds:uri="4ad138b4-2b68-4b70-945d-07f8f18b1c9a"/>
-    <ds:schemaRef ds:uri="http://purl.org/dc/elements/1.1/"/>
-    <ds:schemaRef ds:uri="http://purl.org/dc/terms/"/>
-    <ds:schemaRef ds:uri="http://schemas.microsoft.com/internal/obd"/>
-    <ds:schemaRef ds:uri="http://schemas.microsoft.com/office/2006/documentManagement/types"/>
-    <ds:schemaRef ds:uri="http://schemas.microsoft.com/office/2006/metadata/contentType"/>
-    <ds:schemaRef ds:uri="http://schemas.microsoft.com/office/2006/metadata/properties"/>
-    <ds:schemaRef ds:uri="http://schemas.microsoft.com/office/2006/metadata/properties/metaAttributes"/>
-    <ds:schemaRef ds:uri="http://schemas.microsoft.com/office/infopath/2007/PartnerControls"/>
-    <ds:schemaRef ds:uri="http://schemas.openxmlformats.org/package/2006/metadata/core-properties"/>
-    <ds:schemaRef ds:uri="http://www.w3.org/2001/XMLSchema"/>
-  </ds:schemaRefs>
+  <ds:schemaRefs/>
 </ds:datastoreItem>
 </file>
 
 <file path=customXml/itemProps2.xml><?xml version="1.0" encoding="utf-8"?>
 <ds:datastoreItem xmlns:ds="http://schemas.openxmlformats.org/officeDocument/2006/customXml" ds:itemID="{91C521DD-2673-4EE6-BB9B-DC5C3320FFBB}">
-  <ds:schemaRefs>
-    <ds:schemaRef ds:uri="http://schemas.microsoft.com/sharepoint/v3/contenttype/forms"/>
-  </ds:schemaRefs>
+  <ds:schemaRefs/>
 </ds:datastoreItem>
 </file>
 
 <file path=customXml/itemProps3.xml><?xml version="1.0" encoding="utf-8"?>
 <ds:datastoreItem xmlns:ds="http://schemas.openxmlformats.org/officeDocument/2006/customXml" ds:itemID="{EDD1FC41-23C7-41B0-B5F9-BF4CD38AD2ED}">
-  <ds:schemaRefs>
-    <ds:schemaRef ds:uri="3c474641-ec36-472f-b125-6b1b0910eaa4"/>
-    <ds:schemaRef ds:uri="4ad138b4-2b68-4b70-945d-07f8f18b1c9a"/>
-    <ds:schemaRef ds:uri="http://purl.org/dc/dcmitype/"/>
-    <ds:schemaRef ds:uri="http://purl.org/dc/elements/1.1/"/>
-    <ds:schemaRef ds:uri="http://purl.org/dc/terms/"/>
-    <ds:schemaRef ds:uri="http://schemas.microsoft.com/office/2006/documentManagement/types"/>
-    <ds:schemaRef ds:uri="http://schemas.microsoft.com/office/2006/metadata/properties"/>
-    <ds:schemaRef ds:uri="http://schemas.microsoft.com/office/infopath/2007/PartnerControls"/>
-    <ds:schemaRef ds:uri="http://schemas.openxmlformats.org/package/2006/metadata/core-properties"/>
-    <ds:schemaRef ds:uri="http://www.w3.org/XML/1998/namespace"/>
-  </ds:schemaRefs>
+  <ds:schemaRefs/>
 </ds:datastoreItem>
 </file>
</xml_diff>

<commit_message>
Contents added 1.1 & 1.2 to Group Report
</commit_message>
<xml_diff>
--- a/research_question_presentation_template.pptx
+++ b/research_question_presentation_template.pptx
@@ -256,7 +256,7 @@
             <a:fld id="{93FAAC3A-BD1F-4A00-9099-74B95789FE00}" type="datetimeFigureOut">
               <a:rPr lang="en-GB" smtClean="0"/>
               <a:pPr/>
-              <a:t>11/12/2025</a:t>
+              <a:t>12/12/2025</a:t>
             </a:fld>
             <a:endParaRPr lang="en-GB"/>
           </a:p>
@@ -435,7 +435,7 @@
             <a:fld id="{8E359C8A-39F6-4045-9163-4042C4C26B15}" type="datetimeFigureOut">
               <a:rPr lang="en-GB" smtClean="0"/>
               <a:pPr/>
-              <a:t>11/12/2025</a:t>
+              <a:t>12/12/2025</a:t>
             </a:fld>
             <a:endParaRPr lang="en-GB"/>
           </a:p>
@@ -4935,41 +4935,20 @@
           <a:p>
             <a:r>
               <a:rPr lang="en-GB" dirty="0"/>
-              <a:t>You have 5 minutes to present – be ready to share your screen, present slides in "full screen / presentation mode". Practice first. We can only offer you one opportunity to present your Research Question, so please </a:t>
-            </a:r>
-            <a:r>
-              <a:rPr lang="en-GB"/>
-              <a:t>make the most of this opportunity to help you pass coursework 2. </a:t>
-            </a:r>
+              <a:t>You have 5 minutes to present – be ready to share your screen, present slides in "full screen / presentation mode". Practice first. We can only offer you one opportunity to present your Research Question, so please make the most of this opportunity to help you pass coursework 2. </a:t>
+            </a:r>
+          </a:p>
+          <a:p>
             <a:endParaRPr lang="en-GB" dirty="0"/>
           </a:p>
           <a:p>
-            <a:endParaRPr lang="en-GB"/>
-          </a:p>
-          <a:p>
             <a:r>
               <a:rPr lang="en-GB" dirty="0">
                 <a:solidFill>
                   <a:srgbClr val="FF0000"/>
                 </a:solidFill>
               </a:rPr>
-              <a:t>Research Questions are dependent on the variables and datatypes you have in your assigned dataset. Before you define your Research Question, your dataset dsXXXX must match your assigned Dataset, I.e., did you </a:t>
-            </a:r>
-            <a:r>
-              <a:rPr lang="en-GB">
-                <a:solidFill>
-                  <a:srgbClr val="FF0000"/>
-                </a:solidFill>
-              </a:rPr>
-              <a:t>receive confirmation email about your allocation?</a:t>
-            </a:r>
-            <a:r>
-              <a:rPr lang="en-GB" dirty="0">
-                <a:solidFill>
-                  <a:srgbClr val="FF0000"/>
-                </a:solidFill>
-              </a:rPr>
-              <a:t> Your group number must be assigned to the dataset you are referencing here.</a:t>
+              <a:t>Research Questions are dependent on the variables and datatypes you have in your assigned dataset. Before you define your Research Question, your dataset dsXXXX must match your assigned Dataset, I.e., did you receive confirmation email about your allocation? Your group number must be assigned to the dataset you are referencing here.</a:t>
             </a:r>
             <a:endParaRPr lang="en-GB" dirty="0">
               <a:solidFill>
@@ -4979,7 +4958,7 @@
             </a:endParaRPr>
           </a:p>
           <a:p>
-            <a:endParaRPr lang="en-GB">
+            <a:endParaRPr lang="en-GB" dirty="0">
               <a:solidFill>
                 <a:srgbClr val="203232"/>
               </a:solidFill>
@@ -4988,12 +4967,8 @@
           </a:p>
           <a:p>
             <a:r>
-              <a:rPr lang="en-GB"/>
-              <a:t>The next slides give you three alternatives for defining your research question and hypotheses. Select </a:t>
-            </a:r>
-            <a:r>
               <a:rPr lang="en-GB" dirty="0"/>
-              <a:t>only </a:t>
+              <a:t>The next slides give you three alternatives for defining your research question and hypotheses. Select only </a:t>
             </a:r>
             <a:r>
               <a:rPr lang="en-GB" b="1" dirty="0"/>
@@ -5007,27 +4982,27 @@
           <a:p>
             <a:r>
               <a:rPr lang="en-GB" dirty="0"/>
-              <a:t>Before presenting DELETE all text that is either an instruction or an optionyou do not use (including this slide).   You can then enlarge your selection. Instructions for group sign up of presentation slots will be announced on Canvas and Slack. DO NOT SIGN UP unless you can attend. Ideally, all group members should attend; select one person to present, while others take notes. All group be ready to answer questions.  Any group not </a:t>
+              <a:t>Before presenting DELETE all text that is either an instruction or an optionyou do not use (including this slide).   You can then enlarge your selection. Instructions </a:t>
             </a:r>
             <a:r>
               <a:rPr lang="en-GB"/>
-              <a:t>presenting will miss the opportunity to check a critical part of coursework 2.   Practice presenting on Teams </a:t>
+              <a:t>for group  </a:t>
             </a:r>
             <a:r>
               <a:rPr lang="en-GB" dirty="0"/>
-              <a:t>first.</a:t>
-            </a:r>
-            <a:endParaRPr lang="en-GB">
+              <a:t>sign up of presentation slots will be announced on Canvas and Slack. DO NOT SIGN UP unless you can attend. Ideally, all group members should attend; select one person to present, while others take notes. All group be ready to answer questions.  Any group not presenting will miss the opportunity to check a critical part of coursework 2.   Practice presenting on Teams first.</a:t>
+            </a:r>
+            <a:endParaRPr lang="en-GB" dirty="0">
               <a:cs typeface="Arial"/>
             </a:endParaRPr>
           </a:p>
           <a:p>
             <a:r>
-              <a:rPr lang="en-GB" b="1" i="1"/>
+              <a:rPr lang="en-GB" b="1" i="1" dirty="0"/>
               <a:t>We look forward to giving you feedback.  You will not be graded on this presentation but if you do not attend and you booked a space you are preventing someone else presenting and are going against our module values</a:t>
             </a:r>
             <a:r>
-              <a:rPr lang="en-GB"/>
+              <a:rPr lang="en-GB" dirty="0"/>
               <a:t>.  This will be reflected in your peer evaluation.</a:t>
             </a:r>
           </a:p>
@@ -7905,23 +7880,6 @@
 </file>
 
 <file path=customXml/item1.xml><?xml version="1.0" encoding="utf-8"?>
-<p:properties xmlns:p="http://schemas.microsoft.com/office/2006/metadata/properties" xmlns:xsi="http://www.w3.org/2001/XMLSchema-instance" xmlns:pc="http://schemas.microsoft.com/office/infopath/2007/PartnerControls">
-  <documentManagement>
-    <Information xmlns="4ad138b4-2b68-4b70-945d-07f8f18b1c9a" xsi:nil="true"/>
-  </documentManagement>
-</p:properties>
-</file>
-
-<file path=customXml/item2.xml><?xml version="1.0" encoding="utf-8"?>
-<?mso-contentType ?>
-<FormTemplates xmlns="http://schemas.microsoft.com/sharepoint/v3/contenttype/forms">
-  <Display>DocumentLibraryForm</Display>
-  <Edit>DocumentLibraryForm</Edit>
-  <New>DocumentLibraryForm</New>
-</FormTemplates>
-</file>
-
-<file path=customXml/item3.xml><?xml version="1.0" encoding="utf-8"?>
 <ct:contentTypeSchema xmlns:ct="http://schemas.microsoft.com/office/2006/metadata/contentType" xmlns:ma="http://schemas.microsoft.com/office/2006/metadata/properties/metaAttributes" ct:_="" ma:_="" ma:contentTypeName="Document" ma:contentTypeID="0x01010026DBA85F447B164191BB36C258697B67" ma:contentTypeVersion="14" ma:contentTypeDescription="Create a new document." ma:contentTypeScope="" ma:versionID="ea511d05ca7f895fe9556935b5c9af34">
   <xsd:schema xmlns:xsd="http://www.w3.org/2001/XMLSchema" xmlns:xs="http://www.w3.org/2001/XMLSchema" xmlns:p="http://schemas.microsoft.com/office/2006/metadata/properties" xmlns:ns2="4ad138b4-2b68-4b70-945d-07f8f18b1c9a" xmlns:ns3="3c474641-ec36-472f-b125-6b1b0910eaa4" targetNamespace="http://schemas.microsoft.com/office/2006/metadata/properties" ma:root="true" ma:fieldsID="662270106d7a7e100bcac2c5f8d29899" ns2:_="" ns3:_="">
     <xsd:import namespace="4ad138b4-2b68-4b70-945d-07f8f18b1c9a"/>
@@ -8146,32 +8104,24 @@
 </ct:contentTypeSchema>
 </file>
 
-<file path=customXml/itemProps1.xml><?xml version="1.0" encoding="utf-8"?>
-<ds:datastoreItem xmlns:ds="http://schemas.openxmlformats.org/officeDocument/2006/customXml" ds:itemID="{EDD1FC41-23C7-41B0-B5F9-BF4CD38AD2ED}">
-  <ds:schemaRefs>
-    <ds:schemaRef ds:uri="3c474641-ec36-472f-b125-6b1b0910eaa4"/>
-    <ds:schemaRef ds:uri="4ad138b4-2b68-4b70-945d-07f8f18b1c9a"/>
-    <ds:schemaRef ds:uri="http://purl.org/dc/dcmitype/"/>
-    <ds:schemaRef ds:uri="http://purl.org/dc/elements/1.1/"/>
-    <ds:schemaRef ds:uri="http://purl.org/dc/terms/"/>
-    <ds:schemaRef ds:uri="http://schemas.microsoft.com/office/2006/documentManagement/types"/>
-    <ds:schemaRef ds:uri="http://schemas.microsoft.com/office/2006/metadata/properties"/>
-    <ds:schemaRef ds:uri="http://schemas.microsoft.com/office/infopath/2007/PartnerControls"/>
-    <ds:schemaRef ds:uri="http://schemas.openxmlformats.org/package/2006/metadata/core-properties"/>
-    <ds:schemaRef ds:uri="http://www.w3.org/XML/1998/namespace"/>
-  </ds:schemaRefs>
-</ds:datastoreItem>
+<file path=customXml/item2.xml><?xml version="1.0" encoding="utf-8"?>
+<?mso-contentType ?>
+<FormTemplates xmlns="http://schemas.microsoft.com/sharepoint/v3/contenttype/forms">
+  <Display>DocumentLibraryForm</Display>
+  <Edit>DocumentLibraryForm</Edit>
+  <New>DocumentLibraryForm</New>
+</FormTemplates>
 </file>
 
-<file path=customXml/itemProps2.xml><?xml version="1.0" encoding="utf-8"?>
-<ds:datastoreItem xmlns:ds="http://schemas.openxmlformats.org/officeDocument/2006/customXml" ds:itemID="{91C521DD-2673-4EE6-BB9B-DC5C3320FFBB}">
-  <ds:schemaRefs>
-    <ds:schemaRef ds:uri="http://schemas.microsoft.com/sharepoint/v3/contenttype/forms"/>
-  </ds:schemaRefs>
-</ds:datastoreItem>
+<file path=customXml/item3.xml><?xml version="1.0" encoding="utf-8"?>
+<p:properties xmlns:p="http://schemas.microsoft.com/office/2006/metadata/properties" xmlns:xsi="http://www.w3.org/2001/XMLSchema-instance" xmlns:pc="http://schemas.microsoft.com/office/infopath/2007/PartnerControls">
+  <documentManagement>
+    <Information xmlns="4ad138b4-2b68-4b70-945d-07f8f18b1c9a" xsi:nil="true"/>
+  </documentManagement>
+</p:properties>
 </file>
 
-<file path=customXml/itemProps3.xml><?xml version="1.0" encoding="utf-8"?>
+<file path=customXml/itemProps1.xml><?xml version="1.0" encoding="utf-8"?>
 <ds:datastoreItem xmlns:ds="http://schemas.openxmlformats.org/officeDocument/2006/customXml" ds:itemID="{421B8C57-903D-4D0E-8336-7B512F760CD1}">
   <ds:schemaRefs>
     <ds:schemaRef ds:uri="3c474641-ec36-472f-b125-6b1b0910eaa4"/>
@@ -8188,4 +8138,29 @@
     <ds:schemaRef ds:uri="http://www.w3.org/2001/XMLSchema"/>
   </ds:schemaRefs>
 </ds:datastoreItem>
+</file>
+
+<file path=customXml/itemProps2.xml><?xml version="1.0" encoding="utf-8"?>
+<ds:datastoreItem xmlns:ds="http://schemas.openxmlformats.org/officeDocument/2006/customXml" ds:itemID="{91C521DD-2673-4EE6-BB9B-DC5C3320FFBB}">
+  <ds:schemaRefs>
+    <ds:schemaRef ds:uri="http://schemas.microsoft.com/sharepoint/v3/contenttype/forms"/>
+  </ds:schemaRefs>
+</ds:datastoreItem>
+</file>
+
+<file path=customXml/itemProps3.xml><?xml version="1.0" encoding="utf-8"?>
+<ds:datastoreItem xmlns:ds="http://schemas.openxmlformats.org/officeDocument/2006/customXml" ds:itemID="{EDD1FC41-23C7-41B0-B5F9-BF4CD38AD2ED}">
+  <ds:schemaRefs>
+    <ds:schemaRef ds:uri="3c474641-ec36-472f-b125-6b1b0910eaa4"/>
+    <ds:schemaRef ds:uri="4ad138b4-2b68-4b70-945d-07f8f18b1c9a"/>
+    <ds:schemaRef ds:uri="http://purl.org/dc/dcmitype/"/>
+    <ds:schemaRef ds:uri="http://purl.org/dc/elements/1.1/"/>
+    <ds:schemaRef ds:uri="http://purl.org/dc/terms/"/>
+    <ds:schemaRef ds:uri="http://schemas.microsoft.com/office/2006/documentManagement/types"/>
+    <ds:schemaRef ds:uri="http://schemas.microsoft.com/office/2006/metadata/properties"/>
+    <ds:schemaRef ds:uri="http://schemas.microsoft.com/office/infopath/2007/PartnerControls"/>
+    <ds:schemaRef ds:uri="http://schemas.openxmlformats.org/package/2006/metadata/core-properties"/>
+    <ds:schemaRef ds:uri="http://www.w3.org/XML/1998/namespace"/>
+  </ds:schemaRefs>
+</ds:datastoreItem>
 </file>
</xml_diff>